<commit_message>
Complicated and bad Language Implementation
needs more work, but works in German for now, language change not
possible, it's very bad I know
</commit_message>
<xml_diff>
--- a/Symbols.pptx
+++ b/Symbols.pptx
@@ -19,6 +19,8 @@
     <p:sldId id="274" r:id="rId13"/>
     <p:sldId id="276" r:id="rId14"/>
     <p:sldId id="282" r:id="rId15"/>
+    <p:sldId id="284" r:id="rId16"/>
+    <p:sldId id="285" r:id="rId17"/>
   </p:sldIdLst>
   <p:sldSz cx="10799763" cy="10799763"/>
   <p:notesSz cx="6858000" cy="9144000"/>
@@ -140,6 +142,8 @@
             <p14:sldId id="274"/>
             <p14:sldId id="276"/>
             <p14:sldId id="282"/>
+            <p14:sldId id="284"/>
+            <p14:sldId id="285"/>
           </p14:sldIdLst>
         </p14:section>
       </p14:sectionLst>
@@ -286,7 +290,7 @@
           <a:p>
             <a:fld id="{CF7CD84D-430A-4AA5-9B0E-9CAD50B60C46}" type="datetimeFigureOut">
               <a:rPr lang="de-DE" smtClean="0"/>
-              <a:t>03.05.2017</a:t>
+              <a:t>19.05.2017</a:t>
             </a:fld>
             <a:endParaRPr lang="de-DE"/>
           </a:p>
@@ -456,7 +460,7 @@
           <a:p>
             <a:fld id="{CF7CD84D-430A-4AA5-9B0E-9CAD50B60C46}" type="datetimeFigureOut">
               <a:rPr lang="de-DE" smtClean="0"/>
-              <a:t>03.05.2017</a:t>
+              <a:t>19.05.2017</a:t>
             </a:fld>
             <a:endParaRPr lang="de-DE"/>
           </a:p>
@@ -636,7 +640,7 @@
           <a:p>
             <a:fld id="{CF7CD84D-430A-4AA5-9B0E-9CAD50B60C46}" type="datetimeFigureOut">
               <a:rPr lang="de-DE" smtClean="0"/>
-              <a:t>03.05.2017</a:t>
+              <a:t>19.05.2017</a:t>
             </a:fld>
             <a:endParaRPr lang="de-DE"/>
           </a:p>
@@ -806,7 +810,7 @@
           <a:p>
             <a:fld id="{CF7CD84D-430A-4AA5-9B0E-9CAD50B60C46}" type="datetimeFigureOut">
               <a:rPr lang="de-DE" smtClean="0"/>
-              <a:t>03.05.2017</a:t>
+              <a:t>19.05.2017</a:t>
             </a:fld>
             <a:endParaRPr lang="de-DE"/>
           </a:p>
@@ -1050,7 +1054,7 @@
           <a:p>
             <a:fld id="{CF7CD84D-430A-4AA5-9B0E-9CAD50B60C46}" type="datetimeFigureOut">
               <a:rPr lang="de-DE" smtClean="0"/>
-              <a:t>03.05.2017</a:t>
+              <a:t>19.05.2017</a:t>
             </a:fld>
             <a:endParaRPr lang="de-DE"/>
           </a:p>
@@ -1282,7 +1286,7 @@
           <a:p>
             <a:fld id="{CF7CD84D-430A-4AA5-9B0E-9CAD50B60C46}" type="datetimeFigureOut">
               <a:rPr lang="de-DE" smtClean="0"/>
-              <a:t>03.05.2017</a:t>
+              <a:t>19.05.2017</a:t>
             </a:fld>
             <a:endParaRPr lang="de-DE"/>
           </a:p>
@@ -1649,7 +1653,7 @@
           <a:p>
             <a:fld id="{CF7CD84D-430A-4AA5-9B0E-9CAD50B60C46}" type="datetimeFigureOut">
               <a:rPr lang="de-DE" smtClean="0"/>
-              <a:t>03.05.2017</a:t>
+              <a:t>19.05.2017</a:t>
             </a:fld>
             <a:endParaRPr lang="de-DE"/>
           </a:p>
@@ -1767,7 +1771,7 @@
           <a:p>
             <a:fld id="{CF7CD84D-430A-4AA5-9B0E-9CAD50B60C46}" type="datetimeFigureOut">
               <a:rPr lang="de-DE" smtClean="0"/>
-              <a:t>03.05.2017</a:t>
+              <a:t>19.05.2017</a:t>
             </a:fld>
             <a:endParaRPr lang="de-DE"/>
           </a:p>
@@ -1862,7 +1866,7 @@
           <a:p>
             <a:fld id="{CF7CD84D-430A-4AA5-9B0E-9CAD50B60C46}" type="datetimeFigureOut">
               <a:rPr lang="de-DE" smtClean="0"/>
-              <a:t>03.05.2017</a:t>
+              <a:t>19.05.2017</a:t>
             </a:fld>
             <a:endParaRPr lang="de-DE"/>
           </a:p>
@@ -2139,7 +2143,7 @@
           <a:p>
             <a:fld id="{CF7CD84D-430A-4AA5-9B0E-9CAD50B60C46}" type="datetimeFigureOut">
               <a:rPr lang="de-DE" smtClean="0"/>
-              <a:t>03.05.2017</a:t>
+              <a:t>19.05.2017</a:t>
             </a:fld>
             <a:endParaRPr lang="de-DE"/>
           </a:p>
@@ -2396,7 +2400,7 @@
           <a:p>
             <a:fld id="{CF7CD84D-430A-4AA5-9B0E-9CAD50B60C46}" type="datetimeFigureOut">
               <a:rPr lang="de-DE" smtClean="0"/>
-              <a:t>03.05.2017</a:t>
+              <a:t>19.05.2017</a:t>
             </a:fld>
             <a:endParaRPr lang="de-DE"/>
           </a:p>
@@ -2609,7 +2613,7 @@
           <a:p>
             <a:fld id="{CF7CD84D-430A-4AA5-9B0E-9CAD50B60C46}" type="datetimeFigureOut">
               <a:rPr lang="de-DE" smtClean="0"/>
-              <a:t>03.05.2017</a:t>
+              <a:t>19.05.2017</a:t>
             </a:fld>
             <a:endParaRPr lang="de-DE"/>
           </a:p>
@@ -5837,6 +5841,954 @@
     <p:extLst>
       <p:ext uri="{BB962C8B-B14F-4D97-AF65-F5344CB8AC3E}">
         <p14:creationId xmlns:p14="http://schemas.microsoft.com/office/powerpoint/2010/main" val="2685574373"/>
+      </p:ext>
+    </p:extLst>
+  </p:cSld>
+  <p:clrMapOvr>
+    <a:masterClrMapping/>
+  </p:clrMapOvr>
+</p:sld>
+</file>
+
+<file path=ppt/slides/slide15.xml><?xml version="1.0" encoding="utf-8"?>
+<p:sld xmlns:a="http://schemas.openxmlformats.org/drawingml/2006/main" xmlns:r="http://schemas.openxmlformats.org/officeDocument/2006/relationships" xmlns:p="http://schemas.openxmlformats.org/presentationml/2006/main">
+  <p:cSld>
+    <p:spTree>
+      <p:nvGrpSpPr>
+        <p:cNvPr id="1" name=""/>
+        <p:cNvGrpSpPr/>
+        <p:nvPr/>
+      </p:nvGrpSpPr>
+      <p:grpSpPr>
+        <a:xfrm>
+          <a:off x="0" y="0"/>
+          <a:ext cx="0" cy="0"/>
+          <a:chOff x="0" y="0"/>
+          <a:chExt cx="0" cy="0"/>
+        </a:xfrm>
+      </p:grpSpPr>
+      <p:sp>
+        <p:nvSpPr>
+          <p:cNvPr id="4" name="Rechteck 3"/>
+          <p:cNvSpPr/>
+          <p:nvPr/>
+        </p:nvSpPr>
+        <p:spPr>
+          <a:xfrm>
+            <a:off x="899881" y="2699881"/>
+            <a:ext cx="9000000" cy="1800000"/>
+          </a:xfrm>
+          <a:prstGeom prst="rect">
+            <a:avLst/>
+          </a:prstGeom>
+          <a:solidFill>
+            <a:schemeClr val="tx1"/>
+          </a:solidFill>
+          <a:ln>
+            <a:noFill/>
+          </a:ln>
+        </p:spPr>
+        <p:style>
+          <a:lnRef idx="2">
+            <a:schemeClr val="accent1">
+              <a:shade val="50000"/>
+            </a:schemeClr>
+          </a:lnRef>
+          <a:fillRef idx="1">
+            <a:schemeClr val="accent1"/>
+          </a:fillRef>
+          <a:effectRef idx="0">
+            <a:schemeClr val="accent1"/>
+          </a:effectRef>
+          <a:fontRef idx="minor">
+            <a:schemeClr val="lt1"/>
+          </a:fontRef>
+        </p:style>
+        <p:txBody>
+          <a:bodyPr rtlCol="0" anchor="ctr"/>
+          <a:lstStyle/>
+          <a:p>
+            <a:pPr algn="ctr"/>
+            <a:endParaRPr lang="de-DE"/>
+          </a:p>
+        </p:txBody>
+      </p:sp>
+      <p:sp>
+        <p:nvSpPr>
+          <p:cNvPr id="5" name="Rechteck 4"/>
+          <p:cNvSpPr/>
+          <p:nvPr/>
+        </p:nvSpPr>
+        <p:spPr>
+          <a:xfrm>
+            <a:off x="899881" y="4499881"/>
+            <a:ext cx="9000000" cy="1800000"/>
+          </a:xfrm>
+          <a:prstGeom prst="rect">
+            <a:avLst/>
+          </a:prstGeom>
+          <a:solidFill>
+            <a:srgbClr val="C00000"/>
+          </a:solidFill>
+          <a:ln>
+            <a:noFill/>
+          </a:ln>
+        </p:spPr>
+        <p:style>
+          <a:lnRef idx="2">
+            <a:schemeClr val="accent1">
+              <a:shade val="50000"/>
+            </a:schemeClr>
+          </a:lnRef>
+          <a:fillRef idx="1">
+            <a:schemeClr val="accent1"/>
+          </a:fillRef>
+          <a:effectRef idx="0">
+            <a:schemeClr val="accent1"/>
+          </a:effectRef>
+          <a:fontRef idx="minor">
+            <a:schemeClr val="lt1"/>
+          </a:fontRef>
+        </p:style>
+        <p:txBody>
+          <a:bodyPr rtlCol="0" anchor="ctr"/>
+          <a:lstStyle/>
+          <a:p>
+            <a:pPr algn="ctr"/>
+            <a:endParaRPr lang="de-DE"/>
+          </a:p>
+        </p:txBody>
+      </p:sp>
+      <p:sp>
+        <p:nvSpPr>
+          <p:cNvPr id="6" name="Rechteck 5"/>
+          <p:cNvSpPr/>
+          <p:nvPr/>
+        </p:nvSpPr>
+        <p:spPr>
+          <a:xfrm>
+            <a:off x="899881" y="6299883"/>
+            <a:ext cx="9000000" cy="1800000"/>
+          </a:xfrm>
+          <a:prstGeom prst="rect">
+            <a:avLst/>
+          </a:prstGeom>
+          <a:solidFill>
+            <a:srgbClr val="FFC000"/>
+          </a:solidFill>
+          <a:ln>
+            <a:noFill/>
+          </a:ln>
+        </p:spPr>
+        <p:style>
+          <a:lnRef idx="2">
+            <a:schemeClr val="accent1">
+              <a:shade val="50000"/>
+            </a:schemeClr>
+          </a:lnRef>
+          <a:fillRef idx="1">
+            <a:schemeClr val="accent1"/>
+          </a:fillRef>
+          <a:effectRef idx="0">
+            <a:schemeClr val="accent1"/>
+          </a:effectRef>
+          <a:fontRef idx="minor">
+            <a:schemeClr val="lt1"/>
+          </a:fontRef>
+        </p:style>
+        <p:txBody>
+          <a:bodyPr rtlCol="0" anchor="ctr"/>
+          <a:lstStyle/>
+          <a:p>
+            <a:pPr algn="ctr"/>
+            <a:endParaRPr lang="de-DE"/>
+          </a:p>
+        </p:txBody>
+      </p:sp>
+    </p:spTree>
+    <p:extLst>
+      <p:ext uri="{BB962C8B-B14F-4D97-AF65-F5344CB8AC3E}">
+        <p14:creationId xmlns:p14="http://schemas.microsoft.com/office/powerpoint/2010/main" val="2132650698"/>
+      </p:ext>
+    </p:extLst>
+  </p:cSld>
+  <p:clrMapOvr>
+    <a:masterClrMapping/>
+  </p:clrMapOvr>
+</p:sld>
+</file>
+
+<file path=ppt/slides/slide16.xml><?xml version="1.0" encoding="utf-8"?>
+<p:sld xmlns:a="http://schemas.openxmlformats.org/drawingml/2006/main" xmlns:r="http://schemas.openxmlformats.org/officeDocument/2006/relationships" xmlns:p="http://schemas.openxmlformats.org/presentationml/2006/main">
+  <p:cSld>
+    <p:spTree>
+      <p:nvGrpSpPr>
+        <p:cNvPr id="1" name=""/>
+        <p:cNvGrpSpPr/>
+        <p:nvPr/>
+      </p:nvGrpSpPr>
+      <p:grpSpPr>
+        <a:xfrm>
+          <a:off x="0" y="0"/>
+          <a:ext cx="0" cy="0"/>
+          <a:chOff x="0" y="0"/>
+          <a:chExt cx="0" cy="0"/>
+        </a:xfrm>
+      </p:grpSpPr>
+      <p:sp>
+        <p:nvSpPr>
+          <p:cNvPr id="2" name="Rechteck 1"/>
+          <p:cNvSpPr/>
+          <p:nvPr/>
+        </p:nvSpPr>
+        <p:spPr>
+          <a:xfrm>
+            <a:off x="899880" y="2699880"/>
+            <a:ext cx="9000001" cy="5400001"/>
+          </a:xfrm>
+          <a:prstGeom prst="rect">
+            <a:avLst/>
+          </a:prstGeom>
+          <a:solidFill>
+            <a:srgbClr val="00247D"/>
+          </a:solidFill>
+          <a:ln>
+            <a:noFill/>
+          </a:ln>
+        </p:spPr>
+        <p:style>
+          <a:lnRef idx="2">
+            <a:schemeClr val="accent1">
+              <a:shade val="50000"/>
+            </a:schemeClr>
+          </a:lnRef>
+          <a:fillRef idx="1">
+            <a:schemeClr val="accent1"/>
+          </a:fillRef>
+          <a:effectRef idx="0">
+            <a:schemeClr val="accent1"/>
+          </a:effectRef>
+          <a:fontRef idx="minor">
+            <a:schemeClr val="lt1"/>
+          </a:fontRef>
+        </p:style>
+        <p:txBody>
+          <a:bodyPr rtlCol="0" anchor="ctr"/>
+          <a:lstStyle/>
+          <a:p>
+            <a:pPr algn="ctr"/>
+            <a:endParaRPr lang="de-DE"/>
+          </a:p>
+        </p:txBody>
+      </p:sp>
+      <p:sp>
+        <p:nvSpPr>
+          <p:cNvPr id="8" name="Diagonaler Streifen 7"/>
+          <p:cNvSpPr/>
+          <p:nvPr/>
+        </p:nvSpPr>
+        <p:spPr>
+          <a:xfrm>
+            <a:off x="899881" y="2699881"/>
+            <a:ext cx="9000000" cy="5400000"/>
+          </a:xfrm>
+          <a:prstGeom prst="diagStripe">
+            <a:avLst>
+              <a:gd name="adj" fmla="val 88241"/>
+            </a:avLst>
+          </a:prstGeom>
+          <a:solidFill>
+            <a:schemeClr val="bg1"/>
+          </a:solidFill>
+          <a:ln>
+            <a:noFill/>
+          </a:ln>
+        </p:spPr>
+        <p:style>
+          <a:lnRef idx="2">
+            <a:schemeClr val="accent1">
+              <a:shade val="50000"/>
+            </a:schemeClr>
+          </a:lnRef>
+          <a:fillRef idx="1">
+            <a:schemeClr val="accent1"/>
+          </a:fillRef>
+          <a:effectRef idx="0">
+            <a:schemeClr val="accent1"/>
+          </a:effectRef>
+          <a:fontRef idx="minor">
+            <a:schemeClr val="lt1"/>
+          </a:fontRef>
+        </p:style>
+        <p:txBody>
+          <a:bodyPr rtlCol="0" anchor="ctr"/>
+          <a:lstStyle/>
+          <a:p>
+            <a:pPr algn="ctr"/>
+            <a:endParaRPr lang="de-DE"/>
+          </a:p>
+        </p:txBody>
+      </p:sp>
+      <p:sp>
+        <p:nvSpPr>
+          <p:cNvPr id="9" name="Diagonaler Streifen 8"/>
+          <p:cNvSpPr/>
+          <p:nvPr/>
+        </p:nvSpPr>
+        <p:spPr>
+          <a:xfrm rot="10800000">
+            <a:off x="899882" y="2699881"/>
+            <a:ext cx="9000000" cy="5400000"/>
+          </a:xfrm>
+          <a:prstGeom prst="diagStripe">
+            <a:avLst>
+              <a:gd name="adj" fmla="val 88241"/>
+            </a:avLst>
+          </a:prstGeom>
+          <a:solidFill>
+            <a:schemeClr val="bg1"/>
+          </a:solidFill>
+          <a:ln>
+            <a:noFill/>
+          </a:ln>
+        </p:spPr>
+        <p:style>
+          <a:lnRef idx="2">
+            <a:schemeClr val="accent1">
+              <a:shade val="50000"/>
+            </a:schemeClr>
+          </a:lnRef>
+          <a:fillRef idx="1">
+            <a:schemeClr val="accent1"/>
+          </a:fillRef>
+          <a:effectRef idx="0">
+            <a:schemeClr val="accent1"/>
+          </a:effectRef>
+          <a:fontRef idx="minor">
+            <a:schemeClr val="lt1"/>
+          </a:fontRef>
+        </p:style>
+        <p:txBody>
+          <a:bodyPr rtlCol="0" anchor="ctr"/>
+          <a:lstStyle/>
+          <a:p>
+            <a:pPr algn="ctr"/>
+            <a:endParaRPr lang="de-DE"/>
+          </a:p>
+        </p:txBody>
+      </p:sp>
+      <p:sp>
+        <p:nvSpPr>
+          <p:cNvPr id="10" name="Diagonaler Streifen 9"/>
+          <p:cNvSpPr/>
+          <p:nvPr/>
+        </p:nvSpPr>
+        <p:spPr>
+          <a:xfrm flipH="1">
+            <a:off x="899880" y="2699882"/>
+            <a:ext cx="9000000" cy="5400000"/>
+          </a:xfrm>
+          <a:prstGeom prst="diagStripe">
+            <a:avLst>
+              <a:gd name="adj" fmla="val 88241"/>
+            </a:avLst>
+          </a:prstGeom>
+          <a:solidFill>
+            <a:schemeClr val="bg1"/>
+          </a:solidFill>
+          <a:ln>
+            <a:noFill/>
+          </a:ln>
+        </p:spPr>
+        <p:style>
+          <a:lnRef idx="2">
+            <a:schemeClr val="accent1">
+              <a:shade val="50000"/>
+            </a:schemeClr>
+          </a:lnRef>
+          <a:fillRef idx="1">
+            <a:schemeClr val="accent1"/>
+          </a:fillRef>
+          <a:effectRef idx="0">
+            <a:schemeClr val="accent1"/>
+          </a:effectRef>
+          <a:fontRef idx="minor">
+            <a:schemeClr val="lt1"/>
+          </a:fontRef>
+        </p:style>
+        <p:txBody>
+          <a:bodyPr rtlCol="0" anchor="ctr"/>
+          <a:lstStyle/>
+          <a:p>
+            <a:pPr algn="ctr"/>
+            <a:endParaRPr lang="de-DE"/>
+          </a:p>
+        </p:txBody>
+      </p:sp>
+      <p:sp>
+        <p:nvSpPr>
+          <p:cNvPr id="11" name="Diagonaler Streifen 10"/>
+          <p:cNvSpPr/>
+          <p:nvPr/>
+        </p:nvSpPr>
+        <p:spPr>
+          <a:xfrm rot="10800000" flipH="1">
+            <a:off x="899881" y="2699882"/>
+            <a:ext cx="9000000" cy="5400000"/>
+          </a:xfrm>
+          <a:prstGeom prst="diagStripe">
+            <a:avLst>
+              <a:gd name="adj" fmla="val 88241"/>
+            </a:avLst>
+          </a:prstGeom>
+          <a:solidFill>
+            <a:schemeClr val="bg1"/>
+          </a:solidFill>
+          <a:ln>
+            <a:noFill/>
+          </a:ln>
+        </p:spPr>
+        <p:style>
+          <a:lnRef idx="2">
+            <a:schemeClr val="accent1">
+              <a:shade val="50000"/>
+            </a:schemeClr>
+          </a:lnRef>
+          <a:fillRef idx="1">
+            <a:schemeClr val="accent1"/>
+          </a:fillRef>
+          <a:effectRef idx="0">
+            <a:schemeClr val="accent1"/>
+          </a:effectRef>
+          <a:fontRef idx="minor">
+            <a:schemeClr val="lt1"/>
+          </a:fontRef>
+        </p:style>
+        <p:txBody>
+          <a:bodyPr rtlCol="0" anchor="ctr"/>
+          <a:lstStyle/>
+          <a:p>
+            <a:pPr algn="ctr"/>
+            <a:endParaRPr lang="de-DE"/>
+          </a:p>
+        </p:txBody>
+      </p:sp>
+      <p:sp>
+        <p:nvSpPr>
+          <p:cNvPr id="18" name="Diagonaler Streifen 17"/>
+          <p:cNvSpPr/>
+          <p:nvPr/>
+        </p:nvSpPr>
+        <p:spPr>
+          <a:xfrm rot="10800000" flipH="1">
+            <a:off x="899880" y="2699879"/>
+            <a:ext cx="9000000" cy="5400000"/>
+          </a:xfrm>
+          <a:prstGeom prst="diagStripe">
+            <a:avLst>
+              <a:gd name="adj" fmla="val 91909"/>
+            </a:avLst>
+          </a:prstGeom>
+          <a:gradFill>
+            <a:gsLst>
+              <a:gs pos="49000">
+                <a:schemeClr val="accent1">
+                  <a:lumMod val="5000"/>
+                  <a:lumOff val="95000"/>
+                </a:schemeClr>
+              </a:gs>
+              <a:gs pos="51000">
+                <a:srgbClr val="CF142B"/>
+              </a:gs>
+            </a:gsLst>
+            <a:lin ang="5400000" scaled="1"/>
+          </a:gradFill>
+          <a:ln>
+            <a:noFill/>
+          </a:ln>
+        </p:spPr>
+        <p:style>
+          <a:lnRef idx="2">
+            <a:schemeClr val="accent1">
+              <a:shade val="50000"/>
+            </a:schemeClr>
+          </a:lnRef>
+          <a:fillRef idx="1">
+            <a:schemeClr val="accent1"/>
+          </a:fillRef>
+          <a:effectRef idx="0">
+            <a:schemeClr val="accent1"/>
+          </a:effectRef>
+          <a:fontRef idx="minor">
+            <a:schemeClr val="lt1"/>
+          </a:fontRef>
+        </p:style>
+        <p:txBody>
+          <a:bodyPr rtlCol="0" anchor="ctr"/>
+          <a:lstStyle/>
+          <a:p>
+            <a:pPr algn="ctr"/>
+            <a:endParaRPr lang="de-DE"/>
+          </a:p>
+        </p:txBody>
+      </p:sp>
+      <p:sp>
+        <p:nvSpPr>
+          <p:cNvPr id="19" name="Diagonaler Streifen 18"/>
+          <p:cNvSpPr/>
+          <p:nvPr/>
+        </p:nvSpPr>
+        <p:spPr>
+          <a:xfrm>
+            <a:off x="899880" y="2699880"/>
+            <a:ext cx="9000000" cy="5400000"/>
+          </a:xfrm>
+          <a:prstGeom prst="diagStripe">
+            <a:avLst>
+              <a:gd name="adj" fmla="val 91909"/>
+            </a:avLst>
+          </a:prstGeom>
+          <a:gradFill>
+            <a:gsLst>
+              <a:gs pos="49000">
+                <a:schemeClr val="accent1">
+                  <a:lumMod val="5000"/>
+                  <a:lumOff val="95000"/>
+                </a:schemeClr>
+              </a:gs>
+              <a:gs pos="46000">
+                <a:srgbClr val="CF142B"/>
+              </a:gs>
+            </a:gsLst>
+            <a:lin ang="5400000" scaled="1"/>
+          </a:gradFill>
+          <a:ln>
+            <a:noFill/>
+          </a:ln>
+        </p:spPr>
+        <p:style>
+          <a:lnRef idx="2">
+            <a:schemeClr val="accent1">
+              <a:shade val="50000"/>
+            </a:schemeClr>
+          </a:lnRef>
+          <a:fillRef idx="1">
+            <a:schemeClr val="accent1"/>
+          </a:fillRef>
+          <a:effectRef idx="0">
+            <a:schemeClr val="accent1"/>
+          </a:effectRef>
+          <a:fontRef idx="minor">
+            <a:schemeClr val="lt1"/>
+          </a:fontRef>
+        </p:style>
+        <p:txBody>
+          <a:bodyPr rtlCol="0" anchor="ctr"/>
+          <a:lstStyle/>
+          <a:p>
+            <a:pPr algn="ctr"/>
+            <a:endParaRPr lang="de-DE"/>
+          </a:p>
+        </p:txBody>
+      </p:sp>
+      <p:sp>
+        <p:nvSpPr>
+          <p:cNvPr id="20" name="Diagonaler Streifen 19"/>
+          <p:cNvSpPr/>
+          <p:nvPr/>
+        </p:nvSpPr>
+        <p:spPr>
+          <a:xfrm flipH="1">
+            <a:off x="899877" y="2699875"/>
+            <a:ext cx="9000000" cy="5400000"/>
+          </a:xfrm>
+          <a:prstGeom prst="diagStripe">
+            <a:avLst>
+              <a:gd name="adj" fmla="val 91909"/>
+            </a:avLst>
+          </a:prstGeom>
+          <a:gradFill>
+            <a:gsLst>
+              <a:gs pos="49000">
+                <a:schemeClr val="accent1">
+                  <a:lumMod val="5000"/>
+                  <a:lumOff val="95000"/>
+                </a:schemeClr>
+              </a:gs>
+              <a:gs pos="51000">
+                <a:srgbClr val="CF142B"/>
+              </a:gs>
+            </a:gsLst>
+            <a:lin ang="5400000" scaled="1"/>
+          </a:gradFill>
+          <a:ln>
+            <a:noFill/>
+          </a:ln>
+        </p:spPr>
+        <p:style>
+          <a:lnRef idx="2">
+            <a:schemeClr val="accent1">
+              <a:shade val="50000"/>
+            </a:schemeClr>
+          </a:lnRef>
+          <a:fillRef idx="1">
+            <a:schemeClr val="accent1"/>
+          </a:fillRef>
+          <a:effectRef idx="0">
+            <a:schemeClr val="accent1"/>
+          </a:effectRef>
+          <a:fontRef idx="minor">
+            <a:schemeClr val="lt1"/>
+          </a:fontRef>
+        </p:style>
+        <p:txBody>
+          <a:bodyPr rtlCol="0" anchor="ctr"/>
+          <a:lstStyle/>
+          <a:p>
+            <a:pPr algn="ctr"/>
+            <a:endParaRPr lang="de-DE"/>
+          </a:p>
+        </p:txBody>
+      </p:sp>
+      <p:sp>
+        <p:nvSpPr>
+          <p:cNvPr id="21" name="Diagonaler Streifen 20"/>
+          <p:cNvSpPr/>
+          <p:nvPr/>
+        </p:nvSpPr>
+        <p:spPr>
+          <a:xfrm rot="10800000">
+            <a:off x="899877" y="2699876"/>
+            <a:ext cx="9000000" cy="5400000"/>
+          </a:xfrm>
+          <a:prstGeom prst="diagStripe">
+            <a:avLst>
+              <a:gd name="adj" fmla="val 91909"/>
+            </a:avLst>
+          </a:prstGeom>
+          <a:gradFill>
+            <a:gsLst>
+              <a:gs pos="49000">
+                <a:schemeClr val="accent1">
+                  <a:lumMod val="5000"/>
+                  <a:lumOff val="95000"/>
+                </a:schemeClr>
+              </a:gs>
+              <a:gs pos="46000">
+                <a:srgbClr val="CF142B"/>
+              </a:gs>
+            </a:gsLst>
+            <a:lin ang="5400000" scaled="1"/>
+          </a:gradFill>
+          <a:ln>
+            <a:noFill/>
+          </a:ln>
+        </p:spPr>
+        <p:style>
+          <a:lnRef idx="2">
+            <a:schemeClr val="accent1">
+              <a:shade val="50000"/>
+            </a:schemeClr>
+          </a:lnRef>
+          <a:fillRef idx="1">
+            <a:schemeClr val="accent1"/>
+          </a:fillRef>
+          <a:effectRef idx="0">
+            <a:schemeClr val="accent1"/>
+          </a:effectRef>
+          <a:fontRef idx="minor">
+            <a:schemeClr val="lt1"/>
+          </a:fontRef>
+        </p:style>
+        <p:txBody>
+          <a:bodyPr rtlCol="0" anchor="ctr"/>
+          <a:lstStyle/>
+          <a:p>
+            <a:pPr algn="ctr"/>
+            <a:endParaRPr lang="de-DE"/>
+          </a:p>
+        </p:txBody>
+      </p:sp>
+      <p:sp>
+        <p:nvSpPr>
+          <p:cNvPr id="13" name="Rechteck 12"/>
+          <p:cNvSpPr/>
+          <p:nvPr/>
+        </p:nvSpPr>
+        <p:spPr>
+          <a:xfrm>
+            <a:off x="899880" y="5927883"/>
+            <a:ext cx="9000000" cy="276995"/>
+          </a:xfrm>
+          <a:prstGeom prst="rect">
+            <a:avLst/>
+          </a:prstGeom>
+          <a:solidFill>
+            <a:schemeClr val="bg1"/>
+          </a:solidFill>
+          <a:ln>
+            <a:noFill/>
+          </a:ln>
+        </p:spPr>
+        <p:style>
+          <a:lnRef idx="2">
+            <a:schemeClr val="accent1">
+              <a:shade val="50000"/>
+            </a:schemeClr>
+          </a:lnRef>
+          <a:fillRef idx="1">
+            <a:schemeClr val="accent1"/>
+          </a:fillRef>
+          <a:effectRef idx="0">
+            <a:schemeClr val="accent1"/>
+          </a:effectRef>
+          <a:fontRef idx="minor">
+            <a:schemeClr val="lt1"/>
+          </a:fontRef>
+        </p:style>
+        <p:txBody>
+          <a:bodyPr rtlCol="0" anchor="ctr"/>
+          <a:lstStyle/>
+          <a:p>
+            <a:pPr algn="ctr"/>
+            <a:endParaRPr lang="de-DE"/>
+          </a:p>
+        </p:txBody>
+      </p:sp>
+      <p:sp>
+        <p:nvSpPr>
+          <p:cNvPr id="14" name="Rechteck 13"/>
+          <p:cNvSpPr/>
+          <p:nvPr/>
+        </p:nvSpPr>
+        <p:spPr>
+          <a:xfrm>
+            <a:off x="899877" y="4594640"/>
+            <a:ext cx="9000000" cy="276995"/>
+          </a:xfrm>
+          <a:prstGeom prst="rect">
+            <a:avLst/>
+          </a:prstGeom>
+          <a:solidFill>
+            <a:schemeClr val="bg1"/>
+          </a:solidFill>
+          <a:ln>
+            <a:noFill/>
+          </a:ln>
+        </p:spPr>
+        <p:style>
+          <a:lnRef idx="2">
+            <a:schemeClr val="accent1">
+              <a:shade val="50000"/>
+            </a:schemeClr>
+          </a:lnRef>
+          <a:fillRef idx="1">
+            <a:schemeClr val="accent1"/>
+          </a:fillRef>
+          <a:effectRef idx="0">
+            <a:schemeClr val="accent1"/>
+          </a:effectRef>
+          <a:fontRef idx="minor">
+            <a:schemeClr val="lt1"/>
+          </a:fontRef>
+        </p:style>
+        <p:txBody>
+          <a:bodyPr rtlCol="0" anchor="ctr"/>
+          <a:lstStyle/>
+          <a:p>
+            <a:pPr algn="ctr"/>
+            <a:endParaRPr lang="de-DE"/>
+          </a:p>
+        </p:txBody>
+      </p:sp>
+      <p:sp>
+        <p:nvSpPr>
+          <p:cNvPr id="7" name="Rechteck 6"/>
+          <p:cNvSpPr/>
+          <p:nvPr/>
+        </p:nvSpPr>
+        <p:spPr>
+          <a:xfrm rot="5400000">
+            <a:off x="2699881" y="4871641"/>
+            <a:ext cx="5400000" cy="1056481"/>
+          </a:xfrm>
+          <a:prstGeom prst="rect">
+            <a:avLst/>
+          </a:prstGeom>
+          <a:solidFill>
+            <a:srgbClr val="CF142B"/>
+          </a:solidFill>
+          <a:ln>
+            <a:noFill/>
+          </a:ln>
+        </p:spPr>
+        <p:style>
+          <a:lnRef idx="2">
+            <a:schemeClr val="accent1">
+              <a:shade val="50000"/>
+            </a:schemeClr>
+          </a:lnRef>
+          <a:fillRef idx="1">
+            <a:schemeClr val="accent1"/>
+          </a:fillRef>
+          <a:effectRef idx="0">
+            <a:schemeClr val="accent1"/>
+          </a:effectRef>
+          <a:fontRef idx="minor">
+            <a:schemeClr val="lt1"/>
+          </a:fontRef>
+        </p:style>
+        <p:txBody>
+          <a:bodyPr rtlCol="0" anchor="ctr"/>
+          <a:lstStyle/>
+          <a:p>
+            <a:pPr algn="ctr"/>
+            <a:endParaRPr lang="de-DE"/>
+          </a:p>
+        </p:txBody>
+      </p:sp>
+      <p:sp>
+        <p:nvSpPr>
+          <p:cNvPr id="22" name="Rechteck 21"/>
+          <p:cNvSpPr/>
+          <p:nvPr/>
+        </p:nvSpPr>
+        <p:spPr>
+          <a:xfrm rot="5400000">
+            <a:off x="3366722" y="5261275"/>
+            <a:ext cx="5400000" cy="277200"/>
+          </a:xfrm>
+          <a:prstGeom prst="rect">
+            <a:avLst/>
+          </a:prstGeom>
+          <a:solidFill>
+            <a:schemeClr val="bg1"/>
+          </a:solidFill>
+          <a:ln>
+            <a:noFill/>
+          </a:ln>
+        </p:spPr>
+        <p:style>
+          <a:lnRef idx="2">
+            <a:schemeClr val="accent1">
+              <a:shade val="50000"/>
+            </a:schemeClr>
+          </a:lnRef>
+          <a:fillRef idx="1">
+            <a:schemeClr val="accent1"/>
+          </a:fillRef>
+          <a:effectRef idx="0">
+            <a:schemeClr val="accent1"/>
+          </a:effectRef>
+          <a:fontRef idx="minor">
+            <a:schemeClr val="lt1"/>
+          </a:fontRef>
+        </p:style>
+        <p:txBody>
+          <a:bodyPr rtlCol="0" anchor="ctr"/>
+          <a:lstStyle/>
+          <a:p>
+            <a:pPr algn="ctr"/>
+            <a:endParaRPr lang="de-DE"/>
+          </a:p>
+        </p:txBody>
+      </p:sp>
+      <p:sp>
+        <p:nvSpPr>
+          <p:cNvPr id="23" name="Rechteck 22"/>
+          <p:cNvSpPr/>
+          <p:nvPr/>
+        </p:nvSpPr>
+        <p:spPr>
+          <a:xfrm rot="5400000">
+            <a:off x="2128561" y="5261269"/>
+            <a:ext cx="5400000" cy="277200"/>
+          </a:xfrm>
+          <a:prstGeom prst="rect">
+            <a:avLst/>
+          </a:prstGeom>
+          <a:solidFill>
+            <a:schemeClr val="bg1"/>
+          </a:solidFill>
+          <a:ln>
+            <a:noFill/>
+          </a:ln>
+        </p:spPr>
+        <p:style>
+          <a:lnRef idx="2">
+            <a:schemeClr val="accent1">
+              <a:shade val="50000"/>
+            </a:schemeClr>
+          </a:lnRef>
+          <a:fillRef idx="1">
+            <a:schemeClr val="accent1"/>
+          </a:fillRef>
+          <a:effectRef idx="0">
+            <a:schemeClr val="accent1"/>
+          </a:effectRef>
+          <a:fontRef idx="minor">
+            <a:schemeClr val="lt1"/>
+          </a:fontRef>
+        </p:style>
+        <p:txBody>
+          <a:bodyPr rtlCol="0" anchor="ctr"/>
+          <a:lstStyle/>
+          <a:p>
+            <a:pPr algn="ctr"/>
+            <a:endParaRPr lang="de-DE"/>
+          </a:p>
+        </p:txBody>
+      </p:sp>
+      <p:sp>
+        <p:nvSpPr>
+          <p:cNvPr id="5" name="Rechteck 4"/>
+          <p:cNvSpPr/>
+          <p:nvPr/>
+        </p:nvSpPr>
+        <p:spPr>
+          <a:xfrm>
+            <a:off x="899881" y="4871641"/>
+            <a:ext cx="9000000" cy="1056481"/>
+          </a:xfrm>
+          <a:prstGeom prst="rect">
+            <a:avLst/>
+          </a:prstGeom>
+          <a:solidFill>
+            <a:srgbClr val="CF142B"/>
+          </a:solidFill>
+          <a:ln>
+            <a:noFill/>
+          </a:ln>
+        </p:spPr>
+        <p:style>
+          <a:lnRef idx="2">
+            <a:schemeClr val="accent1">
+              <a:shade val="50000"/>
+            </a:schemeClr>
+          </a:lnRef>
+          <a:fillRef idx="1">
+            <a:schemeClr val="accent1"/>
+          </a:fillRef>
+          <a:effectRef idx="0">
+            <a:schemeClr val="accent1"/>
+          </a:effectRef>
+          <a:fontRef idx="minor">
+            <a:schemeClr val="lt1"/>
+          </a:fontRef>
+        </p:style>
+        <p:txBody>
+          <a:bodyPr rtlCol="0" anchor="ctr"/>
+          <a:lstStyle/>
+          <a:p>
+            <a:pPr algn="ctr"/>
+            <a:endParaRPr lang="de-DE"/>
+          </a:p>
+        </p:txBody>
+      </p:sp>
+    </p:spTree>
+    <p:extLst>
+      <p:ext uri="{BB962C8B-B14F-4D97-AF65-F5344CB8AC3E}">
+        <p14:creationId xmlns:p14="http://schemas.microsoft.com/office/powerpoint/2010/main" val="2514809845"/>
       </p:ext>
     </p:extLst>
   </p:cSld>

</xml_diff>

<commit_message>
Added HTML export with search function
</commit_message>
<xml_diff>
--- a/Symbols.pptx
+++ b/Symbols.pptx
@@ -15,12 +15,13 @@
     <p:sldId id="268" r:id="rId9"/>
     <p:sldId id="280" r:id="rId10"/>
     <p:sldId id="272" r:id="rId11"/>
-    <p:sldId id="273" r:id="rId12"/>
-    <p:sldId id="274" r:id="rId13"/>
-    <p:sldId id="276" r:id="rId14"/>
-    <p:sldId id="282" r:id="rId15"/>
-    <p:sldId id="284" r:id="rId16"/>
-    <p:sldId id="285" r:id="rId17"/>
+    <p:sldId id="286" r:id="rId12"/>
+    <p:sldId id="273" r:id="rId13"/>
+    <p:sldId id="274" r:id="rId14"/>
+    <p:sldId id="276" r:id="rId15"/>
+    <p:sldId id="282" r:id="rId16"/>
+    <p:sldId id="284" r:id="rId17"/>
+    <p:sldId id="285" r:id="rId18"/>
   </p:sldIdLst>
   <p:sldSz cx="10799763" cy="10799763"/>
   <p:notesSz cx="6858000" cy="9144000"/>
@@ -138,6 +139,7 @@
             <p14:sldId id="268"/>
             <p14:sldId id="280"/>
             <p14:sldId id="272"/>
+            <p14:sldId id="286"/>
             <p14:sldId id="273"/>
             <p14:sldId id="274"/>
             <p14:sldId id="276"/>
@@ -290,7 +292,7 @@
           <a:p>
             <a:fld id="{CF7CD84D-430A-4AA5-9B0E-9CAD50B60C46}" type="datetimeFigureOut">
               <a:rPr lang="de-DE" smtClean="0"/>
-              <a:t>19.05.2017</a:t>
+              <a:t>03.06.2017</a:t>
             </a:fld>
             <a:endParaRPr lang="de-DE"/>
           </a:p>
@@ -460,7 +462,7 @@
           <a:p>
             <a:fld id="{CF7CD84D-430A-4AA5-9B0E-9CAD50B60C46}" type="datetimeFigureOut">
               <a:rPr lang="de-DE" smtClean="0"/>
-              <a:t>19.05.2017</a:t>
+              <a:t>03.06.2017</a:t>
             </a:fld>
             <a:endParaRPr lang="de-DE"/>
           </a:p>
@@ -640,7 +642,7 @@
           <a:p>
             <a:fld id="{CF7CD84D-430A-4AA5-9B0E-9CAD50B60C46}" type="datetimeFigureOut">
               <a:rPr lang="de-DE" smtClean="0"/>
-              <a:t>19.05.2017</a:t>
+              <a:t>03.06.2017</a:t>
             </a:fld>
             <a:endParaRPr lang="de-DE"/>
           </a:p>
@@ -810,7 +812,7 @@
           <a:p>
             <a:fld id="{CF7CD84D-430A-4AA5-9B0E-9CAD50B60C46}" type="datetimeFigureOut">
               <a:rPr lang="de-DE" smtClean="0"/>
-              <a:t>19.05.2017</a:t>
+              <a:t>03.06.2017</a:t>
             </a:fld>
             <a:endParaRPr lang="de-DE"/>
           </a:p>
@@ -1054,7 +1056,7 @@
           <a:p>
             <a:fld id="{CF7CD84D-430A-4AA5-9B0E-9CAD50B60C46}" type="datetimeFigureOut">
               <a:rPr lang="de-DE" smtClean="0"/>
-              <a:t>19.05.2017</a:t>
+              <a:t>03.06.2017</a:t>
             </a:fld>
             <a:endParaRPr lang="de-DE"/>
           </a:p>
@@ -1286,7 +1288,7 @@
           <a:p>
             <a:fld id="{CF7CD84D-430A-4AA5-9B0E-9CAD50B60C46}" type="datetimeFigureOut">
               <a:rPr lang="de-DE" smtClean="0"/>
-              <a:t>19.05.2017</a:t>
+              <a:t>03.06.2017</a:t>
             </a:fld>
             <a:endParaRPr lang="de-DE"/>
           </a:p>
@@ -1653,7 +1655,7 @@
           <a:p>
             <a:fld id="{CF7CD84D-430A-4AA5-9B0E-9CAD50B60C46}" type="datetimeFigureOut">
               <a:rPr lang="de-DE" smtClean="0"/>
-              <a:t>19.05.2017</a:t>
+              <a:t>03.06.2017</a:t>
             </a:fld>
             <a:endParaRPr lang="de-DE"/>
           </a:p>
@@ -1771,7 +1773,7 @@
           <a:p>
             <a:fld id="{CF7CD84D-430A-4AA5-9B0E-9CAD50B60C46}" type="datetimeFigureOut">
               <a:rPr lang="de-DE" smtClean="0"/>
-              <a:t>19.05.2017</a:t>
+              <a:t>03.06.2017</a:t>
             </a:fld>
             <a:endParaRPr lang="de-DE"/>
           </a:p>
@@ -1866,7 +1868,7 @@
           <a:p>
             <a:fld id="{CF7CD84D-430A-4AA5-9B0E-9CAD50B60C46}" type="datetimeFigureOut">
               <a:rPr lang="de-DE" smtClean="0"/>
-              <a:t>19.05.2017</a:t>
+              <a:t>03.06.2017</a:t>
             </a:fld>
             <a:endParaRPr lang="de-DE"/>
           </a:p>
@@ -2143,7 +2145,7 @@
           <a:p>
             <a:fld id="{CF7CD84D-430A-4AA5-9B0E-9CAD50B60C46}" type="datetimeFigureOut">
               <a:rPr lang="de-DE" smtClean="0"/>
-              <a:t>19.05.2017</a:t>
+              <a:t>03.06.2017</a:t>
             </a:fld>
             <a:endParaRPr lang="de-DE"/>
           </a:p>
@@ -2400,7 +2402,7 @@
           <a:p>
             <a:fld id="{CF7CD84D-430A-4AA5-9B0E-9CAD50B60C46}" type="datetimeFigureOut">
               <a:rPr lang="de-DE" smtClean="0"/>
-              <a:t>19.05.2017</a:t>
+              <a:t>03.06.2017</a:t>
             </a:fld>
             <a:endParaRPr lang="de-DE"/>
           </a:p>
@@ -2613,7 +2615,7 @@
           <a:p>
             <a:fld id="{CF7CD84D-430A-4AA5-9B0E-9CAD50B60C46}" type="datetimeFigureOut">
               <a:rPr lang="de-DE" smtClean="0"/>
-              <a:t>19.05.2017</a:t>
+              <a:t>03.06.2017</a:t>
             </a:fld>
             <a:endParaRPr lang="de-DE"/>
           </a:p>
@@ -4313,6 +4315,657 @@
           <a:chExt cx="0" cy="0"/>
         </a:xfrm>
       </p:grpSpPr>
+      <p:sp>
+        <p:nvSpPr>
+          <p:cNvPr id="23" name="Rechteck 22"/>
+          <p:cNvSpPr/>
+          <p:nvPr/>
+        </p:nvSpPr>
+        <p:spPr>
+          <a:xfrm>
+            <a:off x="0" y="0"/>
+            <a:ext cx="10799763" cy="10799763"/>
+          </a:xfrm>
+          <a:prstGeom prst="rect">
+            <a:avLst/>
+          </a:prstGeom>
+          <a:noFill/>
+          <a:ln>
+            <a:noFill/>
+          </a:ln>
+        </p:spPr>
+        <p:style>
+          <a:lnRef idx="2">
+            <a:schemeClr val="accent1">
+              <a:shade val="50000"/>
+            </a:schemeClr>
+          </a:lnRef>
+          <a:fillRef idx="1">
+            <a:schemeClr val="accent1"/>
+          </a:fillRef>
+          <a:effectRef idx="0">
+            <a:schemeClr val="accent1"/>
+          </a:effectRef>
+          <a:fontRef idx="minor">
+            <a:schemeClr val="lt1"/>
+          </a:fontRef>
+        </p:style>
+        <p:txBody>
+          <a:bodyPr rtlCol="0" anchor="ctr"/>
+          <a:lstStyle/>
+          <a:p>
+            <a:pPr lvl="0" algn="ctr"/>
+            <a:endParaRPr lang="de-DE" sz="41300" b="1" dirty="0">
+              <a:solidFill>
+                <a:prstClr val="black"/>
+              </a:solidFill>
+            </a:endParaRPr>
+          </a:p>
+        </p:txBody>
+      </p:sp>
+      <p:sp>
+        <p:nvSpPr>
+          <p:cNvPr id="25" name="Rechteck: obere Ecken abgerundet 24"/>
+          <p:cNvSpPr/>
+          <p:nvPr/>
+        </p:nvSpPr>
+        <p:spPr>
+          <a:xfrm>
+            <a:off x="1008856" y="923131"/>
+            <a:ext cx="8782050" cy="8953500"/>
+          </a:xfrm>
+          <a:prstGeom prst="round2SameRect">
+            <a:avLst>
+              <a:gd name="adj1" fmla="val 9292"/>
+              <a:gd name="adj2" fmla="val 0"/>
+            </a:avLst>
+          </a:prstGeom>
+          <a:solidFill>
+            <a:schemeClr val="bg1">
+              <a:lumMod val="85000"/>
+            </a:schemeClr>
+          </a:solidFill>
+          <a:ln>
+            <a:noFill/>
+          </a:ln>
+        </p:spPr>
+        <p:style>
+          <a:lnRef idx="2">
+            <a:schemeClr val="accent1">
+              <a:shade val="50000"/>
+            </a:schemeClr>
+          </a:lnRef>
+          <a:fillRef idx="1">
+            <a:schemeClr val="accent1"/>
+          </a:fillRef>
+          <a:effectRef idx="0">
+            <a:schemeClr val="accent1"/>
+          </a:effectRef>
+          <a:fontRef idx="minor">
+            <a:schemeClr val="lt1"/>
+          </a:fontRef>
+        </p:style>
+        <p:txBody>
+          <a:bodyPr rtlCol="0" anchor="ctr"/>
+          <a:lstStyle/>
+          <a:p>
+            <a:pPr algn="ctr"/>
+            <a:endParaRPr lang="de-DE"/>
+          </a:p>
+        </p:txBody>
+      </p:sp>
+      <p:sp>
+        <p:nvSpPr>
+          <p:cNvPr id="26" name="Rechteck: abgerundete Ecken 25"/>
+          <p:cNvSpPr/>
+          <p:nvPr/>
+        </p:nvSpPr>
+        <p:spPr>
+          <a:xfrm>
+            <a:off x="1619250" y="1409700"/>
+            <a:ext cx="7543800" cy="1123950"/>
+          </a:xfrm>
+          <a:prstGeom prst="roundRect">
+            <a:avLst/>
+          </a:prstGeom>
+          <a:solidFill>
+            <a:schemeClr val="bg1"/>
+          </a:solidFill>
+          <a:ln>
+            <a:noFill/>
+          </a:ln>
+        </p:spPr>
+        <p:style>
+          <a:lnRef idx="2">
+            <a:schemeClr val="accent1">
+              <a:shade val="50000"/>
+            </a:schemeClr>
+          </a:lnRef>
+          <a:fillRef idx="1">
+            <a:schemeClr val="accent1"/>
+          </a:fillRef>
+          <a:effectRef idx="0">
+            <a:schemeClr val="accent1"/>
+          </a:effectRef>
+          <a:fontRef idx="minor">
+            <a:schemeClr val="lt1"/>
+          </a:fontRef>
+        </p:style>
+        <p:txBody>
+          <a:bodyPr rtlCol="0" anchor="ctr"/>
+          <a:lstStyle/>
+          <a:p>
+            <a:r>
+              <a:rPr lang="de-DE" sz="8000" dirty="0">
+                <a:solidFill>
+                  <a:schemeClr val="tx1"/>
+                </a:solidFill>
+              </a:rPr>
+              <a:t>http://</a:t>
+            </a:r>
+          </a:p>
+        </p:txBody>
+      </p:sp>
+      <p:sp>
+        <p:nvSpPr>
+          <p:cNvPr id="27" name="Rechteck: abgerundete Ecken 26"/>
+          <p:cNvSpPr/>
+          <p:nvPr/>
+        </p:nvSpPr>
+        <p:spPr>
+          <a:xfrm>
+            <a:off x="1619250" y="3048000"/>
+            <a:ext cx="7543800" cy="6362700"/>
+          </a:xfrm>
+          <a:prstGeom prst="roundRect">
+            <a:avLst>
+              <a:gd name="adj" fmla="val 4990"/>
+            </a:avLst>
+          </a:prstGeom>
+          <a:solidFill>
+            <a:schemeClr val="bg1"/>
+          </a:solidFill>
+          <a:ln>
+            <a:noFill/>
+          </a:ln>
+        </p:spPr>
+        <p:style>
+          <a:lnRef idx="2">
+            <a:schemeClr val="accent1">
+              <a:shade val="50000"/>
+            </a:schemeClr>
+          </a:lnRef>
+          <a:fillRef idx="1">
+            <a:schemeClr val="accent1"/>
+          </a:fillRef>
+          <a:effectRef idx="0">
+            <a:schemeClr val="accent1"/>
+          </a:effectRef>
+          <a:fontRef idx="minor">
+            <a:schemeClr val="lt1"/>
+          </a:fontRef>
+        </p:style>
+        <p:txBody>
+          <a:bodyPr rtlCol="0" anchor="ctr"/>
+          <a:lstStyle/>
+          <a:p>
+            <a:pPr algn="ctr"/>
+            <a:endParaRPr lang="de-DE"/>
+          </a:p>
+        </p:txBody>
+      </p:sp>
+      <p:grpSp>
+        <p:nvGrpSpPr>
+          <p:cNvPr id="6" name="Gruppieren 5"/>
+          <p:cNvGrpSpPr>
+            <a:grpSpLocks noChangeAspect="1"/>
+          </p:cNvGrpSpPr>
+          <p:nvPr/>
+        </p:nvGrpSpPr>
+        <p:grpSpPr>
+          <a:xfrm>
+            <a:off x="2961821" y="3183612"/>
+            <a:ext cx="4858658" cy="6693019"/>
+            <a:chOff x="1638300" y="508708"/>
+            <a:chExt cx="7172573" cy="9880541"/>
+          </a:xfrm>
+        </p:grpSpPr>
+        <p:sp>
+          <p:nvSpPr>
+            <p:cNvPr id="7" name="Ellipse 6"/>
+            <p:cNvSpPr/>
+            <p:nvPr/>
+          </p:nvSpPr>
+          <p:spPr>
+            <a:xfrm>
+              <a:off x="1638300" y="1295400"/>
+              <a:ext cx="5562600" cy="5562600"/>
+            </a:xfrm>
+            <a:prstGeom prst="ellipse">
+              <a:avLst/>
+            </a:prstGeom>
+            <a:solidFill>
+              <a:schemeClr val="bg1"/>
+            </a:solidFill>
+          </p:spPr>
+          <p:style>
+            <a:lnRef idx="2">
+              <a:schemeClr val="accent1">
+                <a:shade val="50000"/>
+              </a:schemeClr>
+            </a:lnRef>
+            <a:fillRef idx="1">
+              <a:schemeClr val="accent1"/>
+            </a:fillRef>
+            <a:effectRef idx="0">
+              <a:schemeClr val="accent1"/>
+            </a:effectRef>
+            <a:fontRef idx="minor">
+              <a:schemeClr val="lt1"/>
+            </a:fontRef>
+          </p:style>
+          <p:txBody>
+            <a:bodyPr rtlCol="0" anchor="ctr"/>
+            <a:lstStyle/>
+            <a:p>
+              <a:pPr algn="ctr"/>
+              <a:endParaRPr lang="de-DE"/>
+            </a:p>
+          </p:txBody>
+        </p:sp>
+        <p:sp>
+          <p:nvSpPr>
+            <p:cNvPr id="8" name="Freihandform: Form 8"/>
+            <p:cNvSpPr>
+              <a:spLocks noChangeAspect="1"/>
+            </p:cNvSpPr>
+            <p:nvPr/>
+          </p:nvSpPr>
+          <p:spPr>
+            <a:xfrm rot="19048065">
+              <a:off x="2510873" y="508708"/>
+              <a:ext cx="6300000" cy="9880541"/>
+            </a:xfrm>
+            <a:custGeom>
+              <a:avLst/>
+              <a:gdLst>
+                <a:gd name="connsiteX0" fmla="*/ 2575659 w 6300000"/>
+                <a:gd name="connsiteY0" fmla="*/ 1422341 h 9880541"/>
+                <a:gd name="connsiteX1" fmla="*/ 1775556 w 6300000"/>
+                <a:gd name="connsiteY1" fmla="*/ 3136841 h 9880541"/>
+                <a:gd name="connsiteX2" fmla="*/ 2575660 w 6300000"/>
+                <a:gd name="connsiteY2" fmla="*/ 4851341 h 9880541"/>
+                <a:gd name="connsiteX3" fmla="*/ 2575659 w 6300000"/>
+                <a:gd name="connsiteY3" fmla="*/ 4851341 h 9880541"/>
+                <a:gd name="connsiteX4" fmla="*/ 1165959 w 6300000"/>
+                <a:gd name="connsiteY4" fmla="*/ 3136841 h 9880541"/>
+                <a:gd name="connsiteX5" fmla="*/ 2575659 w 6300000"/>
+                <a:gd name="connsiteY5" fmla="*/ 1422341 h 9880541"/>
+                <a:gd name="connsiteX6" fmla="*/ 3150000 w 6300000"/>
+                <a:gd name="connsiteY6" fmla="*/ 565299 h 9880541"/>
+                <a:gd name="connsiteX7" fmla="*/ 565299 w 6300000"/>
+                <a:gd name="connsiteY7" fmla="*/ 3150000 h 9880541"/>
+                <a:gd name="connsiteX8" fmla="*/ 2885730 w 6300000"/>
+                <a:gd name="connsiteY8" fmla="*/ 5721357 h 9880541"/>
+                <a:gd name="connsiteX9" fmla="*/ 3076216 w 6300000"/>
+                <a:gd name="connsiteY9" fmla="*/ 5730975 h 9880541"/>
+                <a:gd name="connsiteX10" fmla="*/ 3092731 w 6300000"/>
+                <a:gd name="connsiteY10" fmla="*/ 5727641 h 9880541"/>
+                <a:gd name="connsiteX11" fmla="*/ 3282048 w 6300000"/>
+                <a:gd name="connsiteY11" fmla="*/ 5727641 h 9880541"/>
+                <a:gd name="connsiteX12" fmla="*/ 3283602 w 6300000"/>
+                <a:gd name="connsiteY12" fmla="*/ 5727955 h 9880541"/>
+                <a:gd name="connsiteX13" fmla="*/ 3414271 w 6300000"/>
+                <a:gd name="connsiteY13" fmla="*/ 5721357 h 9880541"/>
+                <a:gd name="connsiteX14" fmla="*/ 5734701 w 6300000"/>
+                <a:gd name="connsiteY14" fmla="*/ 3150000 h 9880541"/>
+                <a:gd name="connsiteX15" fmla="*/ 3150000 w 6300000"/>
+                <a:gd name="connsiteY15" fmla="*/ 565299 h 9880541"/>
+                <a:gd name="connsiteX16" fmla="*/ 3150000 w 6300000"/>
+                <a:gd name="connsiteY16" fmla="*/ 0 h 9880541"/>
+                <a:gd name="connsiteX17" fmla="*/ 6300000 w 6300000"/>
+                <a:gd name="connsiteY17" fmla="*/ 3150000 h 9880541"/>
+                <a:gd name="connsiteX18" fmla="*/ 3784835 w 6300000"/>
+                <a:gd name="connsiteY18" fmla="*/ 6236003 h 9880541"/>
+                <a:gd name="connsiteX19" fmla="*/ 3528159 w 6300000"/>
+                <a:gd name="connsiteY19" fmla="*/ 6275177 h 9880541"/>
+                <a:gd name="connsiteX20" fmla="*/ 3528159 w 6300000"/>
+                <a:gd name="connsiteY20" fmla="*/ 6727634 h 9880541"/>
+                <a:gd name="connsiteX21" fmla="*/ 3549739 w 6300000"/>
+                <a:gd name="connsiteY21" fmla="*/ 6729810 h 9880541"/>
+                <a:gd name="connsiteX22" fmla="*/ 4004409 w 6300000"/>
+                <a:gd name="connsiteY22" fmla="*/ 7287671 h 9880541"/>
+                <a:gd name="connsiteX23" fmla="*/ 4004409 w 6300000"/>
+                <a:gd name="connsiteY23" fmla="*/ 9311111 h 9880541"/>
+                <a:gd name="connsiteX24" fmla="*/ 3434979 w 6300000"/>
+                <a:gd name="connsiteY24" fmla="*/ 9880541 h 9880541"/>
+                <a:gd name="connsiteX25" fmla="*/ 2996950 w 6300000"/>
+                <a:gd name="connsiteY25" fmla="*/ 9880541 h 9880541"/>
+                <a:gd name="connsiteX26" fmla="*/ 2427520 w 6300000"/>
+                <a:gd name="connsiteY26" fmla="*/ 9311111 h 9880541"/>
+                <a:gd name="connsiteX27" fmla="*/ 2427520 w 6300000"/>
+                <a:gd name="connsiteY27" fmla="*/ 7287671 h 9880541"/>
+                <a:gd name="connsiteX28" fmla="*/ 2775302 w 6300000"/>
+                <a:gd name="connsiteY28" fmla="*/ 6762990 h 9880541"/>
+                <a:gd name="connsiteX29" fmla="*/ 2846620 w 6300000"/>
+                <a:gd name="connsiteY29" fmla="*/ 6740851 h 9880541"/>
+                <a:gd name="connsiteX30" fmla="*/ 2846620 w 6300000"/>
+                <a:gd name="connsiteY30" fmla="*/ 6284681 h 9880541"/>
+                <a:gd name="connsiteX31" fmla="*/ 2827931 w 6300000"/>
+                <a:gd name="connsiteY31" fmla="*/ 6283737 h 9880541"/>
+                <a:gd name="connsiteX32" fmla="*/ 0 w 6300000"/>
+                <a:gd name="connsiteY32" fmla="*/ 3150000 h 9880541"/>
+                <a:gd name="connsiteX33" fmla="*/ 3150000 w 6300000"/>
+                <a:gd name="connsiteY33" fmla="*/ 0 h 9880541"/>
+              </a:gdLst>
+              <a:ahLst/>
+              <a:cxnLst>
+                <a:cxn ang="0">
+                  <a:pos x="connsiteX0" y="connsiteY0"/>
+                </a:cxn>
+                <a:cxn ang="0">
+                  <a:pos x="connsiteX1" y="connsiteY1"/>
+                </a:cxn>
+                <a:cxn ang="0">
+                  <a:pos x="connsiteX2" y="connsiteY2"/>
+                </a:cxn>
+                <a:cxn ang="0">
+                  <a:pos x="connsiteX3" y="connsiteY3"/>
+                </a:cxn>
+                <a:cxn ang="0">
+                  <a:pos x="connsiteX4" y="connsiteY4"/>
+                </a:cxn>
+                <a:cxn ang="0">
+                  <a:pos x="connsiteX5" y="connsiteY5"/>
+                </a:cxn>
+                <a:cxn ang="0">
+                  <a:pos x="connsiteX6" y="connsiteY6"/>
+                </a:cxn>
+                <a:cxn ang="0">
+                  <a:pos x="connsiteX7" y="connsiteY7"/>
+                </a:cxn>
+                <a:cxn ang="0">
+                  <a:pos x="connsiteX8" y="connsiteY8"/>
+                </a:cxn>
+                <a:cxn ang="0">
+                  <a:pos x="connsiteX9" y="connsiteY9"/>
+                </a:cxn>
+                <a:cxn ang="0">
+                  <a:pos x="connsiteX10" y="connsiteY10"/>
+                </a:cxn>
+                <a:cxn ang="0">
+                  <a:pos x="connsiteX11" y="connsiteY11"/>
+                </a:cxn>
+                <a:cxn ang="0">
+                  <a:pos x="connsiteX12" y="connsiteY12"/>
+                </a:cxn>
+                <a:cxn ang="0">
+                  <a:pos x="connsiteX13" y="connsiteY13"/>
+                </a:cxn>
+                <a:cxn ang="0">
+                  <a:pos x="connsiteX14" y="connsiteY14"/>
+                </a:cxn>
+                <a:cxn ang="0">
+                  <a:pos x="connsiteX15" y="connsiteY15"/>
+                </a:cxn>
+                <a:cxn ang="0">
+                  <a:pos x="connsiteX16" y="connsiteY16"/>
+                </a:cxn>
+                <a:cxn ang="0">
+                  <a:pos x="connsiteX17" y="connsiteY17"/>
+                </a:cxn>
+                <a:cxn ang="0">
+                  <a:pos x="connsiteX18" y="connsiteY18"/>
+                </a:cxn>
+                <a:cxn ang="0">
+                  <a:pos x="connsiteX19" y="connsiteY19"/>
+                </a:cxn>
+                <a:cxn ang="0">
+                  <a:pos x="connsiteX20" y="connsiteY20"/>
+                </a:cxn>
+                <a:cxn ang="0">
+                  <a:pos x="connsiteX21" y="connsiteY21"/>
+                </a:cxn>
+                <a:cxn ang="0">
+                  <a:pos x="connsiteX22" y="connsiteY22"/>
+                </a:cxn>
+                <a:cxn ang="0">
+                  <a:pos x="connsiteX23" y="connsiteY23"/>
+                </a:cxn>
+                <a:cxn ang="0">
+                  <a:pos x="connsiteX24" y="connsiteY24"/>
+                </a:cxn>
+                <a:cxn ang="0">
+                  <a:pos x="connsiteX25" y="connsiteY25"/>
+                </a:cxn>
+                <a:cxn ang="0">
+                  <a:pos x="connsiteX26" y="connsiteY26"/>
+                </a:cxn>
+                <a:cxn ang="0">
+                  <a:pos x="connsiteX27" y="connsiteY27"/>
+                </a:cxn>
+                <a:cxn ang="0">
+                  <a:pos x="connsiteX28" y="connsiteY28"/>
+                </a:cxn>
+                <a:cxn ang="0">
+                  <a:pos x="connsiteX29" y="connsiteY29"/>
+                </a:cxn>
+                <a:cxn ang="0">
+                  <a:pos x="connsiteX30" y="connsiteY30"/>
+                </a:cxn>
+                <a:cxn ang="0">
+                  <a:pos x="connsiteX31" y="connsiteY31"/>
+                </a:cxn>
+                <a:cxn ang="0">
+                  <a:pos x="connsiteX32" y="connsiteY32"/>
+                </a:cxn>
+                <a:cxn ang="0">
+                  <a:pos x="connsiteX33" y="connsiteY33"/>
+                </a:cxn>
+              </a:cxnLst>
+              <a:rect l="l" t="t" r="r" b="b"/>
+              <a:pathLst>
+                <a:path w="6300000" h="9880541">
+                  <a:moveTo>
+                    <a:pt x="2575659" y="1422341"/>
+                  </a:moveTo>
+                  <a:cubicBezTo>
+                    <a:pt x="2079434" y="1782740"/>
+                    <a:pt x="1775556" y="2433905"/>
+                    <a:pt x="1775556" y="3136841"/>
+                  </a:cubicBezTo>
+                  <a:cubicBezTo>
+                    <a:pt x="1775556" y="3839777"/>
+                    <a:pt x="2079435" y="4490943"/>
+                    <a:pt x="2575660" y="4851341"/>
+                  </a:cubicBezTo>
+                  <a:lnTo>
+                    <a:pt x="2575659" y="4851341"/>
+                  </a:lnTo>
+                  <a:cubicBezTo>
+                    <a:pt x="1797103" y="4851341"/>
+                    <a:pt x="1165959" y="4083733"/>
+                    <a:pt x="1165959" y="3136841"/>
+                  </a:cubicBezTo>
+                  <a:cubicBezTo>
+                    <a:pt x="1165959" y="2189950"/>
+                    <a:pt x="1797103" y="1422341"/>
+                    <a:pt x="2575659" y="1422341"/>
+                  </a:cubicBezTo>
+                  <a:close/>
+                  <a:moveTo>
+                    <a:pt x="3150000" y="565299"/>
+                  </a:moveTo>
+                  <a:cubicBezTo>
+                    <a:pt x="1722509" y="565299"/>
+                    <a:pt x="565299" y="1722509"/>
+                    <a:pt x="565299" y="3150000"/>
+                  </a:cubicBezTo>
+                  <a:cubicBezTo>
+                    <a:pt x="565299" y="4488273"/>
+                    <a:pt x="1582378" y="5588994"/>
+                    <a:pt x="2885730" y="5721357"/>
+                  </a:cubicBezTo>
+                  <a:lnTo>
+                    <a:pt x="3076216" y="5730975"/>
+                  </a:lnTo>
+                  <a:lnTo>
+                    <a:pt x="3092731" y="5727641"/>
+                  </a:lnTo>
+                  <a:lnTo>
+                    <a:pt x="3282048" y="5727641"/>
+                  </a:lnTo>
+                  <a:lnTo>
+                    <a:pt x="3283602" y="5727955"/>
+                  </a:lnTo>
+                  <a:lnTo>
+                    <a:pt x="3414271" y="5721357"/>
+                  </a:lnTo>
+                  <a:cubicBezTo>
+                    <a:pt x="4717622" y="5588994"/>
+                    <a:pt x="5734701" y="4488273"/>
+                    <a:pt x="5734701" y="3150000"/>
+                  </a:cubicBezTo>
+                  <a:cubicBezTo>
+                    <a:pt x="5734701" y="1722509"/>
+                    <a:pt x="4577491" y="565299"/>
+                    <a:pt x="3150000" y="565299"/>
+                  </a:cubicBezTo>
+                  <a:close/>
+                  <a:moveTo>
+                    <a:pt x="3150000" y="0"/>
+                  </a:moveTo>
+                  <a:cubicBezTo>
+                    <a:pt x="4889697" y="0"/>
+                    <a:pt x="6300000" y="1410303"/>
+                    <a:pt x="6300000" y="3150000"/>
+                  </a:cubicBezTo>
+                  <a:cubicBezTo>
+                    <a:pt x="6300000" y="4672235"/>
+                    <a:pt x="5220237" y="5942278"/>
+                    <a:pt x="3784835" y="6236003"/>
+                  </a:cubicBezTo>
+                  <a:lnTo>
+                    <a:pt x="3528159" y="6275177"/>
+                  </a:lnTo>
+                  <a:lnTo>
+                    <a:pt x="3528159" y="6727634"/>
+                  </a:lnTo>
+                  <a:lnTo>
+                    <a:pt x="3549739" y="6729810"/>
+                  </a:lnTo>
+                  <a:cubicBezTo>
+                    <a:pt x="3809219" y="6782907"/>
+                    <a:pt x="4004409" y="7012494"/>
+                    <a:pt x="4004409" y="7287671"/>
+                  </a:cubicBezTo>
+                  <a:lnTo>
+                    <a:pt x="4004409" y="9311111"/>
+                  </a:lnTo>
+                  <a:cubicBezTo>
+                    <a:pt x="4004409" y="9625599"/>
+                    <a:pt x="3749467" y="9880541"/>
+                    <a:pt x="3434979" y="9880541"/>
+                  </a:cubicBezTo>
+                  <a:lnTo>
+                    <a:pt x="2996950" y="9880541"/>
+                  </a:lnTo>
+                  <a:cubicBezTo>
+                    <a:pt x="2682462" y="9880541"/>
+                    <a:pt x="2427520" y="9625599"/>
+                    <a:pt x="2427520" y="9311111"/>
+                  </a:cubicBezTo>
+                  <a:lnTo>
+                    <a:pt x="2427520" y="7287671"/>
+                  </a:lnTo>
+                  <a:cubicBezTo>
+                    <a:pt x="2427520" y="7051805"/>
+                    <a:pt x="2570925" y="6849434"/>
+                    <a:pt x="2775302" y="6762990"/>
+                  </a:cubicBezTo>
+                  <a:lnTo>
+                    <a:pt x="2846620" y="6740851"/>
+                  </a:lnTo>
+                  <a:lnTo>
+                    <a:pt x="2846620" y="6284681"/>
+                  </a:lnTo>
+                  <a:lnTo>
+                    <a:pt x="2827931" y="6283737"/>
+                  </a:lnTo>
+                  <a:cubicBezTo>
+                    <a:pt x="1239524" y="6122426"/>
+                    <a:pt x="0" y="4780966"/>
+                    <a:pt x="0" y="3150000"/>
+                  </a:cubicBezTo>
+                  <a:cubicBezTo>
+                    <a:pt x="0" y="1410303"/>
+                    <a:pt x="1410303" y="0"/>
+                    <a:pt x="3150000" y="0"/>
+                  </a:cubicBezTo>
+                  <a:close/>
+                </a:path>
+              </a:pathLst>
+            </a:custGeom>
+            <a:solidFill>
+              <a:srgbClr val="0070C0"/>
+            </a:solidFill>
+          </p:spPr>
+          <p:style>
+            <a:lnRef idx="2">
+              <a:schemeClr val="accent1">
+                <a:shade val="50000"/>
+              </a:schemeClr>
+            </a:lnRef>
+            <a:fillRef idx="1">
+              <a:schemeClr val="accent1"/>
+            </a:fillRef>
+            <a:effectRef idx="0">
+              <a:schemeClr val="accent1"/>
+            </a:effectRef>
+            <a:fontRef idx="minor">
+              <a:schemeClr val="lt1"/>
+            </a:fontRef>
+          </p:style>
+          <p:txBody>
+            <a:bodyPr rtlCol="0" anchor="ctr"/>
+            <a:lstStyle/>
+            <a:p>
+              <a:pPr algn="ctr"/>
+              <a:endParaRPr lang="de-DE"/>
+            </a:p>
+          </p:txBody>
+        </p:sp>
+      </p:grpSp>
+    </p:spTree>
+    <p:extLst>
+      <p:ext uri="{BB962C8B-B14F-4D97-AF65-F5344CB8AC3E}">
+        <p14:creationId xmlns:p14="http://schemas.microsoft.com/office/powerpoint/2010/main" val="3070520396"/>
+      </p:ext>
+    </p:extLst>
+  </p:cSld>
+  <p:clrMapOvr>
+    <a:masterClrMapping/>
+  </p:clrMapOvr>
+</p:sld>
+</file>
+
+<file path=ppt/slides/slide12.xml><?xml version="1.0" encoding="utf-8"?>
+<p:sld xmlns:a="http://schemas.openxmlformats.org/drawingml/2006/main" xmlns:r="http://schemas.openxmlformats.org/officeDocument/2006/relationships" xmlns:p="http://schemas.openxmlformats.org/presentationml/2006/main">
+  <p:cSld>
+    <p:spTree>
+      <p:nvGrpSpPr>
+        <p:cNvPr id="1" name=""/>
+        <p:cNvGrpSpPr/>
+        <p:nvPr/>
+      </p:nvGrpSpPr>
+      <p:grpSpPr>
+        <a:xfrm>
+          <a:off x="0" y="0"/>
+          <a:ext cx="0" cy="0"/>
+          <a:chOff x="0" y="0"/>
+          <a:chExt cx="0" cy="0"/>
+        </a:xfrm>
+      </p:grpSpPr>
       <p:grpSp>
         <p:nvGrpSpPr>
           <p:cNvPr id="2" name="Gruppieren 1"/>
@@ -4670,7 +5323,7 @@
 </p:sld>
 </file>
 
-<file path=ppt/slides/slide12.xml><?xml version="1.0" encoding="utf-8"?>
+<file path=ppt/slides/slide13.xml><?xml version="1.0" encoding="utf-8"?>
 <p:sld xmlns:a="http://schemas.openxmlformats.org/drawingml/2006/main" xmlns:r="http://schemas.openxmlformats.org/officeDocument/2006/relationships" xmlns:p="http://schemas.openxmlformats.org/presentationml/2006/main">
   <p:cSld>
     <p:spTree>
@@ -5168,7 +5821,7 @@
 </p:sld>
 </file>
 
-<file path=ppt/slides/slide13.xml><?xml version="1.0" encoding="utf-8"?>
+<file path=ppt/slides/slide14.xml><?xml version="1.0" encoding="utf-8"?>
 <p:sld xmlns:a="http://schemas.openxmlformats.org/drawingml/2006/main" xmlns:r="http://schemas.openxmlformats.org/officeDocument/2006/relationships" xmlns:p="http://schemas.openxmlformats.org/presentationml/2006/main">
   <p:cSld>
     <p:spTree>
@@ -5724,7 +6377,7 @@
 </p:sld>
 </file>
 
-<file path=ppt/slides/slide14.xml><?xml version="1.0" encoding="utf-8"?>
+<file path=ppt/slides/slide15.xml><?xml version="1.0" encoding="utf-8"?>
 <p:sld xmlns:a="http://schemas.openxmlformats.org/drawingml/2006/main" xmlns:r="http://schemas.openxmlformats.org/officeDocument/2006/relationships" xmlns:p="http://schemas.openxmlformats.org/presentationml/2006/main">
   <p:cSld>
     <p:spTree>
@@ -5850,7 +6503,7 @@
 </p:sld>
 </file>
 
-<file path=ppt/slides/slide15.xml><?xml version="1.0" encoding="utf-8"?>
+<file path=ppt/slides/slide16.xml><?xml version="1.0" encoding="utf-8"?>
 <p:sld xmlns:a="http://schemas.openxmlformats.org/drawingml/2006/main" xmlns:r="http://schemas.openxmlformats.org/officeDocument/2006/relationships" xmlns:p="http://schemas.openxmlformats.org/presentationml/2006/main">
   <p:cSld>
     <p:spTree>
@@ -6018,7 +6671,7 @@
 </p:sld>
 </file>
 
-<file path=ppt/slides/slide16.xml><?xml version="1.0" encoding="utf-8"?>
+<file path=ppt/slides/slide17.xml><?xml version="1.0" encoding="utf-8"?>
 <p:sld xmlns:a="http://schemas.openxmlformats.org/drawingml/2006/main" xmlns:r="http://schemas.openxmlformats.org/officeDocument/2006/relationships" xmlns:p="http://schemas.openxmlformats.org/presentationml/2006/main">
   <p:cSld>
     <p:spTree>

</xml_diff>

<commit_message>
(Big) 0.7 update - new path editor
Easier and better than ever before :sun_with_face:
</commit_message>
<xml_diff>
--- a/Symbols.pptx
+++ b/Symbols.pptx
@@ -14,14 +14,15 @@
     <p:sldId id="267" r:id="rId8"/>
     <p:sldId id="268" r:id="rId9"/>
     <p:sldId id="280" r:id="rId10"/>
-    <p:sldId id="272" r:id="rId11"/>
-    <p:sldId id="286" r:id="rId12"/>
-    <p:sldId id="273" r:id="rId13"/>
-    <p:sldId id="274" r:id="rId14"/>
-    <p:sldId id="276" r:id="rId15"/>
-    <p:sldId id="282" r:id="rId16"/>
-    <p:sldId id="284" r:id="rId17"/>
-    <p:sldId id="285" r:id="rId18"/>
+    <p:sldId id="288" r:id="rId11"/>
+    <p:sldId id="272" r:id="rId12"/>
+    <p:sldId id="286" r:id="rId13"/>
+    <p:sldId id="273" r:id="rId14"/>
+    <p:sldId id="274" r:id="rId15"/>
+    <p:sldId id="276" r:id="rId16"/>
+    <p:sldId id="282" r:id="rId17"/>
+    <p:sldId id="284" r:id="rId18"/>
+    <p:sldId id="285" r:id="rId19"/>
   </p:sldIdLst>
   <p:sldSz cx="10799763" cy="10799763"/>
   <p:notesSz cx="6858000" cy="9144000"/>
@@ -138,6 +139,7 @@
             <p14:sldId id="267"/>
             <p14:sldId id="268"/>
             <p14:sldId id="280"/>
+            <p14:sldId id="288"/>
             <p14:sldId id="272"/>
             <p14:sldId id="286"/>
             <p14:sldId id="273"/>
@@ -292,7 +294,7 @@
           <a:p>
             <a:fld id="{CF7CD84D-430A-4AA5-9B0E-9CAD50B60C46}" type="datetimeFigureOut">
               <a:rPr lang="de-DE" smtClean="0"/>
-              <a:t>03.06.2017</a:t>
+              <a:t>05.06.2017</a:t>
             </a:fld>
             <a:endParaRPr lang="de-DE"/>
           </a:p>
@@ -462,7 +464,7 @@
           <a:p>
             <a:fld id="{CF7CD84D-430A-4AA5-9B0E-9CAD50B60C46}" type="datetimeFigureOut">
               <a:rPr lang="de-DE" smtClean="0"/>
-              <a:t>03.06.2017</a:t>
+              <a:t>05.06.2017</a:t>
             </a:fld>
             <a:endParaRPr lang="de-DE"/>
           </a:p>
@@ -642,7 +644,7 @@
           <a:p>
             <a:fld id="{CF7CD84D-430A-4AA5-9B0E-9CAD50B60C46}" type="datetimeFigureOut">
               <a:rPr lang="de-DE" smtClean="0"/>
-              <a:t>03.06.2017</a:t>
+              <a:t>05.06.2017</a:t>
             </a:fld>
             <a:endParaRPr lang="de-DE"/>
           </a:p>
@@ -812,7 +814,7 @@
           <a:p>
             <a:fld id="{CF7CD84D-430A-4AA5-9B0E-9CAD50B60C46}" type="datetimeFigureOut">
               <a:rPr lang="de-DE" smtClean="0"/>
-              <a:t>03.06.2017</a:t>
+              <a:t>05.06.2017</a:t>
             </a:fld>
             <a:endParaRPr lang="de-DE"/>
           </a:p>
@@ -1056,7 +1058,7 @@
           <a:p>
             <a:fld id="{CF7CD84D-430A-4AA5-9B0E-9CAD50B60C46}" type="datetimeFigureOut">
               <a:rPr lang="de-DE" smtClean="0"/>
-              <a:t>03.06.2017</a:t>
+              <a:t>05.06.2017</a:t>
             </a:fld>
             <a:endParaRPr lang="de-DE"/>
           </a:p>
@@ -1288,7 +1290,7 @@
           <a:p>
             <a:fld id="{CF7CD84D-430A-4AA5-9B0E-9CAD50B60C46}" type="datetimeFigureOut">
               <a:rPr lang="de-DE" smtClean="0"/>
-              <a:t>03.06.2017</a:t>
+              <a:t>05.06.2017</a:t>
             </a:fld>
             <a:endParaRPr lang="de-DE"/>
           </a:p>
@@ -1655,7 +1657,7 @@
           <a:p>
             <a:fld id="{CF7CD84D-430A-4AA5-9B0E-9CAD50B60C46}" type="datetimeFigureOut">
               <a:rPr lang="de-DE" smtClean="0"/>
-              <a:t>03.06.2017</a:t>
+              <a:t>05.06.2017</a:t>
             </a:fld>
             <a:endParaRPr lang="de-DE"/>
           </a:p>
@@ -1773,7 +1775,7 @@
           <a:p>
             <a:fld id="{CF7CD84D-430A-4AA5-9B0E-9CAD50B60C46}" type="datetimeFigureOut">
               <a:rPr lang="de-DE" smtClean="0"/>
-              <a:t>03.06.2017</a:t>
+              <a:t>05.06.2017</a:t>
             </a:fld>
             <a:endParaRPr lang="de-DE"/>
           </a:p>
@@ -1868,7 +1870,7 @@
           <a:p>
             <a:fld id="{CF7CD84D-430A-4AA5-9B0E-9CAD50B60C46}" type="datetimeFigureOut">
               <a:rPr lang="de-DE" smtClean="0"/>
-              <a:t>03.06.2017</a:t>
+              <a:t>05.06.2017</a:t>
             </a:fld>
             <a:endParaRPr lang="de-DE"/>
           </a:p>
@@ -2145,7 +2147,7 @@
           <a:p>
             <a:fld id="{CF7CD84D-430A-4AA5-9B0E-9CAD50B60C46}" type="datetimeFigureOut">
               <a:rPr lang="de-DE" smtClean="0"/>
-              <a:t>03.06.2017</a:t>
+              <a:t>05.06.2017</a:t>
             </a:fld>
             <a:endParaRPr lang="de-DE"/>
           </a:p>
@@ -2402,7 +2404,7 @@
           <a:p>
             <a:fld id="{CF7CD84D-430A-4AA5-9B0E-9CAD50B60C46}" type="datetimeFigureOut">
               <a:rPr lang="de-DE" smtClean="0"/>
-              <a:t>03.06.2017</a:t>
+              <a:t>05.06.2017</a:t>
             </a:fld>
             <a:endParaRPr lang="de-DE"/>
           </a:p>
@@ -2615,7 +2617,7 @@
           <a:p>
             <a:fld id="{CF7CD84D-430A-4AA5-9B0E-9CAD50B60C46}" type="datetimeFigureOut">
               <a:rPr lang="de-DE" smtClean="0"/>
-              <a:t>03.06.2017</a:t>
+              <a:t>05.06.2017</a:t>
             </a:fld>
             <a:endParaRPr lang="de-DE"/>
           </a:p>
@@ -4088,6 +4090,182 @@
       </p:grpSpPr>
       <p:sp>
         <p:nvSpPr>
+          <p:cNvPr id="3" name="Rechteck 2"/>
+          <p:cNvSpPr/>
+          <p:nvPr/>
+        </p:nvSpPr>
+        <p:spPr>
+          <a:xfrm>
+            <a:off x="0" y="0"/>
+            <a:ext cx="10799763" cy="10799763"/>
+          </a:xfrm>
+          <a:prstGeom prst="rect">
+            <a:avLst/>
+          </a:prstGeom>
+          <a:noFill/>
+          <a:ln>
+            <a:noFill/>
+          </a:ln>
+        </p:spPr>
+        <p:style>
+          <a:lnRef idx="2">
+            <a:schemeClr val="accent1">
+              <a:shade val="50000"/>
+            </a:schemeClr>
+          </a:lnRef>
+          <a:fillRef idx="1">
+            <a:schemeClr val="accent1"/>
+          </a:fillRef>
+          <a:effectRef idx="0">
+            <a:schemeClr val="accent1"/>
+          </a:effectRef>
+          <a:fontRef idx="minor">
+            <a:schemeClr val="lt1"/>
+          </a:fontRef>
+        </p:style>
+        <p:txBody>
+          <a:bodyPr rtlCol="0" anchor="ctr"/>
+          <a:lstStyle/>
+          <a:p>
+            <a:pPr algn="ctr"/>
+            <a:endParaRPr lang="de-DE"/>
+          </a:p>
+        </p:txBody>
+      </p:sp>
+      <p:sp>
+        <p:nvSpPr>
+          <p:cNvPr id="2" name="Ellipse 1"/>
+          <p:cNvSpPr/>
+          <p:nvPr/>
+        </p:nvSpPr>
+        <p:spPr>
+          <a:xfrm>
+            <a:off x="899881" y="899881"/>
+            <a:ext cx="9000000" cy="9000000"/>
+          </a:xfrm>
+          <a:prstGeom prst="ellipse">
+            <a:avLst/>
+          </a:prstGeom>
+          <a:solidFill>
+            <a:srgbClr val="0070C0"/>
+          </a:solidFill>
+          <a:ln>
+            <a:noFill/>
+          </a:ln>
+        </p:spPr>
+        <p:style>
+          <a:lnRef idx="2">
+            <a:schemeClr val="accent1">
+              <a:shade val="50000"/>
+            </a:schemeClr>
+          </a:lnRef>
+          <a:fillRef idx="1">
+            <a:schemeClr val="accent1"/>
+          </a:fillRef>
+          <a:effectRef idx="0">
+            <a:schemeClr val="accent1"/>
+          </a:effectRef>
+          <a:fontRef idx="minor">
+            <a:schemeClr val="lt1"/>
+          </a:fontRef>
+        </p:style>
+        <p:txBody>
+          <a:bodyPr rtlCol="0" anchor="ctr"/>
+          <a:lstStyle/>
+          <a:p>
+            <a:pPr algn="ctr"/>
+            <a:endParaRPr lang="de-DE" sz="13800" b="1" dirty="0"/>
+          </a:p>
+        </p:txBody>
+      </p:sp>
+      <p:sp>
+        <p:nvSpPr>
+          <p:cNvPr id="4" name="Gebogener Pfeil 3"/>
+          <p:cNvSpPr/>
+          <p:nvPr/>
+        </p:nvSpPr>
+        <p:spPr>
+          <a:xfrm>
+            <a:off x="899881" y="899881"/>
+            <a:ext cx="9000000" cy="9000000"/>
+          </a:xfrm>
+          <a:prstGeom prst="circularArrow">
+            <a:avLst>
+              <a:gd name="adj1" fmla="val 12032"/>
+              <a:gd name="adj2" fmla="val 2111964"/>
+              <a:gd name="adj3" fmla="val 19077580"/>
+              <a:gd name="adj4" fmla="val 1106756"/>
+              <a:gd name="adj5" fmla="val 17715"/>
+            </a:avLst>
+          </a:prstGeom>
+          <a:solidFill>
+            <a:schemeClr val="bg1"/>
+          </a:solidFill>
+          <a:ln>
+            <a:noFill/>
+          </a:ln>
+        </p:spPr>
+        <p:style>
+          <a:lnRef idx="2">
+            <a:schemeClr val="accent1">
+              <a:shade val="50000"/>
+            </a:schemeClr>
+          </a:lnRef>
+          <a:fillRef idx="1">
+            <a:schemeClr val="accent1"/>
+          </a:fillRef>
+          <a:effectRef idx="0">
+            <a:schemeClr val="accent1"/>
+          </a:effectRef>
+          <a:fontRef idx="minor">
+            <a:schemeClr val="lt1"/>
+          </a:fontRef>
+        </p:style>
+        <p:txBody>
+          <a:bodyPr rtlCol="0" anchor="ctr"/>
+          <a:lstStyle/>
+          <a:p>
+            <a:pPr algn="ctr"/>
+            <a:endParaRPr lang="de-DE">
+              <a:solidFill>
+                <a:schemeClr val="tx1"/>
+              </a:solidFill>
+            </a:endParaRPr>
+          </a:p>
+        </p:txBody>
+      </p:sp>
+    </p:spTree>
+    <p:extLst>
+      <p:ext uri="{BB962C8B-B14F-4D97-AF65-F5344CB8AC3E}">
+        <p14:creationId xmlns:p14="http://schemas.microsoft.com/office/powerpoint/2010/main" val="374369478"/>
+      </p:ext>
+    </p:extLst>
+  </p:cSld>
+  <p:clrMapOvr>
+    <a:masterClrMapping/>
+  </p:clrMapOvr>
+</p:sld>
+</file>
+
+<file path=ppt/slides/slide11.xml><?xml version="1.0" encoding="utf-8"?>
+<p:sld xmlns:a="http://schemas.openxmlformats.org/drawingml/2006/main" xmlns:r="http://schemas.openxmlformats.org/officeDocument/2006/relationships" xmlns:p="http://schemas.openxmlformats.org/presentationml/2006/main">
+  <p:cSld>
+    <p:spTree>
+      <p:nvGrpSpPr>
+        <p:cNvPr id="1" name=""/>
+        <p:cNvGrpSpPr/>
+        <p:nvPr/>
+      </p:nvGrpSpPr>
+      <p:grpSpPr>
+        <a:xfrm>
+          <a:off x="0" y="0"/>
+          <a:ext cx="0" cy="0"/>
+          <a:chOff x="0" y="0"/>
+          <a:chExt cx="0" cy="0"/>
+        </a:xfrm>
+      </p:grpSpPr>
+      <p:sp>
+        <p:nvSpPr>
           <p:cNvPr id="23" name="Rechteck 22"/>
           <p:cNvSpPr/>
           <p:nvPr/>
@@ -4298,7 +4476,7 @@
 </p:sld>
 </file>
 
-<file path=ppt/slides/slide11.xml><?xml version="1.0" encoding="utf-8"?>
+<file path=ppt/slides/slide12.xml><?xml version="1.0" encoding="utf-8"?>
 <p:sld xmlns:a="http://schemas.openxmlformats.org/drawingml/2006/main" xmlns:r="http://schemas.openxmlformats.org/officeDocument/2006/relationships" xmlns:p="http://schemas.openxmlformats.org/presentationml/2006/main">
   <p:cSld>
     <p:spTree>
@@ -4949,7 +5127,7 @@
 </p:sld>
 </file>
 
-<file path=ppt/slides/slide12.xml><?xml version="1.0" encoding="utf-8"?>
+<file path=ppt/slides/slide13.xml><?xml version="1.0" encoding="utf-8"?>
 <p:sld xmlns:a="http://schemas.openxmlformats.org/drawingml/2006/main" xmlns:r="http://schemas.openxmlformats.org/officeDocument/2006/relationships" xmlns:p="http://schemas.openxmlformats.org/presentationml/2006/main">
   <p:cSld>
     <p:spTree>
@@ -5323,7 +5501,7 @@
 </p:sld>
 </file>
 
-<file path=ppt/slides/slide13.xml><?xml version="1.0" encoding="utf-8"?>
+<file path=ppt/slides/slide14.xml><?xml version="1.0" encoding="utf-8"?>
 <p:sld xmlns:a="http://schemas.openxmlformats.org/drawingml/2006/main" xmlns:r="http://schemas.openxmlformats.org/officeDocument/2006/relationships" xmlns:p="http://schemas.openxmlformats.org/presentationml/2006/main">
   <p:cSld>
     <p:spTree>
@@ -5821,7 +5999,7 @@
 </p:sld>
 </file>
 
-<file path=ppt/slides/slide14.xml><?xml version="1.0" encoding="utf-8"?>
+<file path=ppt/slides/slide15.xml><?xml version="1.0" encoding="utf-8"?>
 <p:sld xmlns:a="http://schemas.openxmlformats.org/drawingml/2006/main" xmlns:r="http://schemas.openxmlformats.org/officeDocument/2006/relationships" xmlns:p="http://schemas.openxmlformats.org/presentationml/2006/main">
   <p:cSld>
     <p:spTree>
@@ -6377,7 +6555,7 @@
 </p:sld>
 </file>
 
-<file path=ppt/slides/slide15.xml><?xml version="1.0" encoding="utf-8"?>
+<file path=ppt/slides/slide16.xml><?xml version="1.0" encoding="utf-8"?>
 <p:sld xmlns:a="http://schemas.openxmlformats.org/drawingml/2006/main" xmlns:r="http://schemas.openxmlformats.org/officeDocument/2006/relationships" xmlns:p="http://schemas.openxmlformats.org/presentationml/2006/main">
   <p:cSld>
     <p:spTree>
@@ -6503,7 +6681,7 @@
 </p:sld>
 </file>
 
-<file path=ppt/slides/slide16.xml><?xml version="1.0" encoding="utf-8"?>
+<file path=ppt/slides/slide17.xml><?xml version="1.0" encoding="utf-8"?>
 <p:sld xmlns:a="http://schemas.openxmlformats.org/drawingml/2006/main" xmlns:r="http://schemas.openxmlformats.org/officeDocument/2006/relationships" xmlns:p="http://schemas.openxmlformats.org/presentationml/2006/main">
   <p:cSld>
     <p:spTree>
@@ -6671,7 +6849,7 @@
 </p:sld>
 </file>
 
-<file path=ppt/slides/slide17.xml><?xml version="1.0" encoding="utf-8"?>
+<file path=ppt/slides/slide18.xml><?xml version="1.0" encoding="utf-8"?>
 <p:sld xmlns:a="http://schemas.openxmlformats.org/drawingml/2006/main" xmlns:r="http://schemas.openxmlformats.org/officeDocument/2006/relationships" xmlns:p="http://schemas.openxmlformats.org/presentationml/2006/main">
   <p:cSld>
     <p:spTree>

</xml_diff>

<commit_message>
Probably fixed some file scan bug
and many more... unbelievable how much doesn't work... like the automatic row sorter... but why...
New function find wrong formatted files + less wait time because of less re-scans and more small things
</commit_message>
<xml_diff>
--- a/Symbols.pptx
+++ b/Symbols.pptx
@@ -14,15 +14,16 @@
     <p:sldId id="267" r:id="rId8"/>
     <p:sldId id="268" r:id="rId9"/>
     <p:sldId id="280" r:id="rId10"/>
-    <p:sldId id="288" r:id="rId11"/>
-    <p:sldId id="272" r:id="rId12"/>
-    <p:sldId id="286" r:id="rId13"/>
-    <p:sldId id="273" r:id="rId14"/>
-    <p:sldId id="274" r:id="rId15"/>
-    <p:sldId id="276" r:id="rId16"/>
-    <p:sldId id="282" r:id="rId17"/>
-    <p:sldId id="284" r:id="rId18"/>
-    <p:sldId id="285" r:id="rId19"/>
+    <p:sldId id="289" r:id="rId11"/>
+    <p:sldId id="288" r:id="rId12"/>
+    <p:sldId id="272" r:id="rId13"/>
+    <p:sldId id="286" r:id="rId14"/>
+    <p:sldId id="273" r:id="rId15"/>
+    <p:sldId id="274" r:id="rId16"/>
+    <p:sldId id="276" r:id="rId17"/>
+    <p:sldId id="282" r:id="rId18"/>
+    <p:sldId id="284" r:id="rId19"/>
+    <p:sldId id="285" r:id="rId20"/>
   </p:sldIdLst>
   <p:sldSz cx="10799763" cy="10799763"/>
   <p:notesSz cx="6858000" cy="9144000"/>
@@ -139,6 +140,7 @@
             <p14:sldId id="267"/>
             <p14:sldId id="268"/>
             <p14:sldId id="280"/>
+            <p14:sldId id="289"/>
             <p14:sldId id="288"/>
             <p14:sldId id="272"/>
             <p14:sldId id="286"/>
@@ -294,7 +296,7 @@
           <a:p>
             <a:fld id="{CF7CD84D-430A-4AA5-9B0E-9CAD50B60C46}" type="datetimeFigureOut">
               <a:rPr lang="de-DE" smtClean="0"/>
-              <a:t>05.06.2017</a:t>
+              <a:t>06.06.2017</a:t>
             </a:fld>
             <a:endParaRPr lang="de-DE"/>
           </a:p>
@@ -464,7 +466,7 @@
           <a:p>
             <a:fld id="{CF7CD84D-430A-4AA5-9B0E-9CAD50B60C46}" type="datetimeFigureOut">
               <a:rPr lang="de-DE" smtClean="0"/>
-              <a:t>05.06.2017</a:t>
+              <a:t>06.06.2017</a:t>
             </a:fld>
             <a:endParaRPr lang="de-DE"/>
           </a:p>
@@ -644,7 +646,7 @@
           <a:p>
             <a:fld id="{CF7CD84D-430A-4AA5-9B0E-9CAD50B60C46}" type="datetimeFigureOut">
               <a:rPr lang="de-DE" smtClean="0"/>
-              <a:t>05.06.2017</a:t>
+              <a:t>06.06.2017</a:t>
             </a:fld>
             <a:endParaRPr lang="de-DE"/>
           </a:p>
@@ -814,7 +816,7 @@
           <a:p>
             <a:fld id="{CF7CD84D-430A-4AA5-9B0E-9CAD50B60C46}" type="datetimeFigureOut">
               <a:rPr lang="de-DE" smtClean="0"/>
-              <a:t>05.06.2017</a:t>
+              <a:t>06.06.2017</a:t>
             </a:fld>
             <a:endParaRPr lang="de-DE"/>
           </a:p>
@@ -1058,7 +1060,7 @@
           <a:p>
             <a:fld id="{CF7CD84D-430A-4AA5-9B0E-9CAD50B60C46}" type="datetimeFigureOut">
               <a:rPr lang="de-DE" smtClean="0"/>
-              <a:t>05.06.2017</a:t>
+              <a:t>06.06.2017</a:t>
             </a:fld>
             <a:endParaRPr lang="de-DE"/>
           </a:p>
@@ -1290,7 +1292,7 @@
           <a:p>
             <a:fld id="{CF7CD84D-430A-4AA5-9B0E-9CAD50B60C46}" type="datetimeFigureOut">
               <a:rPr lang="de-DE" smtClean="0"/>
-              <a:t>05.06.2017</a:t>
+              <a:t>06.06.2017</a:t>
             </a:fld>
             <a:endParaRPr lang="de-DE"/>
           </a:p>
@@ -1657,7 +1659,7 @@
           <a:p>
             <a:fld id="{CF7CD84D-430A-4AA5-9B0E-9CAD50B60C46}" type="datetimeFigureOut">
               <a:rPr lang="de-DE" smtClean="0"/>
-              <a:t>05.06.2017</a:t>
+              <a:t>06.06.2017</a:t>
             </a:fld>
             <a:endParaRPr lang="de-DE"/>
           </a:p>
@@ -1775,7 +1777,7 @@
           <a:p>
             <a:fld id="{CF7CD84D-430A-4AA5-9B0E-9CAD50B60C46}" type="datetimeFigureOut">
               <a:rPr lang="de-DE" smtClean="0"/>
-              <a:t>05.06.2017</a:t>
+              <a:t>06.06.2017</a:t>
             </a:fld>
             <a:endParaRPr lang="de-DE"/>
           </a:p>
@@ -1870,7 +1872,7 @@
           <a:p>
             <a:fld id="{CF7CD84D-430A-4AA5-9B0E-9CAD50B60C46}" type="datetimeFigureOut">
               <a:rPr lang="de-DE" smtClean="0"/>
-              <a:t>05.06.2017</a:t>
+              <a:t>06.06.2017</a:t>
             </a:fld>
             <a:endParaRPr lang="de-DE"/>
           </a:p>
@@ -2147,7 +2149,7 @@
           <a:p>
             <a:fld id="{CF7CD84D-430A-4AA5-9B0E-9CAD50B60C46}" type="datetimeFigureOut">
               <a:rPr lang="de-DE" smtClean="0"/>
-              <a:t>05.06.2017</a:t>
+              <a:t>06.06.2017</a:t>
             </a:fld>
             <a:endParaRPr lang="de-DE"/>
           </a:p>
@@ -2404,7 +2406,7 @@
           <a:p>
             <a:fld id="{CF7CD84D-430A-4AA5-9B0E-9CAD50B60C46}" type="datetimeFigureOut">
               <a:rPr lang="de-DE" smtClean="0"/>
-              <a:t>05.06.2017</a:t>
+              <a:t>06.06.2017</a:t>
             </a:fld>
             <a:endParaRPr lang="de-DE"/>
           </a:p>
@@ -2617,7 +2619,7 @@
           <a:p>
             <a:fld id="{CF7CD84D-430A-4AA5-9B0E-9CAD50B60C46}" type="datetimeFigureOut">
               <a:rPr lang="de-DE" smtClean="0"/>
-              <a:t>05.06.2017</a:t>
+              <a:t>06.06.2017</a:t>
             </a:fld>
             <a:endParaRPr lang="de-DE"/>
           </a:p>
@@ -4147,6 +4149,237 @@
             <a:avLst/>
           </a:prstGeom>
           <a:solidFill>
+            <a:schemeClr val="accent2"/>
+          </a:solidFill>
+          <a:ln>
+            <a:noFill/>
+          </a:ln>
+        </p:spPr>
+        <p:style>
+          <a:lnRef idx="2">
+            <a:schemeClr val="accent1">
+              <a:shade val="50000"/>
+            </a:schemeClr>
+          </a:lnRef>
+          <a:fillRef idx="1">
+            <a:schemeClr val="accent1"/>
+          </a:fillRef>
+          <a:effectRef idx="0">
+            <a:schemeClr val="accent1"/>
+          </a:effectRef>
+          <a:fontRef idx="minor">
+            <a:schemeClr val="lt1"/>
+          </a:fontRef>
+        </p:style>
+        <p:txBody>
+          <a:bodyPr rtlCol="0" anchor="ctr"/>
+          <a:lstStyle/>
+          <a:p>
+            <a:pPr algn="ctr"/>
+            <a:endParaRPr lang="de-DE" sz="13800" b="1" dirty="0"/>
+          </a:p>
+        </p:txBody>
+      </p:sp>
+      <p:grpSp>
+        <p:nvGrpSpPr>
+          <p:cNvPr id="6" name="Gruppieren 5"/>
+          <p:cNvGrpSpPr>
+            <a:grpSpLocks noChangeAspect="1"/>
+          </p:cNvGrpSpPr>
+          <p:nvPr/>
+        </p:nvGrpSpPr>
+        <p:grpSpPr>
+          <a:xfrm rot="10800000">
+            <a:off x="4656307" y="1708569"/>
+            <a:ext cx="1487148" cy="7382625"/>
+            <a:chOff x="4884623" y="2852568"/>
+            <a:chExt cx="1030516" cy="5115774"/>
+          </a:xfrm>
+        </p:grpSpPr>
+        <p:sp>
+          <p:nvSpPr>
+            <p:cNvPr id="4" name="Rechteck: abgerundete Ecken 3"/>
+            <p:cNvSpPr/>
+            <p:nvPr/>
+          </p:nvSpPr>
+          <p:spPr>
+            <a:xfrm>
+              <a:off x="4884623" y="2852568"/>
+              <a:ext cx="1030515" cy="1074057"/>
+            </a:xfrm>
+            <a:prstGeom prst="roundRect">
+              <a:avLst>
+                <a:gd name="adj" fmla="val 49061"/>
+              </a:avLst>
+            </a:prstGeom>
+            <a:solidFill>
+              <a:schemeClr val="bg1"/>
+            </a:solidFill>
+            <a:ln>
+              <a:noFill/>
+            </a:ln>
+          </p:spPr>
+          <p:style>
+            <a:lnRef idx="2">
+              <a:schemeClr val="accent1">
+                <a:shade val="50000"/>
+              </a:schemeClr>
+            </a:lnRef>
+            <a:fillRef idx="1">
+              <a:schemeClr val="accent1"/>
+            </a:fillRef>
+            <a:effectRef idx="0">
+              <a:schemeClr val="accent1"/>
+            </a:effectRef>
+            <a:fontRef idx="minor">
+              <a:schemeClr val="lt1"/>
+            </a:fontRef>
+          </p:style>
+          <p:txBody>
+            <a:bodyPr rtlCol="0" anchor="ctr"/>
+            <a:lstStyle/>
+            <a:p>
+              <a:pPr algn="ctr"/>
+              <a:endParaRPr lang="de-DE"/>
+            </a:p>
+          </p:txBody>
+        </p:sp>
+        <p:sp>
+          <p:nvSpPr>
+            <p:cNvPr id="5" name="Rechteck: abgerundete Ecken 4"/>
+            <p:cNvSpPr/>
+            <p:nvPr/>
+          </p:nvSpPr>
+          <p:spPr>
+            <a:xfrm>
+              <a:off x="4884624" y="4339771"/>
+              <a:ext cx="1030515" cy="3628571"/>
+            </a:xfrm>
+            <a:prstGeom prst="roundRect">
+              <a:avLst/>
+            </a:prstGeom>
+            <a:solidFill>
+              <a:schemeClr val="bg1"/>
+            </a:solidFill>
+            <a:ln>
+              <a:noFill/>
+            </a:ln>
+          </p:spPr>
+          <p:style>
+            <a:lnRef idx="2">
+              <a:schemeClr val="accent1">
+                <a:shade val="50000"/>
+              </a:schemeClr>
+            </a:lnRef>
+            <a:fillRef idx="1">
+              <a:schemeClr val="accent1"/>
+            </a:fillRef>
+            <a:effectRef idx="0">
+              <a:schemeClr val="accent1"/>
+            </a:effectRef>
+            <a:fontRef idx="minor">
+              <a:schemeClr val="lt1"/>
+            </a:fontRef>
+          </p:style>
+          <p:txBody>
+            <a:bodyPr rtlCol="0" anchor="ctr"/>
+            <a:lstStyle/>
+            <a:p>
+              <a:pPr algn="ctr"/>
+              <a:endParaRPr lang="de-DE"/>
+            </a:p>
+          </p:txBody>
+        </p:sp>
+      </p:grpSp>
+    </p:spTree>
+    <p:extLst>
+      <p:ext uri="{BB962C8B-B14F-4D97-AF65-F5344CB8AC3E}">
+        <p14:creationId xmlns:p14="http://schemas.microsoft.com/office/powerpoint/2010/main" val="3144267436"/>
+      </p:ext>
+    </p:extLst>
+  </p:cSld>
+  <p:clrMapOvr>
+    <a:masterClrMapping/>
+  </p:clrMapOvr>
+</p:sld>
+</file>
+
+<file path=ppt/slides/slide11.xml><?xml version="1.0" encoding="utf-8"?>
+<p:sld xmlns:a="http://schemas.openxmlformats.org/drawingml/2006/main" xmlns:r="http://schemas.openxmlformats.org/officeDocument/2006/relationships" xmlns:p="http://schemas.openxmlformats.org/presentationml/2006/main">
+  <p:cSld>
+    <p:spTree>
+      <p:nvGrpSpPr>
+        <p:cNvPr id="1" name=""/>
+        <p:cNvGrpSpPr/>
+        <p:nvPr/>
+      </p:nvGrpSpPr>
+      <p:grpSpPr>
+        <a:xfrm>
+          <a:off x="0" y="0"/>
+          <a:ext cx="0" cy="0"/>
+          <a:chOff x="0" y="0"/>
+          <a:chExt cx="0" cy="0"/>
+        </a:xfrm>
+      </p:grpSpPr>
+      <p:sp>
+        <p:nvSpPr>
+          <p:cNvPr id="3" name="Rechteck 2"/>
+          <p:cNvSpPr/>
+          <p:nvPr/>
+        </p:nvSpPr>
+        <p:spPr>
+          <a:xfrm>
+            <a:off x="0" y="0"/>
+            <a:ext cx="10799763" cy="10799763"/>
+          </a:xfrm>
+          <a:prstGeom prst="rect">
+            <a:avLst/>
+          </a:prstGeom>
+          <a:noFill/>
+          <a:ln>
+            <a:noFill/>
+          </a:ln>
+        </p:spPr>
+        <p:style>
+          <a:lnRef idx="2">
+            <a:schemeClr val="accent1">
+              <a:shade val="50000"/>
+            </a:schemeClr>
+          </a:lnRef>
+          <a:fillRef idx="1">
+            <a:schemeClr val="accent1"/>
+          </a:fillRef>
+          <a:effectRef idx="0">
+            <a:schemeClr val="accent1"/>
+          </a:effectRef>
+          <a:fontRef idx="minor">
+            <a:schemeClr val="lt1"/>
+          </a:fontRef>
+        </p:style>
+        <p:txBody>
+          <a:bodyPr rtlCol="0" anchor="ctr"/>
+          <a:lstStyle/>
+          <a:p>
+            <a:pPr algn="ctr"/>
+            <a:endParaRPr lang="de-DE"/>
+          </a:p>
+        </p:txBody>
+      </p:sp>
+      <p:sp>
+        <p:nvSpPr>
+          <p:cNvPr id="2" name="Ellipse 1"/>
+          <p:cNvSpPr/>
+          <p:nvPr/>
+        </p:nvSpPr>
+        <p:spPr>
+          <a:xfrm>
+            <a:off x="899881" y="899881"/>
+            <a:ext cx="9000000" cy="9000000"/>
+          </a:xfrm>
+          <a:prstGeom prst="ellipse">
+            <a:avLst/>
+          </a:prstGeom>
+          <a:solidFill>
             <a:srgbClr val="0070C0"/>
           </a:solidFill>
           <a:ln>
@@ -4247,7 +4480,7 @@
 </p:sld>
 </file>
 
-<file path=ppt/slides/slide11.xml><?xml version="1.0" encoding="utf-8"?>
+<file path=ppt/slides/slide12.xml><?xml version="1.0" encoding="utf-8"?>
 <p:sld xmlns:a="http://schemas.openxmlformats.org/drawingml/2006/main" xmlns:r="http://schemas.openxmlformats.org/officeDocument/2006/relationships" xmlns:p="http://schemas.openxmlformats.org/presentationml/2006/main">
   <p:cSld>
     <p:spTree>
@@ -4476,7 +4709,7 @@
 </p:sld>
 </file>
 
-<file path=ppt/slides/slide12.xml><?xml version="1.0" encoding="utf-8"?>
+<file path=ppt/slides/slide13.xml><?xml version="1.0" encoding="utf-8"?>
 <p:sld xmlns:a="http://schemas.openxmlformats.org/drawingml/2006/main" xmlns:r="http://schemas.openxmlformats.org/officeDocument/2006/relationships" xmlns:p="http://schemas.openxmlformats.org/presentationml/2006/main">
   <p:cSld>
     <p:spTree>
@@ -5127,7 +5360,7 @@
 </p:sld>
 </file>
 
-<file path=ppt/slides/slide13.xml><?xml version="1.0" encoding="utf-8"?>
+<file path=ppt/slides/slide14.xml><?xml version="1.0" encoding="utf-8"?>
 <p:sld xmlns:a="http://schemas.openxmlformats.org/drawingml/2006/main" xmlns:r="http://schemas.openxmlformats.org/officeDocument/2006/relationships" xmlns:p="http://schemas.openxmlformats.org/presentationml/2006/main">
   <p:cSld>
     <p:spTree>
@@ -5501,7 +5734,7 @@
 </p:sld>
 </file>
 
-<file path=ppt/slides/slide14.xml><?xml version="1.0" encoding="utf-8"?>
+<file path=ppt/slides/slide15.xml><?xml version="1.0" encoding="utf-8"?>
 <p:sld xmlns:a="http://schemas.openxmlformats.org/drawingml/2006/main" xmlns:r="http://schemas.openxmlformats.org/officeDocument/2006/relationships" xmlns:p="http://schemas.openxmlformats.org/presentationml/2006/main">
   <p:cSld>
     <p:spTree>
@@ -5999,7 +6232,7 @@
 </p:sld>
 </file>
 
-<file path=ppt/slides/slide15.xml><?xml version="1.0" encoding="utf-8"?>
+<file path=ppt/slides/slide16.xml><?xml version="1.0" encoding="utf-8"?>
 <p:sld xmlns:a="http://schemas.openxmlformats.org/drawingml/2006/main" xmlns:r="http://schemas.openxmlformats.org/officeDocument/2006/relationships" xmlns:p="http://schemas.openxmlformats.org/presentationml/2006/main">
   <p:cSld>
     <p:spTree>
@@ -6555,7 +6788,7 @@
 </p:sld>
 </file>
 
-<file path=ppt/slides/slide16.xml><?xml version="1.0" encoding="utf-8"?>
+<file path=ppt/slides/slide17.xml><?xml version="1.0" encoding="utf-8"?>
 <p:sld xmlns:a="http://schemas.openxmlformats.org/drawingml/2006/main" xmlns:r="http://schemas.openxmlformats.org/officeDocument/2006/relationships" xmlns:p="http://schemas.openxmlformats.org/presentationml/2006/main">
   <p:cSld>
     <p:spTree>
@@ -6681,7 +6914,7 @@
 </p:sld>
 </file>
 
-<file path=ppt/slides/slide17.xml><?xml version="1.0" encoding="utf-8"?>
+<file path=ppt/slides/slide18.xml><?xml version="1.0" encoding="utf-8"?>
 <p:sld xmlns:a="http://schemas.openxmlformats.org/drawingml/2006/main" xmlns:r="http://schemas.openxmlformats.org/officeDocument/2006/relationships" xmlns:p="http://schemas.openxmlformats.org/presentationml/2006/main">
   <p:cSld>
     <p:spTree>
@@ -6849,7 +7082,7 @@
 </p:sld>
 </file>
 
-<file path=ppt/slides/slide18.xml><?xml version="1.0" encoding="utf-8"?>
+<file path=ppt/slides/slide19.xml><?xml version="1.0" encoding="utf-8"?>
 <p:sld xmlns:a="http://schemas.openxmlformats.org/drawingml/2006/main" xmlns:r="http://schemas.openxmlformats.org/officeDocument/2006/relationships" xmlns:p="http://schemas.openxmlformats.org/presentationml/2006/main">
   <p:cSld>
     <p:spTree>

</xml_diff>

<commit_message>
New Linux Icon, some bugfixes
mostly reorganized code and images for better future editing
</commit_message>
<xml_diff>
--- a/Symbols.pptx
+++ b/Symbols.pptx
@@ -7,23 +7,25 @@
   <p:sldIdLst>
     <p:sldId id="256" r:id="rId2"/>
     <p:sldId id="278" r:id="rId3"/>
-    <p:sldId id="264" r:id="rId4"/>
-    <p:sldId id="265" r:id="rId5"/>
-    <p:sldId id="281" r:id="rId6"/>
-    <p:sldId id="266" r:id="rId7"/>
-    <p:sldId id="267" r:id="rId8"/>
-    <p:sldId id="268" r:id="rId9"/>
-    <p:sldId id="280" r:id="rId10"/>
-    <p:sldId id="289" r:id="rId11"/>
-    <p:sldId id="288" r:id="rId12"/>
-    <p:sldId id="272" r:id="rId13"/>
-    <p:sldId id="286" r:id="rId14"/>
-    <p:sldId id="273" r:id="rId15"/>
-    <p:sldId id="274" r:id="rId16"/>
-    <p:sldId id="276" r:id="rId17"/>
-    <p:sldId id="282" r:id="rId18"/>
-    <p:sldId id="284" r:id="rId19"/>
-    <p:sldId id="285" r:id="rId20"/>
+    <p:sldId id="291" r:id="rId4"/>
+    <p:sldId id="290" r:id="rId5"/>
+    <p:sldId id="264" r:id="rId6"/>
+    <p:sldId id="265" r:id="rId7"/>
+    <p:sldId id="281" r:id="rId8"/>
+    <p:sldId id="266" r:id="rId9"/>
+    <p:sldId id="267" r:id="rId10"/>
+    <p:sldId id="268" r:id="rId11"/>
+    <p:sldId id="280" r:id="rId12"/>
+    <p:sldId id="289" r:id="rId13"/>
+    <p:sldId id="288" r:id="rId14"/>
+    <p:sldId id="272" r:id="rId15"/>
+    <p:sldId id="286" r:id="rId16"/>
+    <p:sldId id="273" r:id="rId17"/>
+    <p:sldId id="274" r:id="rId18"/>
+    <p:sldId id="276" r:id="rId19"/>
+    <p:sldId id="282" r:id="rId20"/>
+    <p:sldId id="284" r:id="rId21"/>
+    <p:sldId id="285" r:id="rId22"/>
   </p:sldIdLst>
   <p:sldSz cx="10799763" cy="10799763"/>
   <p:notesSz cx="6858000" cy="9144000"/>
@@ -129,6 +131,8 @@
           <p14:sldIdLst>
             <p14:sldId id="256"/>
             <p14:sldId id="278"/>
+            <p14:sldId id="291"/>
+            <p14:sldId id="290"/>
           </p14:sldIdLst>
         </p14:section>
         <p14:section name="2D" id="{04AD4C92-3D99-4873-8D50-9C358E7CF0E7}">
@@ -4092,6 +4096,536 @@
       </p:grpSpPr>
       <p:sp>
         <p:nvSpPr>
+          <p:cNvPr id="14" name="Freihandform: Form 13"/>
+          <p:cNvSpPr/>
+          <p:nvPr/>
+        </p:nvSpPr>
+        <p:spPr>
+          <a:xfrm>
+            <a:off x="1280752" y="1041400"/>
+            <a:ext cx="6529748" cy="8616950"/>
+          </a:xfrm>
+          <a:custGeom>
+            <a:avLst/>
+            <a:gdLst>
+              <a:gd name="connsiteX0" fmla="*/ 764438 w 6529748"/>
+              <a:gd name="connsiteY0" fmla="*/ 0 h 8616950"/>
+              <a:gd name="connsiteX1" fmla="*/ 4754528 w 6529748"/>
+              <a:gd name="connsiteY1" fmla="*/ 0 h 8616950"/>
+              <a:gd name="connsiteX2" fmla="*/ 6529748 w 6529748"/>
+              <a:gd name="connsiteY2" fmla="*/ 1695524 h 8616950"/>
+              <a:gd name="connsiteX3" fmla="*/ 6529748 w 6529748"/>
+              <a:gd name="connsiteY3" fmla="*/ 7852512 h 8616950"/>
+              <a:gd name="connsiteX4" fmla="*/ 5765310 w 6529748"/>
+              <a:gd name="connsiteY4" fmla="*/ 8616950 h 8616950"/>
+              <a:gd name="connsiteX5" fmla="*/ 764438 w 6529748"/>
+              <a:gd name="connsiteY5" fmla="*/ 8616950 h 8616950"/>
+              <a:gd name="connsiteX6" fmla="*/ 0 w 6529748"/>
+              <a:gd name="connsiteY6" fmla="*/ 7852512 h 8616950"/>
+              <a:gd name="connsiteX7" fmla="*/ 0 w 6529748"/>
+              <a:gd name="connsiteY7" fmla="*/ 764438 h 8616950"/>
+              <a:gd name="connsiteX8" fmla="*/ 764438 w 6529748"/>
+              <a:gd name="connsiteY8" fmla="*/ 0 h 8616950"/>
+            </a:gdLst>
+            <a:ahLst/>
+            <a:cxnLst>
+              <a:cxn ang="0">
+                <a:pos x="connsiteX0" y="connsiteY0"/>
+              </a:cxn>
+              <a:cxn ang="0">
+                <a:pos x="connsiteX1" y="connsiteY1"/>
+              </a:cxn>
+              <a:cxn ang="0">
+                <a:pos x="connsiteX2" y="connsiteY2"/>
+              </a:cxn>
+              <a:cxn ang="0">
+                <a:pos x="connsiteX3" y="connsiteY3"/>
+              </a:cxn>
+              <a:cxn ang="0">
+                <a:pos x="connsiteX4" y="connsiteY4"/>
+              </a:cxn>
+              <a:cxn ang="0">
+                <a:pos x="connsiteX5" y="connsiteY5"/>
+              </a:cxn>
+              <a:cxn ang="0">
+                <a:pos x="connsiteX6" y="connsiteY6"/>
+              </a:cxn>
+              <a:cxn ang="0">
+                <a:pos x="connsiteX7" y="connsiteY7"/>
+              </a:cxn>
+              <a:cxn ang="0">
+                <a:pos x="connsiteX8" y="connsiteY8"/>
+              </a:cxn>
+            </a:cxnLst>
+            <a:rect l="l" t="t" r="r" b="b"/>
+            <a:pathLst>
+              <a:path w="6529748" h="8616950">
+                <a:moveTo>
+                  <a:pt x="764438" y="0"/>
+                </a:moveTo>
+                <a:lnTo>
+                  <a:pt x="4754528" y="0"/>
+                </a:lnTo>
+                <a:lnTo>
+                  <a:pt x="6529748" y="1695524"/>
+                </a:lnTo>
+                <a:lnTo>
+                  <a:pt x="6529748" y="7852512"/>
+                </a:lnTo>
+                <a:cubicBezTo>
+                  <a:pt x="6529748" y="8274699"/>
+                  <a:pt x="6187497" y="8616950"/>
+                  <a:pt x="5765310" y="8616950"/>
+                </a:cubicBezTo>
+                <a:lnTo>
+                  <a:pt x="764438" y="8616950"/>
+                </a:lnTo>
+                <a:cubicBezTo>
+                  <a:pt x="342251" y="8616950"/>
+                  <a:pt x="0" y="8274699"/>
+                  <a:pt x="0" y="7852512"/>
+                </a:cubicBezTo>
+                <a:lnTo>
+                  <a:pt x="0" y="764438"/>
+                </a:lnTo>
+                <a:cubicBezTo>
+                  <a:pt x="0" y="342251"/>
+                  <a:pt x="342251" y="0"/>
+                  <a:pt x="764438" y="0"/>
+                </a:cubicBezTo>
+                <a:close/>
+              </a:path>
+            </a:pathLst>
+          </a:custGeom>
+          <a:solidFill>
+            <a:schemeClr val="bg1"/>
+          </a:solidFill>
+          <a:ln>
+            <a:noFill/>
+          </a:ln>
+        </p:spPr>
+        <p:style>
+          <a:lnRef idx="2">
+            <a:schemeClr val="accent1">
+              <a:shade val="50000"/>
+            </a:schemeClr>
+          </a:lnRef>
+          <a:fillRef idx="1">
+            <a:schemeClr val="accent1"/>
+          </a:fillRef>
+          <a:effectRef idx="0">
+            <a:schemeClr val="accent1"/>
+          </a:effectRef>
+          <a:fontRef idx="minor">
+            <a:schemeClr val="lt1"/>
+          </a:fontRef>
+        </p:style>
+        <p:txBody>
+          <a:bodyPr rtlCol="0" anchor="ctr"/>
+          <a:lstStyle/>
+          <a:p>
+            <a:pPr algn="ctr"/>
+            <a:endParaRPr lang="de-DE"/>
+          </a:p>
+        </p:txBody>
+      </p:sp>
+      <p:sp>
+        <p:nvSpPr>
+          <p:cNvPr id="15" name="Rechtwinkliges Dreieck 14"/>
+          <p:cNvSpPr/>
+          <p:nvPr/>
+        </p:nvSpPr>
+        <p:spPr>
+          <a:xfrm rot="10800000" flipH="1" flipV="1">
+            <a:off x="6035674" y="1041400"/>
+            <a:ext cx="1774825" cy="1695450"/>
+          </a:xfrm>
+          <a:prstGeom prst="rtTriangle">
+            <a:avLst/>
+          </a:prstGeom>
+          <a:solidFill>
+            <a:schemeClr val="bg1">
+              <a:lumMod val="85000"/>
+            </a:schemeClr>
+          </a:solidFill>
+          <a:ln>
+            <a:noFill/>
+          </a:ln>
+        </p:spPr>
+        <p:style>
+          <a:lnRef idx="2">
+            <a:schemeClr val="accent1">
+              <a:shade val="50000"/>
+            </a:schemeClr>
+          </a:lnRef>
+          <a:fillRef idx="1">
+            <a:schemeClr val="accent1"/>
+          </a:fillRef>
+          <a:effectRef idx="0">
+            <a:schemeClr val="accent1"/>
+          </a:effectRef>
+          <a:fontRef idx="minor">
+            <a:schemeClr val="lt1"/>
+          </a:fontRef>
+        </p:style>
+        <p:txBody>
+          <a:bodyPr rtlCol="0" anchor="ctr"/>
+          <a:lstStyle/>
+          <a:p>
+            <a:pPr algn="ctr"/>
+            <a:endParaRPr lang="de-DE"/>
+          </a:p>
+        </p:txBody>
+      </p:sp>
+      <p:sp>
+        <p:nvSpPr>
+          <p:cNvPr id="3" name="Rechteck 2"/>
+          <p:cNvSpPr/>
+          <p:nvPr/>
+        </p:nvSpPr>
+        <p:spPr>
+          <a:xfrm>
+            <a:off x="0" y="0"/>
+            <a:ext cx="10799763" cy="10799763"/>
+          </a:xfrm>
+          <a:prstGeom prst="rect">
+            <a:avLst/>
+          </a:prstGeom>
+          <a:noFill/>
+          <a:ln>
+            <a:noFill/>
+          </a:ln>
+        </p:spPr>
+        <p:style>
+          <a:lnRef idx="2">
+            <a:schemeClr val="accent1">
+              <a:shade val="50000"/>
+            </a:schemeClr>
+          </a:lnRef>
+          <a:fillRef idx="1">
+            <a:schemeClr val="accent1"/>
+          </a:fillRef>
+          <a:effectRef idx="0">
+            <a:schemeClr val="accent1"/>
+          </a:effectRef>
+          <a:fontRef idx="minor">
+            <a:schemeClr val="lt1"/>
+          </a:fontRef>
+        </p:style>
+        <p:txBody>
+          <a:bodyPr rtlCol="0" anchor="ctr"/>
+          <a:lstStyle/>
+          <a:p>
+            <a:pPr algn="ctr"/>
+            <a:endParaRPr lang="de-DE"/>
+          </a:p>
+        </p:txBody>
+      </p:sp>
+      <p:sp>
+        <p:nvSpPr>
+          <p:cNvPr id="16" name="Pfeil: nach oben 15"/>
+          <p:cNvSpPr/>
+          <p:nvPr/>
+        </p:nvSpPr>
+        <p:spPr>
+          <a:xfrm rot="5400000">
+            <a:off x="5399881" y="6247607"/>
+            <a:ext cx="4095750" cy="3981450"/>
+          </a:xfrm>
+          <a:prstGeom prst="upArrow">
+            <a:avLst/>
+          </a:prstGeom>
+          <a:solidFill>
+            <a:srgbClr val="FF0000"/>
+          </a:solidFill>
+          <a:effectLst/>
+        </p:spPr>
+        <p:style>
+          <a:lnRef idx="0">
+            <a:schemeClr val="accent6"/>
+          </a:lnRef>
+          <a:fillRef idx="3">
+            <a:schemeClr val="accent6"/>
+          </a:fillRef>
+          <a:effectRef idx="3">
+            <a:schemeClr val="accent6"/>
+          </a:effectRef>
+          <a:fontRef idx="minor">
+            <a:schemeClr val="lt1"/>
+          </a:fontRef>
+        </p:style>
+        <p:txBody>
+          <a:bodyPr rtlCol="0" anchor="ctr"/>
+          <a:lstStyle/>
+          <a:p>
+            <a:pPr algn="ctr"/>
+            <a:endParaRPr lang="de-DE"/>
+          </a:p>
+        </p:txBody>
+      </p:sp>
+    </p:spTree>
+    <p:extLst>
+      <p:ext uri="{BB962C8B-B14F-4D97-AF65-F5344CB8AC3E}">
+        <p14:creationId xmlns:p14="http://schemas.microsoft.com/office/powerpoint/2010/main" val="4083727051"/>
+      </p:ext>
+    </p:extLst>
+  </p:cSld>
+  <p:clrMapOvr>
+    <a:masterClrMapping/>
+  </p:clrMapOvr>
+</p:sld>
+</file>
+
+<file path=ppt/slides/slide11.xml><?xml version="1.0" encoding="utf-8"?>
+<p:sld xmlns:a="http://schemas.openxmlformats.org/drawingml/2006/main" xmlns:r="http://schemas.openxmlformats.org/officeDocument/2006/relationships" xmlns:p="http://schemas.openxmlformats.org/presentationml/2006/main">
+  <p:cSld>
+    <p:spTree>
+      <p:nvGrpSpPr>
+        <p:cNvPr id="1" name=""/>
+        <p:cNvGrpSpPr/>
+        <p:nvPr/>
+      </p:nvGrpSpPr>
+      <p:grpSpPr>
+        <a:xfrm>
+          <a:off x="0" y="0"/>
+          <a:ext cx="0" cy="0"/>
+          <a:chOff x="0" y="0"/>
+          <a:chExt cx="0" cy="0"/>
+        </a:xfrm>
+      </p:grpSpPr>
+      <p:sp>
+        <p:nvSpPr>
+          <p:cNvPr id="3" name="Rechteck 2"/>
+          <p:cNvSpPr/>
+          <p:nvPr/>
+        </p:nvSpPr>
+        <p:spPr>
+          <a:xfrm>
+            <a:off x="0" y="0"/>
+            <a:ext cx="10799763" cy="10799763"/>
+          </a:xfrm>
+          <a:prstGeom prst="rect">
+            <a:avLst/>
+          </a:prstGeom>
+          <a:noFill/>
+          <a:ln>
+            <a:noFill/>
+          </a:ln>
+        </p:spPr>
+        <p:style>
+          <a:lnRef idx="2">
+            <a:schemeClr val="accent1">
+              <a:shade val="50000"/>
+            </a:schemeClr>
+          </a:lnRef>
+          <a:fillRef idx="1">
+            <a:schemeClr val="accent1"/>
+          </a:fillRef>
+          <a:effectRef idx="0">
+            <a:schemeClr val="accent1"/>
+          </a:effectRef>
+          <a:fontRef idx="minor">
+            <a:schemeClr val="lt1"/>
+          </a:fontRef>
+        </p:style>
+        <p:txBody>
+          <a:bodyPr rtlCol="0" anchor="ctr"/>
+          <a:lstStyle/>
+          <a:p>
+            <a:pPr algn="ctr"/>
+            <a:endParaRPr lang="de-DE"/>
+          </a:p>
+        </p:txBody>
+      </p:sp>
+      <p:sp>
+        <p:nvSpPr>
+          <p:cNvPr id="2" name="Ellipse 1"/>
+          <p:cNvSpPr/>
+          <p:nvPr/>
+        </p:nvSpPr>
+        <p:spPr>
+          <a:xfrm>
+            <a:off x="899881" y="899881"/>
+            <a:ext cx="9000000" cy="9000000"/>
+          </a:xfrm>
+          <a:prstGeom prst="ellipse">
+            <a:avLst/>
+          </a:prstGeom>
+          <a:solidFill>
+            <a:srgbClr val="0070C0"/>
+          </a:solidFill>
+          <a:ln>
+            <a:noFill/>
+          </a:ln>
+        </p:spPr>
+        <p:style>
+          <a:lnRef idx="2">
+            <a:schemeClr val="accent1">
+              <a:shade val="50000"/>
+            </a:schemeClr>
+          </a:lnRef>
+          <a:fillRef idx="1">
+            <a:schemeClr val="accent1"/>
+          </a:fillRef>
+          <a:effectRef idx="0">
+            <a:schemeClr val="accent1"/>
+          </a:effectRef>
+          <a:fontRef idx="minor">
+            <a:schemeClr val="lt1"/>
+          </a:fontRef>
+        </p:style>
+        <p:txBody>
+          <a:bodyPr rtlCol="0" anchor="ctr"/>
+          <a:lstStyle/>
+          <a:p>
+            <a:pPr algn="ctr"/>
+            <a:endParaRPr lang="de-DE" sz="13800" b="1" dirty="0"/>
+          </a:p>
+        </p:txBody>
+      </p:sp>
+      <p:grpSp>
+        <p:nvGrpSpPr>
+          <p:cNvPr id="6" name="Gruppieren 5"/>
+          <p:cNvGrpSpPr>
+            <a:grpSpLocks noChangeAspect="1"/>
+          </p:cNvGrpSpPr>
+          <p:nvPr/>
+        </p:nvGrpSpPr>
+        <p:grpSpPr>
+          <a:xfrm>
+            <a:off x="4656307" y="1708569"/>
+            <a:ext cx="1487148" cy="7382625"/>
+            <a:chOff x="4884623" y="2852568"/>
+            <a:chExt cx="1030516" cy="5115774"/>
+          </a:xfrm>
+        </p:grpSpPr>
+        <p:sp>
+          <p:nvSpPr>
+            <p:cNvPr id="4" name="Rechteck: abgerundete Ecken 3"/>
+            <p:cNvSpPr/>
+            <p:nvPr/>
+          </p:nvSpPr>
+          <p:spPr>
+            <a:xfrm>
+              <a:off x="4884623" y="2852568"/>
+              <a:ext cx="1030515" cy="1074057"/>
+            </a:xfrm>
+            <a:prstGeom prst="roundRect">
+              <a:avLst>
+                <a:gd name="adj" fmla="val 49061"/>
+              </a:avLst>
+            </a:prstGeom>
+            <a:solidFill>
+              <a:schemeClr val="bg1"/>
+            </a:solidFill>
+            <a:ln>
+              <a:noFill/>
+            </a:ln>
+          </p:spPr>
+          <p:style>
+            <a:lnRef idx="2">
+              <a:schemeClr val="accent1">
+                <a:shade val="50000"/>
+              </a:schemeClr>
+            </a:lnRef>
+            <a:fillRef idx="1">
+              <a:schemeClr val="accent1"/>
+            </a:fillRef>
+            <a:effectRef idx="0">
+              <a:schemeClr val="accent1"/>
+            </a:effectRef>
+            <a:fontRef idx="minor">
+              <a:schemeClr val="lt1"/>
+            </a:fontRef>
+          </p:style>
+          <p:txBody>
+            <a:bodyPr rtlCol="0" anchor="ctr"/>
+            <a:lstStyle/>
+            <a:p>
+              <a:pPr algn="ctr"/>
+              <a:endParaRPr lang="de-DE"/>
+            </a:p>
+          </p:txBody>
+        </p:sp>
+        <p:sp>
+          <p:nvSpPr>
+            <p:cNvPr id="5" name="Rechteck: abgerundete Ecken 4"/>
+            <p:cNvSpPr/>
+            <p:nvPr/>
+          </p:nvSpPr>
+          <p:spPr>
+            <a:xfrm>
+              <a:off x="4884624" y="4339771"/>
+              <a:ext cx="1030515" cy="3628571"/>
+            </a:xfrm>
+            <a:prstGeom prst="roundRect">
+              <a:avLst/>
+            </a:prstGeom>
+            <a:solidFill>
+              <a:schemeClr val="bg1"/>
+            </a:solidFill>
+            <a:ln>
+              <a:noFill/>
+            </a:ln>
+          </p:spPr>
+          <p:style>
+            <a:lnRef idx="2">
+              <a:schemeClr val="accent1">
+                <a:shade val="50000"/>
+              </a:schemeClr>
+            </a:lnRef>
+            <a:fillRef idx="1">
+              <a:schemeClr val="accent1"/>
+            </a:fillRef>
+            <a:effectRef idx="0">
+              <a:schemeClr val="accent1"/>
+            </a:effectRef>
+            <a:fontRef idx="minor">
+              <a:schemeClr val="lt1"/>
+            </a:fontRef>
+          </p:style>
+          <p:txBody>
+            <a:bodyPr rtlCol="0" anchor="ctr"/>
+            <a:lstStyle/>
+            <a:p>
+              <a:pPr algn="ctr"/>
+              <a:endParaRPr lang="de-DE"/>
+            </a:p>
+          </p:txBody>
+        </p:sp>
+      </p:grpSp>
+    </p:spTree>
+    <p:extLst>
+      <p:ext uri="{BB962C8B-B14F-4D97-AF65-F5344CB8AC3E}">
+        <p14:creationId xmlns:p14="http://schemas.microsoft.com/office/powerpoint/2010/main" val="3397236484"/>
+      </p:ext>
+    </p:extLst>
+  </p:cSld>
+  <p:clrMapOvr>
+    <a:masterClrMapping/>
+  </p:clrMapOvr>
+</p:sld>
+</file>
+
+<file path=ppt/slides/slide12.xml><?xml version="1.0" encoding="utf-8"?>
+<p:sld xmlns:a="http://schemas.openxmlformats.org/drawingml/2006/main" xmlns:r="http://schemas.openxmlformats.org/officeDocument/2006/relationships" xmlns:p="http://schemas.openxmlformats.org/presentationml/2006/main">
+  <p:cSld>
+    <p:spTree>
+      <p:nvGrpSpPr>
+        <p:cNvPr id="1" name=""/>
+        <p:cNvGrpSpPr/>
+        <p:nvPr/>
+      </p:nvGrpSpPr>
+      <p:grpSpPr>
+        <a:xfrm>
+          <a:off x="0" y="0"/>
+          <a:ext cx="0" cy="0"/>
+          <a:chOff x="0" y="0"/>
+          <a:chExt cx="0" cy="0"/>
+        </a:xfrm>
+      </p:grpSpPr>
+      <p:sp>
+        <p:nvSpPr>
           <p:cNvPr id="3" name="Rechteck 2"/>
           <p:cNvSpPr/>
           <p:nvPr/>
@@ -4304,7 +4838,7 @@
 </p:sld>
 </file>
 
-<file path=ppt/slides/slide11.xml><?xml version="1.0" encoding="utf-8"?>
+<file path=ppt/slides/slide13.xml><?xml version="1.0" encoding="utf-8"?>
 <p:sld xmlns:a="http://schemas.openxmlformats.org/drawingml/2006/main" xmlns:r="http://schemas.openxmlformats.org/officeDocument/2006/relationships" xmlns:p="http://schemas.openxmlformats.org/presentationml/2006/main">
   <p:cSld>
     <p:spTree>
@@ -4480,7 +5014,7 @@
 </p:sld>
 </file>
 
-<file path=ppt/slides/slide12.xml><?xml version="1.0" encoding="utf-8"?>
+<file path=ppt/slides/slide14.xml><?xml version="1.0" encoding="utf-8"?>
 <p:sld xmlns:a="http://schemas.openxmlformats.org/drawingml/2006/main" xmlns:r="http://schemas.openxmlformats.org/officeDocument/2006/relationships" xmlns:p="http://schemas.openxmlformats.org/presentationml/2006/main">
   <p:cSld>
     <p:spTree>
@@ -4709,7 +5243,7 @@
 </p:sld>
 </file>
 
-<file path=ppt/slides/slide13.xml><?xml version="1.0" encoding="utf-8"?>
+<file path=ppt/slides/slide15.xml><?xml version="1.0" encoding="utf-8"?>
 <p:sld xmlns:a="http://schemas.openxmlformats.org/drawingml/2006/main" xmlns:r="http://schemas.openxmlformats.org/officeDocument/2006/relationships" xmlns:p="http://schemas.openxmlformats.org/presentationml/2006/main">
   <p:cSld>
     <p:spTree>
@@ -5360,7 +5894,7 @@
 </p:sld>
 </file>
 
-<file path=ppt/slides/slide14.xml><?xml version="1.0" encoding="utf-8"?>
+<file path=ppt/slides/slide16.xml><?xml version="1.0" encoding="utf-8"?>
 <p:sld xmlns:a="http://schemas.openxmlformats.org/drawingml/2006/main" xmlns:r="http://schemas.openxmlformats.org/officeDocument/2006/relationships" xmlns:p="http://schemas.openxmlformats.org/presentationml/2006/main">
   <p:cSld>
     <p:spTree>
@@ -5734,7 +6268,7 @@
 </p:sld>
 </file>
 
-<file path=ppt/slides/slide15.xml><?xml version="1.0" encoding="utf-8"?>
+<file path=ppt/slides/slide17.xml><?xml version="1.0" encoding="utf-8"?>
 <p:sld xmlns:a="http://schemas.openxmlformats.org/drawingml/2006/main" xmlns:r="http://schemas.openxmlformats.org/officeDocument/2006/relationships" xmlns:p="http://schemas.openxmlformats.org/presentationml/2006/main">
   <p:cSld>
     <p:spTree>
@@ -6232,7 +6766,7 @@
 </p:sld>
 </file>
 
-<file path=ppt/slides/slide16.xml><?xml version="1.0" encoding="utf-8"?>
+<file path=ppt/slides/slide18.xml><?xml version="1.0" encoding="utf-8"?>
 <p:sld xmlns:a="http://schemas.openxmlformats.org/drawingml/2006/main" xmlns:r="http://schemas.openxmlformats.org/officeDocument/2006/relationships" xmlns:p="http://schemas.openxmlformats.org/presentationml/2006/main">
   <p:cSld>
     <p:spTree>
@@ -6788,7 +7322,7 @@
 </p:sld>
 </file>
 
-<file path=ppt/slides/slide17.xml><?xml version="1.0" encoding="utf-8"?>
+<file path=ppt/slides/slide19.xml><?xml version="1.0" encoding="utf-8"?>
 <p:sld xmlns:a="http://schemas.openxmlformats.org/drawingml/2006/main" xmlns:r="http://schemas.openxmlformats.org/officeDocument/2006/relationships" xmlns:p="http://schemas.openxmlformats.org/presentationml/2006/main">
   <p:cSld>
     <p:spTree>
@@ -6914,7 +7448,7 @@
 </p:sld>
 </file>
 
-<file path=ppt/slides/slide18.xml><?xml version="1.0" encoding="utf-8"?>
+<file path=ppt/slides/slide2.xml><?xml version="1.0" encoding="utf-8"?>
 <p:sld xmlns:a="http://schemas.openxmlformats.org/drawingml/2006/main" xmlns:r="http://schemas.openxmlformats.org/officeDocument/2006/relationships" xmlns:p="http://schemas.openxmlformats.org/presentationml/2006/main">
   <p:cSld>
     <p:spTree>
@@ -6939,15 +7473,13 @@
         </p:nvSpPr>
         <p:spPr>
           <a:xfrm>
-            <a:off x="899881" y="2699881"/>
-            <a:ext cx="9000000" cy="1800000"/>
+            <a:off x="0" y="0"/>
+            <a:ext cx="10799763" cy="10799763"/>
           </a:xfrm>
           <a:prstGeom prst="rect">
             <a:avLst/>
           </a:prstGeom>
-          <a:solidFill>
-            <a:schemeClr val="tx1"/>
-          </a:solidFill>
+          <a:noFill/>
           <a:ln>
             <a:noFill/>
           </a:ln>
@@ -6977,908 +7509,6 @@
           </a:p>
         </p:txBody>
       </p:sp>
-      <p:sp>
-        <p:nvSpPr>
-          <p:cNvPr id="5" name="Rechteck 4"/>
-          <p:cNvSpPr/>
-          <p:nvPr/>
-        </p:nvSpPr>
-        <p:spPr>
-          <a:xfrm>
-            <a:off x="899881" y="4499881"/>
-            <a:ext cx="9000000" cy="1800000"/>
-          </a:xfrm>
-          <a:prstGeom prst="rect">
-            <a:avLst/>
-          </a:prstGeom>
-          <a:solidFill>
-            <a:srgbClr val="C00000"/>
-          </a:solidFill>
-          <a:ln>
-            <a:noFill/>
-          </a:ln>
-        </p:spPr>
-        <p:style>
-          <a:lnRef idx="2">
-            <a:schemeClr val="accent1">
-              <a:shade val="50000"/>
-            </a:schemeClr>
-          </a:lnRef>
-          <a:fillRef idx="1">
-            <a:schemeClr val="accent1"/>
-          </a:fillRef>
-          <a:effectRef idx="0">
-            <a:schemeClr val="accent1"/>
-          </a:effectRef>
-          <a:fontRef idx="minor">
-            <a:schemeClr val="lt1"/>
-          </a:fontRef>
-        </p:style>
-        <p:txBody>
-          <a:bodyPr rtlCol="0" anchor="ctr"/>
-          <a:lstStyle/>
-          <a:p>
-            <a:pPr algn="ctr"/>
-            <a:endParaRPr lang="de-DE"/>
-          </a:p>
-        </p:txBody>
-      </p:sp>
-      <p:sp>
-        <p:nvSpPr>
-          <p:cNvPr id="6" name="Rechteck 5"/>
-          <p:cNvSpPr/>
-          <p:nvPr/>
-        </p:nvSpPr>
-        <p:spPr>
-          <a:xfrm>
-            <a:off x="899881" y="6299883"/>
-            <a:ext cx="9000000" cy="1800000"/>
-          </a:xfrm>
-          <a:prstGeom prst="rect">
-            <a:avLst/>
-          </a:prstGeom>
-          <a:solidFill>
-            <a:srgbClr val="FFC000"/>
-          </a:solidFill>
-          <a:ln>
-            <a:noFill/>
-          </a:ln>
-        </p:spPr>
-        <p:style>
-          <a:lnRef idx="2">
-            <a:schemeClr val="accent1">
-              <a:shade val="50000"/>
-            </a:schemeClr>
-          </a:lnRef>
-          <a:fillRef idx="1">
-            <a:schemeClr val="accent1"/>
-          </a:fillRef>
-          <a:effectRef idx="0">
-            <a:schemeClr val="accent1"/>
-          </a:effectRef>
-          <a:fontRef idx="minor">
-            <a:schemeClr val="lt1"/>
-          </a:fontRef>
-        </p:style>
-        <p:txBody>
-          <a:bodyPr rtlCol="0" anchor="ctr"/>
-          <a:lstStyle/>
-          <a:p>
-            <a:pPr algn="ctr"/>
-            <a:endParaRPr lang="de-DE"/>
-          </a:p>
-        </p:txBody>
-      </p:sp>
-    </p:spTree>
-    <p:extLst>
-      <p:ext uri="{BB962C8B-B14F-4D97-AF65-F5344CB8AC3E}">
-        <p14:creationId xmlns:p14="http://schemas.microsoft.com/office/powerpoint/2010/main" val="2132650698"/>
-      </p:ext>
-    </p:extLst>
-  </p:cSld>
-  <p:clrMapOvr>
-    <a:masterClrMapping/>
-  </p:clrMapOvr>
-</p:sld>
-</file>
-
-<file path=ppt/slides/slide19.xml><?xml version="1.0" encoding="utf-8"?>
-<p:sld xmlns:a="http://schemas.openxmlformats.org/drawingml/2006/main" xmlns:r="http://schemas.openxmlformats.org/officeDocument/2006/relationships" xmlns:p="http://schemas.openxmlformats.org/presentationml/2006/main">
-  <p:cSld>
-    <p:spTree>
-      <p:nvGrpSpPr>
-        <p:cNvPr id="1" name=""/>
-        <p:cNvGrpSpPr/>
-        <p:nvPr/>
-      </p:nvGrpSpPr>
-      <p:grpSpPr>
-        <a:xfrm>
-          <a:off x="0" y="0"/>
-          <a:ext cx="0" cy="0"/>
-          <a:chOff x="0" y="0"/>
-          <a:chExt cx="0" cy="0"/>
-        </a:xfrm>
-      </p:grpSpPr>
-      <p:sp>
-        <p:nvSpPr>
-          <p:cNvPr id="2" name="Rechteck 1"/>
-          <p:cNvSpPr/>
-          <p:nvPr/>
-        </p:nvSpPr>
-        <p:spPr>
-          <a:xfrm>
-            <a:off x="899880" y="2699880"/>
-            <a:ext cx="9000001" cy="5400001"/>
-          </a:xfrm>
-          <a:prstGeom prst="rect">
-            <a:avLst/>
-          </a:prstGeom>
-          <a:solidFill>
-            <a:srgbClr val="00247D"/>
-          </a:solidFill>
-          <a:ln>
-            <a:noFill/>
-          </a:ln>
-        </p:spPr>
-        <p:style>
-          <a:lnRef idx="2">
-            <a:schemeClr val="accent1">
-              <a:shade val="50000"/>
-            </a:schemeClr>
-          </a:lnRef>
-          <a:fillRef idx="1">
-            <a:schemeClr val="accent1"/>
-          </a:fillRef>
-          <a:effectRef idx="0">
-            <a:schemeClr val="accent1"/>
-          </a:effectRef>
-          <a:fontRef idx="minor">
-            <a:schemeClr val="lt1"/>
-          </a:fontRef>
-        </p:style>
-        <p:txBody>
-          <a:bodyPr rtlCol="0" anchor="ctr"/>
-          <a:lstStyle/>
-          <a:p>
-            <a:pPr algn="ctr"/>
-            <a:endParaRPr lang="de-DE"/>
-          </a:p>
-        </p:txBody>
-      </p:sp>
-      <p:sp>
-        <p:nvSpPr>
-          <p:cNvPr id="8" name="Diagonaler Streifen 7"/>
-          <p:cNvSpPr/>
-          <p:nvPr/>
-        </p:nvSpPr>
-        <p:spPr>
-          <a:xfrm>
-            <a:off x="899881" y="2699881"/>
-            <a:ext cx="9000000" cy="5400000"/>
-          </a:xfrm>
-          <a:prstGeom prst="diagStripe">
-            <a:avLst>
-              <a:gd name="adj" fmla="val 88241"/>
-            </a:avLst>
-          </a:prstGeom>
-          <a:solidFill>
-            <a:schemeClr val="bg1"/>
-          </a:solidFill>
-          <a:ln>
-            <a:noFill/>
-          </a:ln>
-        </p:spPr>
-        <p:style>
-          <a:lnRef idx="2">
-            <a:schemeClr val="accent1">
-              <a:shade val="50000"/>
-            </a:schemeClr>
-          </a:lnRef>
-          <a:fillRef idx="1">
-            <a:schemeClr val="accent1"/>
-          </a:fillRef>
-          <a:effectRef idx="0">
-            <a:schemeClr val="accent1"/>
-          </a:effectRef>
-          <a:fontRef idx="minor">
-            <a:schemeClr val="lt1"/>
-          </a:fontRef>
-        </p:style>
-        <p:txBody>
-          <a:bodyPr rtlCol="0" anchor="ctr"/>
-          <a:lstStyle/>
-          <a:p>
-            <a:pPr algn="ctr"/>
-            <a:endParaRPr lang="de-DE"/>
-          </a:p>
-        </p:txBody>
-      </p:sp>
-      <p:sp>
-        <p:nvSpPr>
-          <p:cNvPr id="9" name="Diagonaler Streifen 8"/>
-          <p:cNvSpPr/>
-          <p:nvPr/>
-        </p:nvSpPr>
-        <p:spPr>
-          <a:xfrm rot="10800000">
-            <a:off x="899882" y="2699881"/>
-            <a:ext cx="9000000" cy="5400000"/>
-          </a:xfrm>
-          <a:prstGeom prst="diagStripe">
-            <a:avLst>
-              <a:gd name="adj" fmla="val 88241"/>
-            </a:avLst>
-          </a:prstGeom>
-          <a:solidFill>
-            <a:schemeClr val="bg1"/>
-          </a:solidFill>
-          <a:ln>
-            <a:noFill/>
-          </a:ln>
-        </p:spPr>
-        <p:style>
-          <a:lnRef idx="2">
-            <a:schemeClr val="accent1">
-              <a:shade val="50000"/>
-            </a:schemeClr>
-          </a:lnRef>
-          <a:fillRef idx="1">
-            <a:schemeClr val="accent1"/>
-          </a:fillRef>
-          <a:effectRef idx="0">
-            <a:schemeClr val="accent1"/>
-          </a:effectRef>
-          <a:fontRef idx="minor">
-            <a:schemeClr val="lt1"/>
-          </a:fontRef>
-        </p:style>
-        <p:txBody>
-          <a:bodyPr rtlCol="0" anchor="ctr"/>
-          <a:lstStyle/>
-          <a:p>
-            <a:pPr algn="ctr"/>
-            <a:endParaRPr lang="de-DE"/>
-          </a:p>
-        </p:txBody>
-      </p:sp>
-      <p:sp>
-        <p:nvSpPr>
-          <p:cNvPr id="10" name="Diagonaler Streifen 9"/>
-          <p:cNvSpPr/>
-          <p:nvPr/>
-        </p:nvSpPr>
-        <p:spPr>
-          <a:xfrm flipH="1">
-            <a:off x="899880" y="2699882"/>
-            <a:ext cx="9000000" cy="5400000"/>
-          </a:xfrm>
-          <a:prstGeom prst="diagStripe">
-            <a:avLst>
-              <a:gd name="adj" fmla="val 88241"/>
-            </a:avLst>
-          </a:prstGeom>
-          <a:solidFill>
-            <a:schemeClr val="bg1"/>
-          </a:solidFill>
-          <a:ln>
-            <a:noFill/>
-          </a:ln>
-        </p:spPr>
-        <p:style>
-          <a:lnRef idx="2">
-            <a:schemeClr val="accent1">
-              <a:shade val="50000"/>
-            </a:schemeClr>
-          </a:lnRef>
-          <a:fillRef idx="1">
-            <a:schemeClr val="accent1"/>
-          </a:fillRef>
-          <a:effectRef idx="0">
-            <a:schemeClr val="accent1"/>
-          </a:effectRef>
-          <a:fontRef idx="minor">
-            <a:schemeClr val="lt1"/>
-          </a:fontRef>
-        </p:style>
-        <p:txBody>
-          <a:bodyPr rtlCol="0" anchor="ctr"/>
-          <a:lstStyle/>
-          <a:p>
-            <a:pPr algn="ctr"/>
-            <a:endParaRPr lang="de-DE"/>
-          </a:p>
-        </p:txBody>
-      </p:sp>
-      <p:sp>
-        <p:nvSpPr>
-          <p:cNvPr id="11" name="Diagonaler Streifen 10"/>
-          <p:cNvSpPr/>
-          <p:nvPr/>
-        </p:nvSpPr>
-        <p:spPr>
-          <a:xfrm rot="10800000" flipH="1">
-            <a:off x="899881" y="2699882"/>
-            <a:ext cx="9000000" cy="5400000"/>
-          </a:xfrm>
-          <a:prstGeom prst="diagStripe">
-            <a:avLst>
-              <a:gd name="adj" fmla="val 88241"/>
-            </a:avLst>
-          </a:prstGeom>
-          <a:solidFill>
-            <a:schemeClr val="bg1"/>
-          </a:solidFill>
-          <a:ln>
-            <a:noFill/>
-          </a:ln>
-        </p:spPr>
-        <p:style>
-          <a:lnRef idx="2">
-            <a:schemeClr val="accent1">
-              <a:shade val="50000"/>
-            </a:schemeClr>
-          </a:lnRef>
-          <a:fillRef idx="1">
-            <a:schemeClr val="accent1"/>
-          </a:fillRef>
-          <a:effectRef idx="0">
-            <a:schemeClr val="accent1"/>
-          </a:effectRef>
-          <a:fontRef idx="minor">
-            <a:schemeClr val="lt1"/>
-          </a:fontRef>
-        </p:style>
-        <p:txBody>
-          <a:bodyPr rtlCol="0" anchor="ctr"/>
-          <a:lstStyle/>
-          <a:p>
-            <a:pPr algn="ctr"/>
-            <a:endParaRPr lang="de-DE"/>
-          </a:p>
-        </p:txBody>
-      </p:sp>
-      <p:sp>
-        <p:nvSpPr>
-          <p:cNvPr id="18" name="Diagonaler Streifen 17"/>
-          <p:cNvSpPr/>
-          <p:nvPr/>
-        </p:nvSpPr>
-        <p:spPr>
-          <a:xfrm rot="10800000" flipH="1">
-            <a:off x="899880" y="2699879"/>
-            <a:ext cx="9000000" cy="5400000"/>
-          </a:xfrm>
-          <a:prstGeom prst="diagStripe">
-            <a:avLst>
-              <a:gd name="adj" fmla="val 91909"/>
-            </a:avLst>
-          </a:prstGeom>
-          <a:gradFill>
-            <a:gsLst>
-              <a:gs pos="49000">
-                <a:schemeClr val="accent1">
-                  <a:lumMod val="5000"/>
-                  <a:lumOff val="95000"/>
-                </a:schemeClr>
-              </a:gs>
-              <a:gs pos="51000">
-                <a:srgbClr val="CF142B"/>
-              </a:gs>
-            </a:gsLst>
-            <a:lin ang="5400000" scaled="1"/>
-          </a:gradFill>
-          <a:ln>
-            <a:noFill/>
-          </a:ln>
-        </p:spPr>
-        <p:style>
-          <a:lnRef idx="2">
-            <a:schemeClr val="accent1">
-              <a:shade val="50000"/>
-            </a:schemeClr>
-          </a:lnRef>
-          <a:fillRef idx="1">
-            <a:schemeClr val="accent1"/>
-          </a:fillRef>
-          <a:effectRef idx="0">
-            <a:schemeClr val="accent1"/>
-          </a:effectRef>
-          <a:fontRef idx="minor">
-            <a:schemeClr val="lt1"/>
-          </a:fontRef>
-        </p:style>
-        <p:txBody>
-          <a:bodyPr rtlCol="0" anchor="ctr"/>
-          <a:lstStyle/>
-          <a:p>
-            <a:pPr algn="ctr"/>
-            <a:endParaRPr lang="de-DE"/>
-          </a:p>
-        </p:txBody>
-      </p:sp>
-      <p:sp>
-        <p:nvSpPr>
-          <p:cNvPr id="19" name="Diagonaler Streifen 18"/>
-          <p:cNvSpPr/>
-          <p:nvPr/>
-        </p:nvSpPr>
-        <p:spPr>
-          <a:xfrm>
-            <a:off x="899880" y="2699880"/>
-            <a:ext cx="9000000" cy="5400000"/>
-          </a:xfrm>
-          <a:prstGeom prst="diagStripe">
-            <a:avLst>
-              <a:gd name="adj" fmla="val 91909"/>
-            </a:avLst>
-          </a:prstGeom>
-          <a:gradFill>
-            <a:gsLst>
-              <a:gs pos="49000">
-                <a:schemeClr val="accent1">
-                  <a:lumMod val="5000"/>
-                  <a:lumOff val="95000"/>
-                </a:schemeClr>
-              </a:gs>
-              <a:gs pos="46000">
-                <a:srgbClr val="CF142B"/>
-              </a:gs>
-            </a:gsLst>
-            <a:lin ang="5400000" scaled="1"/>
-          </a:gradFill>
-          <a:ln>
-            <a:noFill/>
-          </a:ln>
-        </p:spPr>
-        <p:style>
-          <a:lnRef idx="2">
-            <a:schemeClr val="accent1">
-              <a:shade val="50000"/>
-            </a:schemeClr>
-          </a:lnRef>
-          <a:fillRef idx="1">
-            <a:schemeClr val="accent1"/>
-          </a:fillRef>
-          <a:effectRef idx="0">
-            <a:schemeClr val="accent1"/>
-          </a:effectRef>
-          <a:fontRef idx="minor">
-            <a:schemeClr val="lt1"/>
-          </a:fontRef>
-        </p:style>
-        <p:txBody>
-          <a:bodyPr rtlCol="0" anchor="ctr"/>
-          <a:lstStyle/>
-          <a:p>
-            <a:pPr algn="ctr"/>
-            <a:endParaRPr lang="de-DE"/>
-          </a:p>
-        </p:txBody>
-      </p:sp>
-      <p:sp>
-        <p:nvSpPr>
-          <p:cNvPr id="20" name="Diagonaler Streifen 19"/>
-          <p:cNvSpPr/>
-          <p:nvPr/>
-        </p:nvSpPr>
-        <p:spPr>
-          <a:xfrm flipH="1">
-            <a:off x="899877" y="2699875"/>
-            <a:ext cx="9000000" cy="5400000"/>
-          </a:xfrm>
-          <a:prstGeom prst="diagStripe">
-            <a:avLst>
-              <a:gd name="adj" fmla="val 91909"/>
-            </a:avLst>
-          </a:prstGeom>
-          <a:gradFill>
-            <a:gsLst>
-              <a:gs pos="49000">
-                <a:schemeClr val="accent1">
-                  <a:lumMod val="5000"/>
-                  <a:lumOff val="95000"/>
-                </a:schemeClr>
-              </a:gs>
-              <a:gs pos="51000">
-                <a:srgbClr val="CF142B"/>
-              </a:gs>
-            </a:gsLst>
-            <a:lin ang="5400000" scaled="1"/>
-          </a:gradFill>
-          <a:ln>
-            <a:noFill/>
-          </a:ln>
-        </p:spPr>
-        <p:style>
-          <a:lnRef idx="2">
-            <a:schemeClr val="accent1">
-              <a:shade val="50000"/>
-            </a:schemeClr>
-          </a:lnRef>
-          <a:fillRef idx="1">
-            <a:schemeClr val="accent1"/>
-          </a:fillRef>
-          <a:effectRef idx="0">
-            <a:schemeClr val="accent1"/>
-          </a:effectRef>
-          <a:fontRef idx="minor">
-            <a:schemeClr val="lt1"/>
-          </a:fontRef>
-        </p:style>
-        <p:txBody>
-          <a:bodyPr rtlCol="0" anchor="ctr"/>
-          <a:lstStyle/>
-          <a:p>
-            <a:pPr algn="ctr"/>
-            <a:endParaRPr lang="de-DE"/>
-          </a:p>
-        </p:txBody>
-      </p:sp>
-      <p:sp>
-        <p:nvSpPr>
-          <p:cNvPr id="21" name="Diagonaler Streifen 20"/>
-          <p:cNvSpPr/>
-          <p:nvPr/>
-        </p:nvSpPr>
-        <p:spPr>
-          <a:xfrm rot="10800000">
-            <a:off x="899877" y="2699876"/>
-            <a:ext cx="9000000" cy="5400000"/>
-          </a:xfrm>
-          <a:prstGeom prst="diagStripe">
-            <a:avLst>
-              <a:gd name="adj" fmla="val 91909"/>
-            </a:avLst>
-          </a:prstGeom>
-          <a:gradFill>
-            <a:gsLst>
-              <a:gs pos="49000">
-                <a:schemeClr val="accent1">
-                  <a:lumMod val="5000"/>
-                  <a:lumOff val="95000"/>
-                </a:schemeClr>
-              </a:gs>
-              <a:gs pos="46000">
-                <a:srgbClr val="CF142B"/>
-              </a:gs>
-            </a:gsLst>
-            <a:lin ang="5400000" scaled="1"/>
-          </a:gradFill>
-          <a:ln>
-            <a:noFill/>
-          </a:ln>
-        </p:spPr>
-        <p:style>
-          <a:lnRef idx="2">
-            <a:schemeClr val="accent1">
-              <a:shade val="50000"/>
-            </a:schemeClr>
-          </a:lnRef>
-          <a:fillRef idx="1">
-            <a:schemeClr val="accent1"/>
-          </a:fillRef>
-          <a:effectRef idx="0">
-            <a:schemeClr val="accent1"/>
-          </a:effectRef>
-          <a:fontRef idx="minor">
-            <a:schemeClr val="lt1"/>
-          </a:fontRef>
-        </p:style>
-        <p:txBody>
-          <a:bodyPr rtlCol="0" anchor="ctr"/>
-          <a:lstStyle/>
-          <a:p>
-            <a:pPr algn="ctr"/>
-            <a:endParaRPr lang="de-DE"/>
-          </a:p>
-        </p:txBody>
-      </p:sp>
-      <p:sp>
-        <p:nvSpPr>
-          <p:cNvPr id="13" name="Rechteck 12"/>
-          <p:cNvSpPr/>
-          <p:nvPr/>
-        </p:nvSpPr>
-        <p:spPr>
-          <a:xfrm>
-            <a:off x="899880" y="5927883"/>
-            <a:ext cx="9000000" cy="276995"/>
-          </a:xfrm>
-          <a:prstGeom prst="rect">
-            <a:avLst/>
-          </a:prstGeom>
-          <a:solidFill>
-            <a:schemeClr val="bg1"/>
-          </a:solidFill>
-          <a:ln>
-            <a:noFill/>
-          </a:ln>
-        </p:spPr>
-        <p:style>
-          <a:lnRef idx="2">
-            <a:schemeClr val="accent1">
-              <a:shade val="50000"/>
-            </a:schemeClr>
-          </a:lnRef>
-          <a:fillRef idx="1">
-            <a:schemeClr val="accent1"/>
-          </a:fillRef>
-          <a:effectRef idx="0">
-            <a:schemeClr val="accent1"/>
-          </a:effectRef>
-          <a:fontRef idx="minor">
-            <a:schemeClr val="lt1"/>
-          </a:fontRef>
-        </p:style>
-        <p:txBody>
-          <a:bodyPr rtlCol="0" anchor="ctr"/>
-          <a:lstStyle/>
-          <a:p>
-            <a:pPr algn="ctr"/>
-            <a:endParaRPr lang="de-DE"/>
-          </a:p>
-        </p:txBody>
-      </p:sp>
-      <p:sp>
-        <p:nvSpPr>
-          <p:cNvPr id="14" name="Rechteck 13"/>
-          <p:cNvSpPr/>
-          <p:nvPr/>
-        </p:nvSpPr>
-        <p:spPr>
-          <a:xfrm>
-            <a:off x="899877" y="4594640"/>
-            <a:ext cx="9000000" cy="276995"/>
-          </a:xfrm>
-          <a:prstGeom prst="rect">
-            <a:avLst/>
-          </a:prstGeom>
-          <a:solidFill>
-            <a:schemeClr val="bg1"/>
-          </a:solidFill>
-          <a:ln>
-            <a:noFill/>
-          </a:ln>
-        </p:spPr>
-        <p:style>
-          <a:lnRef idx="2">
-            <a:schemeClr val="accent1">
-              <a:shade val="50000"/>
-            </a:schemeClr>
-          </a:lnRef>
-          <a:fillRef idx="1">
-            <a:schemeClr val="accent1"/>
-          </a:fillRef>
-          <a:effectRef idx="0">
-            <a:schemeClr val="accent1"/>
-          </a:effectRef>
-          <a:fontRef idx="minor">
-            <a:schemeClr val="lt1"/>
-          </a:fontRef>
-        </p:style>
-        <p:txBody>
-          <a:bodyPr rtlCol="0" anchor="ctr"/>
-          <a:lstStyle/>
-          <a:p>
-            <a:pPr algn="ctr"/>
-            <a:endParaRPr lang="de-DE"/>
-          </a:p>
-        </p:txBody>
-      </p:sp>
-      <p:sp>
-        <p:nvSpPr>
-          <p:cNvPr id="7" name="Rechteck 6"/>
-          <p:cNvSpPr/>
-          <p:nvPr/>
-        </p:nvSpPr>
-        <p:spPr>
-          <a:xfrm rot="5400000">
-            <a:off x="2699881" y="4871641"/>
-            <a:ext cx="5400000" cy="1056481"/>
-          </a:xfrm>
-          <a:prstGeom prst="rect">
-            <a:avLst/>
-          </a:prstGeom>
-          <a:solidFill>
-            <a:srgbClr val="CF142B"/>
-          </a:solidFill>
-          <a:ln>
-            <a:noFill/>
-          </a:ln>
-        </p:spPr>
-        <p:style>
-          <a:lnRef idx="2">
-            <a:schemeClr val="accent1">
-              <a:shade val="50000"/>
-            </a:schemeClr>
-          </a:lnRef>
-          <a:fillRef idx="1">
-            <a:schemeClr val="accent1"/>
-          </a:fillRef>
-          <a:effectRef idx="0">
-            <a:schemeClr val="accent1"/>
-          </a:effectRef>
-          <a:fontRef idx="minor">
-            <a:schemeClr val="lt1"/>
-          </a:fontRef>
-        </p:style>
-        <p:txBody>
-          <a:bodyPr rtlCol="0" anchor="ctr"/>
-          <a:lstStyle/>
-          <a:p>
-            <a:pPr algn="ctr"/>
-            <a:endParaRPr lang="de-DE"/>
-          </a:p>
-        </p:txBody>
-      </p:sp>
-      <p:sp>
-        <p:nvSpPr>
-          <p:cNvPr id="22" name="Rechteck 21"/>
-          <p:cNvSpPr/>
-          <p:nvPr/>
-        </p:nvSpPr>
-        <p:spPr>
-          <a:xfrm rot="5400000">
-            <a:off x="3366722" y="5261275"/>
-            <a:ext cx="5400000" cy="277200"/>
-          </a:xfrm>
-          <a:prstGeom prst="rect">
-            <a:avLst/>
-          </a:prstGeom>
-          <a:solidFill>
-            <a:schemeClr val="bg1"/>
-          </a:solidFill>
-          <a:ln>
-            <a:noFill/>
-          </a:ln>
-        </p:spPr>
-        <p:style>
-          <a:lnRef idx="2">
-            <a:schemeClr val="accent1">
-              <a:shade val="50000"/>
-            </a:schemeClr>
-          </a:lnRef>
-          <a:fillRef idx="1">
-            <a:schemeClr val="accent1"/>
-          </a:fillRef>
-          <a:effectRef idx="0">
-            <a:schemeClr val="accent1"/>
-          </a:effectRef>
-          <a:fontRef idx="minor">
-            <a:schemeClr val="lt1"/>
-          </a:fontRef>
-        </p:style>
-        <p:txBody>
-          <a:bodyPr rtlCol="0" anchor="ctr"/>
-          <a:lstStyle/>
-          <a:p>
-            <a:pPr algn="ctr"/>
-            <a:endParaRPr lang="de-DE"/>
-          </a:p>
-        </p:txBody>
-      </p:sp>
-      <p:sp>
-        <p:nvSpPr>
-          <p:cNvPr id="23" name="Rechteck 22"/>
-          <p:cNvSpPr/>
-          <p:nvPr/>
-        </p:nvSpPr>
-        <p:spPr>
-          <a:xfrm rot="5400000">
-            <a:off x="2128561" y="5261269"/>
-            <a:ext cx="5400000" cy="277200"/>
-          </a:xfrm>
-          <a:prstGeom prst="rect">
-            <a:avLst/>
-          </a:prstGeom>
-          <a:solidFill>
-            <a:schemeClr val="bg1"/>
-          </a:solidFill>
-          <a:ln>
-            <a:noFill/>
-          </a:ln>
-        </p:spPr>
-        <p:style>
-          <a:lnRef idx="2">
-            <a:schemeClr val="accent1">
-              <a:shade val="50000"/>
-            </a:schemeClr>
-          </a:lnRef>
-          <a:fillRef idx="1">
-            <a:schemeClr val="accent1"/>
-          </a:fillRef>
-          <a:effectRef idx="0">
-            <a:schemeClr val="accent1"/>
-          </a:effectRef>
-          <a:fontRef idx="minor">
-            <a:schemeClr val="lt1"/>
-          </a:fontRef>
-        </p:style>
-        <p:txBody>
-          <a:bodyPr rtlCol="0" anchor="ctr"/>
-          <a:lstStyle/>
-          <a:p>
-            <a:pPr algn="ctr"/>
-            <a:endParaRPr lang="de-DE"/>
-          </a:p>
-        </p:txBody>
-      </p:sp>
-      <p:sp>
-        <p:nvSpPr>
-          <p:cNvPr id="5" name="Rechteck 4"/>
-          <p:cNvSpPr/>
-          <p:nvPr/>
-        </p:nvSpPr>
-        <p:spPr>
-          <a:xfrm>
-            <a:off x="899881" y="4871641"/>
-            <a:ext cx="9000000" cy="1056481"/>
-          </a:xfrm>
-          <a:prstGeom prst="rect">
-            <a:avLst/>
-          </a:prstGeom>
-          <a:solidFill>
-            <a:srgbClr val="CF142B"/>
-          </a:solidFill>
-          <a:ln>
-            <a:noFill/>
-          </a:ln>
-        </p:spPr>
-        <p:style>
-          <a:lnRef idx="2">
-            <a:schemeClr val="accent1">
-              <a:shade val="50000"/>
-            </a:schemeClr>
-          </a:lnRef>
-          <a:fillRef idx="1">
-            <a:schemeClr val="accent1"/>
-          </a:fillRef>
-          <a:effectRef idx="0">
-            <a:schemeClr val="accent1"/>
-          </a:effectRef>
-          <a:fontRef idx="minor">
-            <a:schemeClr val="lt1"/>
-          </a:fontRef>
-        </p:style>
-        <p:txBody>
-          <a:bodyPr rtlCol="0" anchor="ctr"/>
-          <a:lstStyle/>
-          <a:p>
-            <a:pPr algn="ctr"/>
-            <a:endParaRPr lang="de-DE"/>
-          </a:p>
-        </p:txBody>
-      </p:sp>
-    </p:spTree>
-    <p:extLst>
-      <p:ext uri="{BB962C8B-B14F-4D97-AF65-F5344CB8AC3E}">
-        <p14:creationId xmlns:p14="http://schemas.microsoft.com/office/powerpoint/2010/main" val="2514809845"/>
-      </p:ext>
-    </p:extLst>
-  </p:cSld>
-  <p:clrMapOvr>
-    <a:masterClrMapping/>
-  </p:clrMapOvr>
-</p:sld>
-</file>
-
-<file path=ppt/slides/slide2.xml><?xml version="1.0" encoding="utf-8"?>
-<p:sld xmlns:a="http://schemas.openxmlformats.org/drawingml/2006/main" xmlns:r="http://schemas.openxmlformats.org/officeDocument/2006/relationships" xmlns:p="http://schemas.openxmlformats.org/presentationml/2006/main">
-  <p:cSld>
-    <p:spTree>
-      <p:nvGrpSpPr>
-        <p:cNvPr id="1" name=""/>
-        <p:cNvGrpSpPr/>
-        <p:nvPr/>
-      </p:nvGrpSpPr>
-      <p:grpSpPr>
-        <a:xfrm>
-          <a:off x="0" y="0"/>
-          <a:ext cx="0" cy="0"/>
-          <a:chOff x="0" y="0"/>
-          <a:chExt cx="0" cy="0"/>
-        </a:xfrm>
-      </p:grpSpPr>
       <p:sp>
         <p:nvSpPr>
           <p:cNvPr id="2" name="Rechteck: abgerundete Ecken 1"/>
@@ -9119,7 +8749,2665 @@
 </p:sld>
 </file>
 
+<file path=ppt/slides/slide20.xml><?xml version="1.0" encoding="utf-8"?>
+<p:sld xmlns:a="http://schemas.openxmlformats.org/drawingml/2006/main" xmlns:r="http://schemas.openxmlformats.org/officeDocument/2006/relationships" xmlns:p="http://schemas.openxmlformats.org/presentationml/2006/main">
+  <p:cSld>
+    <p:spTree>
+      <p:nvGrpSpPr>
+        <p:cNvPr id="1" name=""/>
+        <p:cNvGrpSpPr/>
+        <p:nvPr/>
+      </p:nvGrpSpPr>
+      <p:grpSpPr>
+        <a:xfrm>
+          <a:off x="0" y="0"/>
+          <a:ext cx="0" cy="0"/>
+          <a:chOff x="0" y="0"/>
+          <a:chExt cx="0" cy="0"/>
+        </a:xfrm>
+      </p:grpSpPr>
+      <p:sp>
+        <p:nvSpPr>
+          <p:cNvPr id="4" name="Rechteck 3"/>
+          <p:cNvSpPr/>
+          <p:nvPr/>
+        </p:nvSpPr>
+        <p:spPr>
+          <a:xfrm>
+            <a:off x="899881" y="2699881"/>
+            <a:ext cx="9000000" cy="1800000"/>
+          </a:xfrm>
+          <a:prstGeom prst="rect">
+            <a:avLst/>
+          </a:prstGeom>
+          <a:solidFill>
+            <a:schemeClr val="tx1"/>
+          </a:solidFill>
+          <a:ln>
+            <a:noFill/>
+          </a:ln>
+        </p:spPr>
+        <p:style>
+          <a:lnRef idx="2">
+            <a:schemeClr val="accent1">
+              <a:shade val="50000"/>
+            </a:schemeClr>
+          </a:lnRef>
+          <a:fillRef idx="1">
+            <a:schemeClr val="accent1"/>
+          </a:fillRef>
+          <a:effectRef idx="0">
+            <a:schemeClr val="accent1"/>
+          </a:effectRef>
+          <a:fontRef idx="minor">
+            <a:schemeClr val="lt1"/>
+          </a:fontRef>
+        </p:style>
+        <p:txBody>
+          <a:bodyPr rtlCol="0" anchor="ctr"/>
+          <a:lstStyle/>
+          <a:p>
+            <a:pPr algn="ctr"/>
+            <a:endParaRPr lang="de-DE"/>
+          </a:p>
+        </p:txBody>
+      </p:sp>
+      <p:sp>
+        <p:nvSpPr>
+          <p:cNvPr id="5" name="Rechteck 4"/>
+          <p:cNvSpPr/>
+          <p:nvPr/>
+        </p:nvSpPr>
+        <p:spPr>
+          <a:xfrm>
+            <a:off x="899881" y="4499881"/>
+            <a:ext cx="9000000" cy="1800000"/>
+          </a:xfrm>
+          <a:prstGeom prst="rect">
+            <a:avLst/>
+          </a:prstGeom>
+          <a:solidFill>
+            <a:srgbClr val="C00000"/>
+          </a:solidFill>
+          <a:ln>
+            <a:noFill/>
+          </a:ln>
+        </p:spPr>
+        <p:style>
+          <a:lnRef idx="2">
+            <a:schemeClr val="accent1">
+              <a:shade val="50000"/>
+            </a:schemeClr>
+          </a:lnRef>
+          <a:fillRef idx="1">
+            <a:schemeClr val="accent1"/>
+          </a:fillRef>
+          <a:effectRef idx="0">
+            <a:schemeClr val="accent1"/>
+          </a:effectRef>
+          <a:fontRef idx="minor">
+            <a:schemeClr val="lt1"/>
+          </a:fontRef>
+        </p:style>
+        <p:txBody>
+          <a:bodyPr rtlCol="0" anchor="ctr"/>
+          <a:lstStyle/>
+          <a:p>
+            <a:pPr algn="ctr"/>
+            <a:endParaRPr lang="de-DE"/>
+          </a:p>
+        </p:txBody>
+      </p:sp>
+      <p:sp>
+        <p:nvSpPr>
+          <p:cNvPr id="6" name="Rechteck 5"/>
+          <p:cNvSpPr/>
+          <p:nvPr/>
+        </p:nvSpPr>
+        <p:spPr>
+          <a:xfrm>
+            <a:off x="899881" y="6299883"/>
+            <a:ext cx="9000000" cy="1800000"/>
+          </a:xfrm>
+          <a:prstGeom prst="rect">
+            <a:avLst/>
+          </a:prstGeom>
+          <a:solidFill>
+            <a:srgbClr val="FFC000"/>
+          </a:solidFill>
+          <a:ln>
+            <a:noFill/>
+          </a:ln>
+        </p:spPr>
+        <p:style>
+          <a:lnRef idx="2">
+            <a:schemeClr val="accent1">
+              <a:shade val="50000"/>
+            </a:schemeClr>
+          </a:lnRef>
+          <a:fillRef idx="1">
+            <a:schemeClr val="accent1"/>
+          </a:fillRef>
+          <a:effectRef idx="0">
+            <a:schemeClr val="accent1"/>
+          </a:effectRef>
+          <a:fontRef idx="minor">
+            <a:schemeClr val="lt1"/>
+          </a:fontRef>
+        </p:style>
+        <p:txBody>
+          <a:bodyPr rtlCol="0" anchor="ctr"/>
+          <a:lstStyle/>
+          <a:p>
+            <a:pPr algn="ctr"/>
+            <a:endParaRPr lang="de-DE"/>
+          </a:p>
+        </p:txBody>
+      </p:sp>
+    </p:spTree>
+    <p:extLst>
+      <p:ext uri="{BB962C8B-B14F-4D97-AF65-F5344CB8AC3E}">
+        <p14:creationId xmlns:p14="http://schemas.microsoft.com/office/powerpoint/2010/main" val="2132650698"/>
+      </p:ext>
+    </p:extLst>
+  </p:cSld>
+  <p:clrMapOvr>
+    <a:masterClrMapping/>
+  </p:clrMapOvr>
+</p:sld>
+</file>
+
+<file path=ppt/slides/slide21.xml><?xml version="1.0" encoding="utf-8"?>
+<p:sld xmlns:a="http://schemas.openxmlformats.org/drawingml/2006/main" xmlns:r="http://schemas.openxmlformats.org/officeDocument/2006/relationships" xmlns:p="http://schemas.openxmlformats.org/presentationml/2006/main">
+  <p:cSld>
+    <p:spTree>
+      <p:nvGrpSpPr>
+        <p:cNvPr id="1" name=""/>
+        <p:cNvGrpSpPr/>
+        <p:nvPr/>
+      </p:nvGrpSpPr>
+      <p:grpSpPr>
+        <a:xfrm>
+          <a:off x="0" y="0"/>
+          <a:ext cx="0" cy="0"/>
+          <a:chOff x="0" y="0"/>
+          <a:chExt cx="0" cy="0"/>
+        </a:xfrm>
+      </p:grpSpPr>
+      <p:sp>
+        <p:nvSpPr>
+          <p:cNvPr id="2" name="Rechteck 1"/>
+          <p:cNvSpPr/>
+          <p:nvPr/>
+        </p:nvSpPr>
+        <p:spPr>
+          <a:xfrm>
+            <a:off x="899880" y="2699880"/>
+            <a:ext cx="9000001" cy="5400001"/>
+          </a:xfrm>
+          <a:prstGeom prst="rect">
+            <a:avLst/>
+          </a:prstGeom>
+          <a:solidFill>
+            <a:srgbClr val="00247D"/>
+          </a:solidFill>
+          <a:ln>
+            <a:noFill/>
+          </a:ln>
+        </p:spPr>
+        <p:style>
+          <a:lnRef idx="2">
+            <a:schemeClr val="accent1">
+              <a:shade val="50000"/>
+            </a:schemeClr>
+          </a:lnRef>
+          <a:fillRef idx="1">
+            <a:schemeClr val="accent1"/>
+          </a:fillRef>
+          <a:effectRef idx="0">
+            <a:schemeClr val="accent1"/>
+          </a:effectRef>
+          <a:fontRef idx="minor">
+            <a:schemeClr val="lt1"/>
+          </a:fontRef>
+        </p:style>
+        <p:txBody>
+          <a:bodyPr rtlCol="0" anchor="ctr"/>
+          <a:lstStyle/>
+          <a:p>
+            <a:pPr algn="ctr"/>
+            <a:endParaRPr lang="de-DE"/>
+          </a:p>
+        </p:txBody>
+      </p:sp>
+      <p:sp>
+        <p:nvSpPr>
+          <p:cNvPr id="8" name="Diagonaler Streifen 7"/>
+          <p:cNvSpPr/>
+          <p:nvPr/>
+        </p:nvSpPr>
+        <p:spPr>
+          <a:xfrm>
+            <a:off x="899881" y="2699881"/>
+            <a:ext cx="9000000" cy="5400000"/>
+          </a:xfrm>
+          <a:prstGeom prst="diagStripe">
+            <a:avLst>
+              <a:gd name="adj" fmla="val 88241"/>
+            </a:avLst>
+          </a:prstGeom>
+          <a:solidFill>
+            <a:schemeClr val="bg1"/>
+          </a:solidFill>
+          <a:ln>
+            <a:noFill/>
+          </a:ln>
+        </p:spPr>
+        <p:style>
+          <a:lnRef idx="2">
+            <a:schemeClr val="accent1">
+              <a:shade val="50000"/>
+            </a:schemeClr>
+          </a:lnRef>
+          <a:fillRef idx="1">
+            <a:schemeClr val="accent1"/>
+          </a:fillRef>
+          <a:effectRef idx="0">
+            <a:schemeClr val="accent1"/>
+          </a:effectRef>
+          <a:fontRef idx="minor">
+            <a:schemeClr val="lt1"/>
+          </a:fontRef>
+        </p:style>
+        <p:txBody>
+          <a:bodyPr rtlCol="0" anchor="ctr"/>
+          <a:lstStyle/>
+          <a:p>
+            <a:pPr algn="ctr"/>
+            <a:endParaRPr lang="de-DE"/>
+          </a:p>
+        </p:txBody>
+      </p:sp>
+      <p:sp>
+        <p:nvSpPr>
+          <p:cNvPr id="9" name="Diagonaler Streifen 8"/>
+          <p:cNvSpPr/>
+          <p:nvPr/>
+        </p:nvSpPr>
+        <p:spPr>
+          <a:xfrm rot="10800000">
+            <a:off x="899882" y="2699881"/>
+            <a:ext cx="9000000" cy="5400000"/>
+          </a:xfrm>
+          <a:prstGeom prst="diagStripe">
+            <a:avLst>
+              <a:gd name="adj" fmla="val 88241"/>
+            </a:avLst>
+          </a:prstGeom>
+          <a:solidFill>
+            <a:schemeClr val="bg1"/>
+          </a:solidFill>
+          <a:ln>
+            <a:noFill/>
+          </a:ln>
+        </p:spPr>
+        <p:style>
+          <a:lnRef idx="2">
+            <a:schemeClr val="accent1">
+              <a:shade val="50000"/>
+            </a:schemeClr>
+          </a:lnRef>
+          <a:fillRef idx="1">
+            <a:schemeClr val="accent1"/>
+          </a:fillRef>
+          <a:effectRef idx="0">
+            <a:schemeClr val="accent1"/>
+          </a:effectRef>
+          <a:fontRef idx="minor">
+            <a:schemeClr val="lt1"/>
+          </a:fontRef>
+        </p:style>
+        <p:txBody>
+          <a:bodyPr rtlCol="0" anchor="ctr"/>
+          <a:lstStyle/>
+          <a:p>
+            <a:pPr algn="ctr"/>
+            <a:endParaRPr lang="de-DE"/>
+          </a:p>
+        </p:txBody>
+      </p:sp>
+      <p:sp>
+        <p:nvSpPr>
+          <p:cNvPr id="10" name="Diagonaler Streifen 9"/>
+          <p:cNvSpPr/>
+          <p:nvPr/>
+        </p:nvSpPr>
+        <p:spPr>
+          <a:xfrm flipH="1">
+            <a:off x="899880" y="2699882"/>
+            <a:ext cx="9000000" cy="5400000"/>
+          </a:xfrm>
+          <a:prstGeom prst="diagStripe">
+            <a:avLst>
+              <a:gd name="adj" fmla="val 88241"/>
+            </a:avLst>
+          </a:prstGeom>
+          <a:solidFill>
+            <a:schemeClr val="bg1"/>
+          </a:solidFill>
+          <a:ln>
+            <a:noFill/>
+          </a:ln>
+        </p:spPr>
+        <p:style>
+          <a:lnRef idx="2">
+            <a:schemeClr val="accent1">
+              <a:shade val="50000"/>
+            </a:schemeClr>
+          </a:lnRef>
+          <a:fillRef idx="1">
+            <a:schemeClr val="accent1"/>
+          </a:fillRef>
+          <a:effectRef idx="0">
+            <a:schemeClr val="accent1"/>
+          </a:effectRef>
+          <a:fontRef idx="minor">
+            <a:schemeClr val="lt1"/>
+          </a:fontRef>
+        </p:style>
+        <p:txBody>
+          <a:bodyPr rtlCol="0" anchor="ctr"/>
+          <a:lstStyle/>
+          <a:p>
+            <a:pPr algn="ctr"/>
+            <a:endParaRPr lang="de-DE"/>
+          </a:p>
+        </p:txBody>
+      </p:sp>
+      <p:sp>
+        <p:nvSpPr>
+          <p:cNvPr id="11" name="Diagonaler Streifen 10"/>
+          <p:cNvSpPr/>
+          <p:nvPr/>
+        </p:nvSpPr>
+        <p:spPr>
+          <a:xfrm rot="10800000" flipH="1">
+            <a:off x="899881" y="2699882"/>
+            <a:ext cx="9000000" cy="5400000"/>
+          </a:xfrm>
+          <a:prstGeom prst="diagStripe">
+            <a:avLst>
+              <a:gd name="adj" fmla="val 88241"/>
+            </a:avLst>
+          </a:prstGeom>
+          <a:solidFill>
+            <a:schemeClr val="bg1"/>
+          </a:solidFill>
+          <a:ln>
+            <a:noFill/>
+          </a:ln>
+        </p:spPr>
+        <p:style>
+          <a:lnRef idx="2">
+            <a:schemeClr val="accent1">
+              <a:shade val="50000"/>
+            </a:schemeClr>
+          </a:lnRef>
+          <a:fillRef idx="1">
+            <a:schemeClr val="accent1"/>
+          </a:fillRef>
+          <a:effectRef idx="0">
+            <a:schemeClr val="accent1"/>
+          </a:effectRef>
+          <a:fontRef idx="minor">
+            <a:schemeClr val="lt1"/>
+          </a:fontRef>
+        </p:style>
+        <p:txBody>
+          <a:bodyPr rtlCol="0" anchor="ctr"/>
+          <a:lstStyle/>
+          <a:p>
+            <a:pPr algn="ctr"/>
+            <a:endParaRPr lang="de-DE"/>
+          </a:p>
+        </p:txBody>
+      </p:sp>
+      <p:sp>
+        <p:nvSpPr>
+          <p:cNvPr id="18" name="Diagonaler Streifen 17"/>
+          <p:cNvSpPr/>
+          <p:nvPr/>
+        </p:nvSpPr>
+        <p:spPr>
+          <a:xfrm rot="10800000" flipH="1">
+            <a:off x="899880" y="2699879"/>
+            <a:ext cx="9000000" cy="5400000"/>
+          </a:xfrm>
+          <a:prstGeom prst="diagStripe">
+            <a:avLst>
+              <a:gd name="adj" fmla="val 91909"/>
+            </a:avLst>
+          </a:prstGeom>
+          <a:gradFill>
+            <a:gsLst>
+              <a:gs pos="49000">
+                <a:schemeClr val="accent1">
+                  <a:lumMod val="5000"/>
+                  <a:lumOff val="95000"/>
+                </a:schemeClr>
+              </a:gs>
+              <a:gs pos="51000">
+                <a:srgbClr val="CF142B"/>
+              </a:gs>
+            </a:gsLst>
+            <a:lin ang="5400000" scaled="1"/>
+          </a:gradFill>
+          <a:ln>
+            <a:noFill/>
+          </a:ln>
+        </p:spPr>
+        <p:style>
+          <a:lnRef idx="2">
+            <a:schemeClr val="accent1">
+              <a:shade val="50000"/>
+            </a:schemeClr>
+          </a:lnRef>
+          <a:fillRef idx="1">
+            <a:schemeClr val="accent1"/>
+          </a:fillRef>
+          <a:effectRef idx="0">
+            <a:schemeClr val="accent1"/>
+          </a:effectRef>
+          <a:fontRef idx="minor">
+            <a:schemeClr val="lt1"/>
+          </a:fontRef>
+        </p:style>
+        <p:txBody>
+          <a:bodyPr rtlCol="0" anchor="ctr"/>
+          <a:lstStyle/>
+          <a:p>
+            <a:pPr algn="ctr"/>
+            <a:endParaRPr lang="de-DE"/>
+          </a:p>
+        </p:txBody>
+      </p:sp>
+      <p:sp>
+        <p:nvSpPr>
+          <p:cNvPr id="19" name="Diagonaler Streifen 18"/>
+          <p:cNvSpPr/>
+          <p:nvPr/>
+        </p:nvSpPr>
+        <p:spPr>
+          <a:xfrm>
+            <a:off x="899880" y="2699880"/>
+            <a:ext cx="9000000" cy="5400000"/>
+          </a:xfrm>
+          <a:prstGeom prst="diagStripe">
+            <a:avLst>
+              <a:gd name="adj" fmla="val 91909"/>
+            </a:avLst>
+          </a:prstGeom>
+          <a:gradFill>
+            <a:gsLst>
+              <a:gs pos="49000">
+                <a:schemeClr val="accent1">
+                  <a:lumMod val="5000"/>
+                  <a:lumOff val="95000"/>
+                </a:schemeClr>
+              </a:gs>
+              <a:gs pos="46000">
+                <a:srgbClr val="CF142B"/>
+              </a:gs>
+            </a:gsLst>
+            <a:lin ang="5400000" scaled="1"/>
+          </a:gradFill>
+          <a:ln>
+            <a:noFill/>
+          </a:ln>
+        </p:spPr>
+        <p:style>
+          <a:lnRef idx="2">
+            <a:schemeClr val="accent1">
+              <a:shade val="50000"/>
+            </a:schemeClr>
+          </a:lnRef>
+          <a:fillRef idx="1">
+            <a:schemeClr val="accent1"/>
+          </a:fillRef>
+          <a:effectRef idx="0">
+            <a:schemeClr val="accent1"/>
+          </a:effectRef>
+          <a:fontRef idx="minor">
+            <a:schemeClr val="lt1"/>
+          </a:fontRef>
+        </p:style>
+        <p:txBody>
+          <a:bodyPr rtlCol="0" anchor="ctr"/>
+          <a:lstStyle/>
+          <a:p>
+            <a:pPr algn="ctr"/>
+            <a:endParaRPr lang="de-DE"/>
+          </a:p>
+        </p:txBody>
+      </p:sp>
+      <p:sp>
+        <p:nvSpPr>
+          <p:cNvPr id="20" name="Diagonaler Streifen 19"/>
+          <p:cNvSpPr/>
+          <p:nvPr/>
+        </p:nvSpPr>
+        <p:spPr>
+          <a:xfrm flipH="1">
+            <a:off x="899877" y="2699875"/>
+            <a:ext cx="9000000" cy="5400000"/>
+          </a:xfrm>
+          <a:prstGeom prst="diagStripe">
+            <a:avLst>
+              <a:gd name="adj" fmla="val 91909"/>
+            </a:avLst>
+          </a:prstGeom>
+          <a:gradFill>
+            <a:gsLst>
+              <a:gs pos="49000">
+                <a:schemeClr val="accent1">
+                  <a:lumMod val="5000"/>
+                  <a:lumOff val="95000"/>
+                </a:schemeClr>
+              </a:gs>
+              <a:gs pos="51000">
+                <a:srgbClr val="CF142B"/>
+              </a:gs>
+            </a:gsLst>
+            <a:lin ang="5400000" scaled="1"/>
+          </a:gradFill>
+          <a:ln>
+            <a:noFill/>
+          </a:ln>
+        </p:spPr>
+        <p:style>
+          <a:lnRef idx="2">
+            <a:schemeClr val="accent1">
+              <a:shade val="50000"/>
+            </a:schemeClr>
+          </a:lnRef>
+          <a:fillRef idx="1">
+            <a:schemeClr val="accent1"/>
+          </a:fillRef>
+          <a:effectRef idx="0">
+            <a:schemeClr val="accent1"/>
+          </a:effectRef>
+          <a:fontRef idx="minor">
+            <a:schemeClr val="lt1"/>
+          </a:fontRef>
+        </p:style>
+        <p:txBody>
+          <a:bodyPr rtlCol="0" anchor="ctr"/>
+          <a:lstStyle/>
+          <a:p>
+            <a:pPr algn="ctr"/>
+            <a:endParaRPr lang="de-DE"/>
+          </a:p>
+        </p:txBody>
+      </p:sp>
+      <p:sp>
+        <p:nvSpPr>
+          <p:cNvPr id="21" name="Diagonaler Streifen 20"/>
+          <p:cNvSpPr/>
+          <p:nvPr/>
+        </p:nvSpPr>
+        <p:spPr>
+          <a:xfrm rot="10800000">
+            <a:off x="899877" y="2699876"/>
+            <a:ext cx="9000000" cy="5400000"/>
+          </a:xfrm>
+          <a:prstGeom prst="diagStripe">
+            <a:avLst>
+              <a:gd name="adj" fmla="val 91909"/>
+            </a:avLst>
+          </a:prstGeom>
+          <a:gradFill>
+            <a:gsLst>
+              <a:gs pos="49000">
+                <a:schemeClr val="accent1">
+                  <a:lumMod val="5000"/>
+                  <a:lumOff val="95000"/>
+                </a:schemeClr>
+              </a:gs>
+              <a:gs pos="46000">
+                <a:srgbClr val="CF142B"/>
+              </a:gs>
+            </a:gsLst>
+            <a:lin ang="5400000" scaled="1"/>
+          </a:gradFill>
+          <a:ln>
+            <a:noFill/>
+          </a:ln>
+        </p:spPr>
+        <p:style>
+          <a:lnRef idx="2">
+            <a:schemeClr val="accent1">
+              <a:shade val="50000"/>
+            </a:schemeClr>
+          </a:lnRef>
+          <a:fillRef idx="1">
+            <a:schemeClr val="accent1"/>
+          </a:fillRef>
+          <a:effectRef idx="0">
+            <a:schemeClr val="accent1"/>
+          </a:effectRef>
+          <a:fontRef idx="minor">
+            <a:schemeClr val="lt1"/>
+          </a:fontRef>
+        </p:style>
+        <p:txBody>
+          <a:bodyPr rtlCol="0" anchor="ctr"/>
+          <a:lstStyle/>
+          <a:p>
+            <a:pPr algn="ctr"/>
+            <a:endParaRPr lang="de-DE"/>
+          </a:p>
+        </p:txBody>
+      </p:sp>
+      <p:sp>
+        <p:nvSpPr>
+          <p:cNvPr id="13" name="Rechteck 12"/>
+          <p:cNvSpPr/>
+          <p:nvPr/>
+        </p:nvSpPr>
+        <p:spPr>
+          <a:xfrm>
+            <a:off x="899880" y="5927883"/>
+            <a:ext cx="9000000" cy="276995"/>
+          </a:xfrm>
+          <a:prstGeom prst="rect">
+            <a:avLst/>
+          </a:prstGeom>
+          <a:solidFill>
+            <a:schemeClr val="bg1"/>
+          </a:solidFill>
+          <a:ln>
+            <a:noFill/>
+          </a:ln>
+        </p:spPr>
+        <p:style>
+          <a:lnRef idx="2">
+            <a:schemeClr val="accent1">
+              <a:shade val="50000"/>
+            </a:schemeClr>
+          </a:lnRef>
+          <a:fillRef idx="1">
+            <a:schemeClr val="accent1"/>
+          </a:fillRef>
+          <a:effectRef idx="0">
+            <a:schemeClr val="accent1"/>
+          </a:effectRef>
+          <a:fontRef idx="minor">
+            <a:schemeClr val="lt1"/>
+          </a:fontRef>
+        </p:style>
+        <p:txBody>
+          <a:bodyPr rtlCol="0" anchor="ctr"/>
+          <a:lstStyle/>
+          <a:p>
+            <a:pPr algn="ctr"/>
+            <a:endParaRPr lang="de-DE"/>
+          </a:p>
+        </p:txBody>
+      </p:sp>
+      <p:sp>
+        <p:nvSpPr>
+          <p:cNvPr id="14" name="Rechteck 13"/>
+          <p:cNvSpPr/>
+          <p:nvPr/>
+        </p:nvSpPr>
+        <p:spPr>
+          <a:xfrm>
+            <a:off x="899877" y="4594640"/>
+            <a:ext cx="9000000" cy="276995"/>
+          </a:xfrm>
+          <a:prstGeom prst="rect">
+            <a:avLst/>
+          </a:prstGeom>
+          <a:solidFill>
+            <a:schemeClr val="bg1"/>
+          </a:solidFill>
+          <a:ln>
+            <a:noFill/>
+          </a:ln>
+        </p:spPr>
+        <p:style>
+          <a:lnRef idx="2">
+            <a:schemeClr val="accent1">
+              <a:shade val="50000"/>
+            </a:schemeClr>
+          </a:lnRef>
+          <a:fillRef idx="1">
+            <a:schemeClr val="accent1"/>
+          </a:fillRef>
+          <a:effectRef idx="0">
+            <a:schemeClr val="accent1"/>
+          </a:effectRef>
+          <a:fontRef idx="minor">
+            <a:schemeClr val="lt1"/>
+          </a:fontRef>
+        </p:style>
+        <p:txBody>
+          <a:bodyPr rtlCol="0" anchor="ctr"/>
+          <a:lstStyle/>
+          <a:p>
+            <a:pPr algn="ctr"/>
+            <a:endParaRPr lang="de-DE"/>
+          </a:p>
+        </p:txBody>
+      </p:sp>
+      <p:sp>
+        <p:nvSpPr>
+          <p:cNvPr id="7" name="Rechteck 6"/>
+          <p:cNvSpPr/>
+          <p:nvPr/>
+        </p:nvSpPr>
+        <p:spPr>
+          <a:xfrm rot="5400000">
+            <a:off x="2699881" y="4871641"/>
+            <a:ext cx="5400000" cy="1056481"/>
+          </a:xfrm>
+          <a:prstGeom prst="rect">
+            <a:avLst/>
+          </a:prstGeom>
+          <a:solidFill>
+            <a:srgbClr val="CF142B"/>
+          </a:solidFill>
+          <a:ln>
+            <a:noFill/>
+          </a:ln>
+        </p:spPr>
+        <p:style>
+          <a:lnRef idx="2">
+            <a:schemeClr val="accent1">
+              <a:shade val="50000"/>
+            </a:schemeClr>
+          </a:lnRef>
+          <a:fillRef idx="1">
+            <a:schemeClr val="accent1"/>
+          </a:fillRef>
+          <a:effectRef idx="0">
+            <a:schemeClr val="accent1"/>
+          </a:effectRef>
+          <a:fontRef idx="minor">
+            <a:schemeClr val="lt1"/>
+          </a:fontRef>
+        </p:style>
+        <p:txBody>
+          <a:bodyPr rtlCol="0" anchor="ctr"/>
+          <a:lstStyle/>
+          <a:p>
+            <a:pPr algn="ctr"/>
+            <a:endParaRPr lang="de-DE"/>
+          </a:p>
+        </p:txBody>
+      </p:sp>
+      <p:sp>
+        <p:nvSpPr>
+          <p:cNvPr id="22" name="Rechteck 21"/>
+          <p:cNvSpPr/>
+          <p:nvPr/>
+        </p:nvSpPr>
+        <p:spPr>
+          <a:xfrm rot="5400000">
+            <a:off x="3366722" y="5261275"/>
+            <a:ext cx="5400000" cy="277200"/>
+          </a:xfrm>
+          <a:prstGeom prst="rect">
+            <a:avLst/>
+          </a:prstGeom>
+          <a:solidFill>
+            <a:schemeClr val="bg1"/>
+          </a:solidFill>
+          <a:ln>
+            <a:noFill/>
+          </a:ln>
+        </p:spPr>
+        <p:style>
+          <a:lnRef idx="2">
+            <a:schemeClr val="accent1">
+              <a:shade val="50000"/>
+            </a:schemeClr>
+          </a:lnRef>
+          <a:fillRef idx="1">
+            <a:schemeClr val="accent1"/>
+          </a:fillRef>
+          <a:effectRef idx="0">
+            <a:schemeClr val="accent1"/>
+          </a:effectRef>
+          <a:fontRef idx="minor">
+            <a:schemeClr val="lt1"/>
+          </a:fontRef>
+        </p:style>
+        <p:txBody>
+          <a:bodyPr rtlCol="0" anchor="ctr"/>
+          <a:lstStyle/>
+          <a:p>
+            <a:pPr algn="ctr"/>
+            <a:endParaRPr lang="de-DE"/>
+          </a:p>
+        </p:txBody>
+      </p:sp>
+      <p:sp>
+        <p:nvSpPr>
+          <p:cNvPr id="23" name="Rechteck 22"/>
+          <p:cNvSpPr/>
+          <p:nvPr/>
+        </p:nvSpPr>
+        <p:spPr>
+          <a:xfrm rot="5400000">
+            <a:off x="2128561" y="5261269"/>
+            <a:ext cx="5400000" cy="277200"/>
+          </a:xfrm>
+          <a:prstGeom prst="rect">
+            <a:avLst/>
+          </a:prstGeom>
+          <a:solidFill>
+            <a:schemeClr val="bg1"/>
+          </a:solidFill>
+          <a:ln>
+            <a:noFill/>
+          </a:ln>
+        </p:spPr>
+        <p:style>
+          <a:lnRef idx="2">
+            <a:schemeClr val="accent1">
+              <a:shade val="50000"/>
+            </a:schemeClr>
+          </a:lnRef>
+          <a:fillRef idx="1">
+            <a:schemeClr val="accent1"/>
+          </a:fillRef>
+          <a:effectRef idx="0">
+            <a:schemeClr val="accent1"/>
+          </a:effectRef>
+          <a:fontRef idx="minor">
+            <a:schemeClr val="lt1"/>
+          </a:fontRef>
+        </p:style>
+        <p:txBody>
+          <a:bodyPr rtlCol="0" anchor="ctr"/>
+          <a:lstStyle/>
+          <a:p>
+            <a:pPr algn="ctr"/>
+            <a:endParaRPr lang="de-DE"/>
+          </a:p>
+        </p:txBody>
+      </p:sp>
+      <p:sp>
+        <p:nvSpPr>
+          <p:cNvPr id="5" name="Rechteck 4"/>
+          <p:cNvSpPr/>
+          <p:nvPr/>
+        </p:nvSpPr>
+        <p:spPr>
+          <a:xfrm>
+            <a:off x="899881" y="4871641"/>
+            <a:ext cx="9000000" cy="1056481"/>
+          </a:xfrm>
+          <a:prstGeom prst="rect">
+            <a:avLst/>
+          </a:prstGeom>
+          <a:solidFill>
+            <a:srgbClr val="CF142B"/>
+          </a:solidFill>
+          <a:ln>
+            <a:noFill/>
+          </a:ln>
+        </p:spPr>
+        <p:style>
+          <a:lnRef idx="2">
+            <a:schemeClr val="accent1">
+              <a:shade val="50000"/>
+            </a:schemeClr>
+          </a:lnRef>
+          <a:fillRef idx="1">
+            <a:schemeClr val="accent1"/>
+          </a:fillRef>
+          <a:effectRef idx="0">
+            <a:schemeClr val="accent1"/>
+          </a:effectRef>
+          <a:fontRef idx="minor">
+            <a:schemeClr val="lt1"/>
+          </a:fontRef>
+        </p:style>
+        <p:txBody>
+          <a:bodyPr rtlCol="0" anchor="ctr"/>
+          <a:lstStyle/>
+          <a:p>
+            <a:pPr algn="ctr"/>
+            <a:endParaRPr lang="de-DE"/>
+          </a:p>
+        </p:txBody>
+      </p:sp>
+    </p:spTree>
+    <p:extLst>
+      <p:ext uri="{BB962C8B-B14F-4D97-AF65-F5344CB8AC3E}">
+        <p14:creationId xmlns:p14="http://schemas.microsoft.com/office/powerpoint/2010/main" val="2514809845"/>
+      </p:ext>
+    </p:extLst>
+  </p:cSld>
+  <p:clrMapOvr>
+    <a:masterClrMapping/>
+  </p:clrMapOvr>
+</p:sld>
+</file>
+
 <file path=ppt/slides/slide3.xml><?xml version="1.0" encoding="utf-8"?>
+<p:sld xmlns:a="http://schemas.openxmlformats.org/drawingml/2006/main" xmlns:r="http://schemas.openxmlformats.org/officeDocument/2006/relationships" xmlns:p="http://schemas.openxmlformats.org/presentationml/2006/main">
+  <p:cSld>
+    <p:spTree>
+      <p:nvGrpSpPr>
+        <p:cNvPr id="1" name=""/>
+        <p:cNvGrpSpPr/>
+        <p:nvPr/>
+      </p:nvGrpSpPr>
+      <p:grpSpPr>
+        <a:xfrm>
+          <a:off x="0" y="0"/>
+          <a:ext cx="0" cy="0"/>
+          <a:chOff x="0" y="0"/>
+          <a:chExt cx="0" cy="0"/>
+        </a:xfrm>
+      </p:grpSpPr>
+      <p:sp>
+        <p:nvSpPr>
+          <p:cNvPr id="4" name="Rechteck 3"/>
+          <p:cNvSpPr/>
+          <p:nvPr/>
+        </p:nvSpPr>
+        <p:spPr>
+          <a:xfrm>
+            <a:off x="0" y="0"/>
+            <a:ext cx="10799763" cy="10799763"/>
+          </a:xfrm>
+          <a:prstGeom prst="rect">
+            <a:avLst/>
+          </a:prstGeom>
+          <a:noFill/>
+          <a:ln>
+            <a:noFill/>
+          </a:ln>
+        </p:spPr>
+        <p:style>
+          <a:lnRef idx="2">
+            <a:schemeClr val="accent1">
+              <a:shade val="50000"/>
+            </a:schemeClr>
+          </a:lnRef>
+          <a:fillRef idx="1">
+            <a:schemeClr val="accent1"/>
+          </a:fillRef>
+          <a:effectRef idx="0">
+            <a:schemeClr val="accent1"/>
+          </a:effectRef>
+          <a:fontRef idx="minor">
+            <a:schemeClr val="lt1"/>
+          </a:fontRef>
+        </p:style>
+        <p:txBody>
+          <a:bodyPr rtlCol="0" anchor="ctr"/>
+          <a:lstStyle/>
+          <a:p>
+            <a:pPr algn="ctr"/>
+            <a:endParaRPr lang="de-DE"/>
+          </a:p>
+        </p:txBody>
+      </p:sp>
+      <p:sp>
+        <p:nvSpPr>
+          <p:cNvPr id="2" name="Rechteck: abgerundete Ecken 1"/>
+          <p:cNvSpPr/>
+          <p:nvPr/>
+        </p:nvSpPr>
+        <p:spPr>
+          <a:xfrm>
+            <a:off x="0" y="1"/>
+            <a:ext cx="10799763" cy="10799762"/>
+          </a:xfrm>
+          <a:prstGeom prst="roundRect">
+            <a:avLst>
+              <a:gd name="adj" fmla="val 50000"/>
+            </a:avLst>
+          </a:prstGeom>
+          <a:solidFill>
+            <a:schemeClr val="tx1"/>
+          </a:solidFill>
+          <a:ln>
+            <a:noFill/>
+          </a:ln>
+        </p:spPr>
+        <p:style>
+          <a:lnRef idx="2">
+            <a:schemeClr val="accent1">
+              <a:shade val="50000"/>
+            </a:schemeClr>
+          </a:lnRef>
+          <a:fillRef idx="1">
+            <a:schemeClr val="accent1"/>
+          </a:fillRef>
+          <a:effectRef idx="0">
+            <a:schemeClr val="accent1"/>
+          </a:effectRef>
+          <a:fontRef idx="minor">
+            <a:schemeClr val="lt1"/>
+          </a:fontRef>
+        </p:style>
+        <p:txBody>
+          <a:bodyPr rtlCol="0" anchor="ctr"/>
+          <a:lstStyle/>
+          <a:p>
+            <a:pPr algn="ctr"/>
+            <a:endParaRPr lang="de-DE"/>
+          </a:p>
+        </p:txBody>
+      </p:sp>
+      <p:sp>
+        <p:nvSpPr>
+          <p:cNvPr id="33" name="Rechteck: abgerundete Ecken 32"/>
+          <p:cNvSpPr>
+            <a:spLocks noChangeAspect="1"/>
+          </p:cNvSpPr>
+          <p:nvPr/>
+        </p:nvSpPr>
+        <p:spPr>
+          <a:xfrm>
+            <a:off x="997572" y="997572"/>
+            <a:ext cx="8804619" cy="8804619"/>
+          </a:xfrm>
+          <a:prstGeom prst="roundRect">
+            <a:avLst>
+              <a:gd name="adj" fmla="val 50000"/>
+            </a:avLst>
+          </a:prstGeom>
+          <a:gradFill flip="none" rotWithShape="1">
+            <a:gsLst>
+              <a:gs pos="0">
+                <a:srgbClr val="C00000"/>
+              </a:gs>
+              <a:gs pos="23000">
+                <a:schemeClr val="accent2"/>
+              </a:gs>
+              <a:gs pos="32952">
+                <a:schemeClr val="accent4"/>
+              </a:gs>
+              <a:gs pos="52532">
+                <a:srgbClr val="00B050"/>
+              </a:gs>
+              <a:gs pos="69000">
+                <a:srgbClr val="00B0F0"/>
+              </a:gs>
+              <a:gs pos="81183">
+                <a:srgbClr val="002060"/>
+              </a:gs>
+              <a:gs pos="100000">
+                <a:srgbClr val="7030A0"/>
+              </a:gs>
+            </a:gsLst>
+            <a:lin ang="2700000" scaled="1"/>
+            <a:tileRect/>
+          </a:gradFill>
+          <a:ln>
+            <a:noFill/>
+          </a:ln>
+        </p:spPr>
+        <p:style>
+          <a:lnRef idx="2">
+            <a:schemeClr val="accent1">
+              <a:shade val="50000"/>
+            </a:schemeClr>
+          </a:lnRef>
+          <a:fillRef idx="1">
+            <a:schemeClr val="accent1"/>
+          </a:fillRef>
+          <a:effectRef idx="0">
+            <a:schemeClr val="accent1"/>
+          </a:effectRef>
+          <a:fontRef idx="minor">
+            <a:schemeClr val="lt1"/>
+          </a:fontRef>
+        </p:style>
+        <p:txBody>
+          <a:bodyPr rtlCol="0" anchor="ctr"/>
+          <a:lstStyle/>
+          <a:p>
+            <a:pPr algn="ctr"/>
+            <a:endParaRPr lang="de-DE" dirty="0"/>
+          </a:p>
+        </p:txBody>
+      </p:sp>
+      <p:sp>
+        <p:nvSpPr>
+          <p:cNvPr id="58" name="Freihandform 57"/>
+          <p:cNvSpPr/>
+          <p:nvPr/>
+        </p:nvSpPr>
+        <p:spPr>
+          <a:xfrm>
+            <a:off x="1368967" y="3435978"/>
+            <a:ext cx="6568274" cy="6819842"/>
+          </a:xfrm>
+          <a:custGeom>
+            <a:avLst/>
+            <a:gdLst>
+              <a:gd name="connsiteX0" fmla="*/ 4856093 w 6568274"/>
+              <a:gd name="connsiteY0" fmla="*/ 1888 h 6819842"/>
+              <a:gd name="connsiteX1" fmla="*/ 5969652 w 6568274"/>
+              <a:gd name="connsiteY1" fmla="*/ 457678 h 6819842"/>
+              <a:gd name="connsiteX2" fmla="*/ 6565458 w 6568274"/>
+              <a:gd name="connsiteY2" fmla="*/ 1696756 h 6819842"/>
+              <a:gd name="connsiteX3" fmla="*/ 4871519 w 6568274"/>
+              <a:gd name="connsiteY3" fmla="*/ 3590019 h 6819842"/>
+              <a:gd name="connsiteX4" fmla="*/ 4866241 w 6568274"/>
+              <a:gd name="connsiteY4" fmla="*/ 3590313 h 6819842"/>
+              <a:gd name="connsiteX5" fmla="*/ 4876680 w 6568274"/>
+              <a:gd name="connsiteY5" fmla="*/ 3607732 h 6819842"/>
+              <a:gd name="connsiteX6" fmla="*/ 4813427 w 6568274"/>
+              <a:gd name="connsiteY6" fmla="*/ 4042301 h 6819842"/>
+              <a:gd name="connsiteX7" fmla="*/ 4252486 w 6568274"/>
+              <a:gd name="connsiteY7" fmla="*/ 4073470 h 6819842"/>
+              <a:gd name="connsiteX8" fmla="*/ 4191665 w 6568274"/>
+              <a:gd name="connsiteY8" fmla="*/ 4019052 h 6819842"/>
+              <a:gd name="connsiteX9" fmla="*/ 1672578 w 6568274"/>
+              <a:gd name="connsiteY9" fmla="*/ 6814180 h 6819842"/>
+              <a:gd name="connsiteX10" fmla="*/ 1667477 w 6568274"/>
+              <a:gd name="connsiteY10" fmla="*/ 6819842 h 6819842"/>
+              <a:gd name="connsiteX11" fmla="*/ 1457010 w 6568274"/>
+              <a:gd name="connsiteY11" fmla="*/ 6712048 h 6819842"/>
+              <a:gd name="connsiteX12" fmla="*/ 33824 w 6568274"/>
+              <a:gd name="connsiteY12" fmla="*/ 5594661 h 6819842"/>
+              <a:gd name="connsiteX13" fmla="*/ 0 w 6568274"/>
+              <a:gd name="connsiteY13" fmla="*/ 5555613 h 6819842"/>
+              <a:gd name="connsiteX14" fmla="*/ 2627187 w 6568274"/>
+              <a:gd name="connsiteY14" fmla="*/ 2619285 h 6819842"/>
+              <a:gd name="connsiteX15" fmla="*/ 2566364 w 6568274"/>
+              <a:gd name="connsiteY15" fmla="*/ 2564865 h 6819842"/>
+              <a:gd name="connsiteX16" fmla="*/ 2535194 w 6568274"/>
+              <a:gd name="connsiteY16" fmla="*/ 2003925 h 6819842"/>
+              <a:gd name="connsiteX17" fmla="*/ 2960083 w 6568274"/>
+              <a:gd name="connsiteY17" fmla="*/ 1892917 h 6819842"/>
+              <a:gd name="connsiteX18" fmla="*/ 2978548 w 6568274"/>
+              <a:gd name="connsiteY18" fmla="*/ 1901359 h 6819842"/>
+              <a:gd name="connsiteX19" fmla="*/ 2978255 w 6568274"/>
+              <a:gd name="connsiteY19" fmla="*/ 1896081 h 6819842"/>
+              <a:gd name="connsiteX20" fmla="*/ 4672194 w 6568274"/>
+              <a:gd name="connsiteY20" fmla="*/ 2817 h 6819842"/>
+              <a:gd name="connsiteX21" fmla="*/ 4856093 w 6568274"/>
+              <a:gd name="connsiteY21" fmla="*/ 1888 h 6819842"/>
+            </a:gdLst>
+            <a:ahLst/>
+            <a:cxnLst>
+              <a:cxn ang="0">
+                <a:pos x="connsiteX0" y="connsiteY0"/>
+              </a:cxn>
+              <a:cxn ang="0">
+                <a:pos x="connsiteX1" y="connsiteY1"/>
+              </a:cxn>
+              <a:cxn ang="0">
+                <a:pos x="connsiteX2" y="connsiteY2"/>
+              </a:cxn>
+              <a:cxn ang="0">
+                <a:pos x="connsiteX3" y="connsiteY3"/>
+              </a:cxn>
+              <a:cxn ang="0">
+                <a:pos x="connsiteX4" y="connsiteY4"/>
+              </a:cxn>
+              <a:cxn ang="0">
+                <a:pos x="connsiteX5" y="connsiteY5"/>
+              </a:cxn>
+              <a:cxn ang="0">
+                <a:pos x="connsiteX6" y="connsiteY6"/>
+              </a:cxn>
+              <a:cxn ang="0">
+                <a:pos x="connsiteX7" y="connsiteY7"/>
+              </a:cxn>
+              <a:cxn ang="0">
+                <a:pos x="connsiteX8" y="connsiteY8"/>
+              </a:cxn>
+              <a:cxn ang="0">
+                <a:pos x="connsiteX9" y="connsiteY9"/>
+              </a:cxn>
+              <a:cxn ang="0">
+                <a:pos x="connsiteX10" y="connsiteY10"/>
+              </a:cxn>
+              <a:cxn ang="0">
+                <a:pos x="connsiteX11" y="connsiteY11"/>
+              </a:cxn>
+              <a:cxn ang="0">
+                <a:pos x="connsiteX12" y="connsiteY12"/>
+              </a:cxn>
+              <a:cxn ang="0">
+                <a:pos x="connsiteX13" y="connsiteY13"/>
+              </a:cxn>
+              <a:cxn ang="0">
+                <a:pos x="connsiteX14" y="connsiteY14"/>
+              </a:cxn>
+              <a:cxn ang="0">
+                <a:pos x="connsiteX15" y="connsiteY15"/>
+              </a:cxn>
+              <a:cxn ang="0">
+                <a:pos x="connsiteX16" y="connsiteY16"/>
+              </a:cxn>
+              <a:cxn ang="0">
+                <a:pos x="connsiteX17" y="connsiteY17"/>
+              </a:cxn>
+              <a:cxn ang="0">
+                <a:pos x="connsiteX18" y="connsiteY18"/>
+              </a:cxn>
+              <a:cxn ang="0">
+                <a:pos x="connsiteX19" y="connsiteY19"/>
+              </a:cxn>
+              <a:cxn ang="0">
+                <a:pos x="connsiteX20" y="connsiteY20"/>
+              </a:cxn>
+              <a:cxn ang="0">
+                <a:pos x="connsiteX21" y="connsiteY21"/>
+              </a:cxn>
+            </a:cxnLst>
+            <a:rect l="l" t="t" r="r" b="b"/>
+            <a:pathLst>
+              <a:path w="6568274" h="6819842">
+                <a:moveTo>
+                  <a:pt x="4856093" y="1888"/>
+                </a:moveTo>
+                <a:cubicBezTo>
+                  <a:pt x="5280545" y="21298"/>
+                  <a:pt x="5669865" y="189453"/>
+                  <a:pt x="5969652" y="457678"/>
+                </a:cubicBezTo>
+                <a:cubicBezTo>
+                  <a:pt x="6312265" y="764221"/>
+                  <a:pt x="6537937" y="1201465"/>
+                  <a:pt x="6565458" y="1696756"/>
+                </a:cubicBezTo>
+                <a:cubicBezTo>
+                  <a:pt x="6620501" y="2687336"/>
+                  <a:pt x="5862099" y="3534978"/>
+                  <a:pt x="4871519" y="3590019"/>
+                </a:cubicBezTo>
+                <a:lnTo>
+                  <a:pt x="4866241" y="3590313"/>
+                </a:lnTo>
+                <a:lnTo>
+                  <a:pt x="4876680" y="3607732"/>
+                </a:lnTo>
+                <a:cubicBezTo>
+                  <a:pt x="4942727" y="3747747"/>
+                  <a:pt x="4923146" y="3919671"/>
+                  <a:pt x="4813427" y="4042301"/>
+                </a:cubicBezTo>
+                <a:cubicBezTo>
+                  <a:pt x="4667136" y="4205807"/>
+                  <a:pt x="4415993" y="4219762"/>
+                  <a:pt x="4252486" y="4073470"/>
+                </a:cubicBezTo>
+                <a:lnTo>
+                  <a:pt x="4191665" y="4019052"/>
+                </a:lnTo>
+                <a:cubicBezTo>
+                  <a:pt x="3654792" y="4619099"/>
+                  <a:pt x="2512274" y="5882471"/>
+                  <a:pt x="1672578" y="6814180"/>
+                </a:cubicBezTo>
+                <a:lnTo>
+                  <a:pt x="1667477" y="6819842"/>
+                </a:lnTo>
+                <a:lnTo>
+                  <a:pt x="1457010" y="6712048"/>
+                </a:lnTo>
+                <a:cubicBezTo>
+                  <a:pt x="921421" y="6421098"/>
+                  <a:pt x="440561" y="6042171"/>
+                  <a:pt x="33824" y="5594661"/>
+                </a:cubicBezTo>
+                <a:lnTo>
+                  <a:pt x="0" y="5555613"/>
+                </a:lnTo>
+                <a:lnTo>
+                  <a:pt x="2627187" y="2619285"/>
+                </a:lnTo>
+                <a:lnTo>
+                  <a:pt x="2566364" y="2564865"/>
+                </a:lnTo>
+                <a:cubicBezTo>
+                  <a:pt x="2402858" y="2418573"/>
+                  <a:pt x="2388903" y="2167431"/>
+                  <a:pt x="2535194" y="2003925"/>
+                </a:cubicBezTo>
+                <a:cubicBezTo>
+                  <a:pt x="2644914" y="1881295"/>
+                  <a:pt x="2813612" y="1842787"/>
+                  <a:pt x="2960083" y="1892917"/>
+                </a:cubicBezTo>
+                <a:lnTo>
+                  <a:pt x="2978548" y="1901359"/>
+                </a:lnTo>
+                <a:lnTo>
+                  <a:pt x="2978255" y="1896081"/>
+                </a:lnTo>
+                <a:cubicBezTo>
+                  <a:pt x="2923211" y="905501"/>
+                  <a:pt x="3681615" y="57859"/>
+                  <a:pt x="4672194" y="2817"/>
+                </a:cubicBezTo>
+                <a:cubicBezTo>
+                  <a:pt x="4734104" y="-623"/>
+                  <a:pt x="4795458" y="-886"/>
+                  <a:pt x="4856093" y="1888"/>
+                </a:cubicBezTo>
+                <a:close/>
+              </a:path>
+            </a:pathLst>
+          </a:custGeom>
+          <a:solidFill>
+            <a:schemeClr val="bg1"/>
+          </a:solidFill>
+          <a:ln>
+            <a:noFill/>
+          </a:ln>
+        </p:spPr>
+        <p:style>
+          <a:lnRef idx="2">
+            <a:schemeClr val="accent1">
+              <a:shade val="50000"/>
+            </a:schemeClr>
+          </a:lnRef>
+          <a:fillRef idx="1">
+            <a:schemeClr val="accent1"/>
+          </a:fillRef>
+          <a:effectRef idx="0">
+            <a:schemeClr val="accent1"/>
+          </a:effectRef>
+          <a:fontRef idx="minor">
+            <a:schemeClr val="lt1"/>
+          </a:fontRef>
+        </p:style>
+        <p:txBody>
+          <a:bodyPr wrap="square" rtlCol="0" anchor="ctr">
+            <a:noAutofit/>
+          </a:bodyPr>
+          <a:lstStyle/>
+          <a:p>
+            <a:pPr algn="ctr"/>
+            <a:endParaRPr lang="de-DE"/>
+          </a:p>
+        </p:txBody>
+      </p:sp>
+    </p:spTree>
+    <p:extLst>
+      <p:ext uri="{BB962C8B-B14F-4D97-AF65-F5344CB8AC3E}">
+        <p14:creationId xmlns:p14="http://schemas.microsoft.com/office/powerpoint/2010/main" val="548666634"/>
+      </p:ext>
+    </p:extLst>
+  </p:cSld>
+  <p:clrMapOvr>
+    <a:masterClrMapping/>
+  </p:clrMapOvr>
+</p:sld>
+</file>
+
+<file path=ppt/slides/slide4.xml><?xml version="1.0" encoding="utf-8"?>
+<p:sld xmlns:a="http://schemas.openxmlformats.org/drawingml/2006/main" xmlns:r="http://schemas.openxmlformats.org/officeDocument/2006/relationships" xmlns:p="http://schemas.openxmlformats.org/presentationml/2006/main">
+  <p:cSld>
+    <p:spTree>
+      <p:nvGrpSpPr>
+        <p:cNvPr id="1" name=""/>
+        <p:cNvGrpSpPr/>
+        <p:nvPr/>
+      </p:nvGrpSpPr>
+      <p:grpSpPr>
+        <a:xfrm>
+          <a:off x="0" y="0"/>
+          <a:ext cx="0" cy="0"/>
+          <a:chOff x="0" y="0"/>
+          <a:chExt cx="0" cy="0"/>
+        </a:xfrm>
+      </p:grpSpPr>
+      <p:sp>
+        <p:nvSpPr>
+          <p:cNvPr id="2" name="Rechteck: abgerundete Ecken 1"/>
+          <p:cNvSpPr/>
+          <p:nvPr/>
+        </p:nvSpPr>
+        <p:spPr>
+          <a:xfrm>
+            <a:off x="0" y="1198245"/>
+            <a:ext cx="10799763" cy="8403273"/>
+          </a:xfrm>
+          <a:prstGeom prst="roundRect">
+            <a:avLst>
+              <a:gd name="adj" fmla="val 0"/>
+            </a:avLst>
+          </a:prstGeom>
+          <a:solidFill>
+            <a:schemeClr val="tx1"/>
+          </a:solidFill>
+          <a:ln>
+            <a:noFill/>
+          </a:ln>
+        </p:spPr>
+        <p:style>
+          <a:lnRef idx="2">
+            <a:schemeClr val="accent1">
+              <a:shade val="50000"/>
+            </a:schemeClr>
+          </a:lnRef>
+          <a:fillRef idx="1">
+            <a:schemeClr val="accent1"/>
+          </a:fillRef>
+          <a:effectRef idx="0">
+            <a:schemeClr val="accent1"/>
+          </a:effectRef>
+          <a:fontRef idx="minor">
+            <a:schemeClr val="lt1"/>
+          </a:fontRef>
+        </p:style>
+        <p:txBody>
+          <a:bodyPr rtlCol="0" anchor="ctr"/>
+          <a:lstStyle/>
+          <a:p>
+            <a:pPr algn="ctr"/>
+            <a:endParaRPr lang="de-DE"/>
+          </a:p>
+        </p:txBody>
+      </p:sp>
+      <p:grpSp>
+        <p:nvGrpSpPr>
+          <p:cNvPr id="24" name="Gruppieren 23"/>
+          <p:cNvGrpSpPr/>
+          <p:nvPr/>
+        </p:nvGrpSpPr>
+        <p:grpSpPr>
+          <a:xfrm>
+            <a:off x="474021" y="1531388"/>
+            <a:ext cx="9835808" cy="7611361"/>
+            <a:chOff x="731440" y="1733550"/>
+            <a:chExt cx="9321800" cy="7213600"/>
+          </a:xfrm>
+          <a:solidFill>
+            <a:schemeClr val="bg1"/>
+          </a:solidFill>
+        </p:grpSpPr>
+        <p:grpSp>
+          <p:nvGrpSpPr>
+            <p:cNvPr id="14" name="Gruppieren 13"/>
+            <p:cNvGrpSpPr/>
+            <p:nvPr/>
+          </p:nvGrpSpPr>
+          <p:grpSpPr>
+            <a:xfrm>
+              <a:off x="731440" y="1733550"/>
+              <a:ext cx="9321800" cy="698500"/>
+              <a:chOff x="723900" y="1733550"/>
+              <a:chExt cx="9321800" cy="698500"/>
+            </a:xfrm>
+            <a:grpFill/>
+          </p:grpSpPr>
+          <p:sp>
+            <p:nvSpPr>
+              <p:cNvPr id="3" name="Rechteck: abgerundete Ecken 2"/>
+              <p:cNvSpPr/>
+              <p:nvPr/>
+            </p:nvSpPr>
+            <p:spPr>
+              <a:xfrm>
+                <a:off x="723900" y="1733550"/>
+                <a:ext cx="533400" cy="698500"/>
+              </a:xfrm>
+              <a:prstGeom prst="roundRect">
+                <a:avLst>
+                  <a:gd name="adj" fmla="val 7143"/>
+                </a:avLst>
+              </a:prstGeom>
+              <a:grpFill/>
+              <a:ln>
+                <a:noFill/>
+              </a:ln>
+            </p:spPr>
+            <p:style>
+              <a:lnRef idx="2">
+                <a:schemeClr val="accent1">
+                  <a:shade val="50000"/>
+                </a:schemeClr>
+              </a:lnRef>
+              <a:fillRef idx="1">
+                <a:schemeClr val="accent1"/>
+              </a:fillRef>
+              <a:effectRef idx="0">
+                <a:schemeClr val="accent1"/>
+              </a:effectRef>
+              <a:fontRef idx="minor">
+                <a:schemeClr val="lt1"/>
+              </a:fontRef>
+            </p:style>
+            <p:txBody>
+              <a:bodyPr rtlCol="0" anchor="ctr"/>
+              <a:lstStyle/>
+              <a:p>
+                <a:pPr algn="ctr"/>
+                <a:endParaRPr lang="de-DE"/>
+              </a:p>
+            </p:txBody>
+          </p:sp>
+          <p:sp>
+            <p:nvSpPr>
+              <p:cNvPr id="25" name="Rechteck: abgerundete Ecken 24"/>
+              <p:cNvSpPr/>
+              <p:nvPr/>
+            </p:nvSpPr>
+            <p:spPr>
+              <a:xfrm>
+                <a:off x="9512300" y="1733550"/>
+                <a:ext cx="533400" cy="698500"/>
+              </a:xfrm>
+              <a:prstGeom prst="roundRect">
+                <a:avLst>
+                  <a:gd name="adj" fmla="val 7143"/>
+                </a:avLst>
+              </a:prstGeom>
+              <a:grpFill/>
+              <a:ln>
+                <a:noFill/>
+              </a:ln>
+            </p:spPr>
+            <p:style>
+              <a:lnRef idx="2">
+                <a:schemeClr val="accent1">
+                  <a:shade val="50000"/>
+                </a:schemeClr>
+              </a:lnRef>
+              <a:fillRef idx="1">
+                <a:schemeClr val="accent1"/>
+              </a:fillRef>
+              <a:effectRef idx="0">
+                <a:schemeClr val="accent1"/>
+              </a:effectRef>
+              <a:fontRef idx="minor">
+                <a:schemeClr val="lt1"/>
+              </a:fontRef>
+            </p:style>
+            <p:txBody>
+              <a:bodyPr rtlCol="0" anchor="ctr"/>
+              <a:lstStyle/>
+              <a:p>
+                <a:pPr algn="ctr"/>
+                <a:endParaRPr lang="de-DE"/>
+              </a:p>
+            </p:txBody>
+          </p:sp>
+          <p:sp>
+            <p:nvSpPr>
+              <p:cNvPr id="26" name="Rechteck: abgerundete Ecken 25"/>
+              <p:cNvSpPr/>
+              <p:nvPr/>
+            </p:nvSpPr>
+            <p:spPr>
+              <a:xfrm>
+                <a:off x="1822450" y="1733550"/>
+                <a:ext cx="533400" cy="698500"/>
+              </a:xfrm>
+              <a:prstGeom prst="roundRect">
+                <a:avLst>
+                  <a:gd name="adj" fmla="val 7143"/>
+                </a:avLst>
+              </a:prstGeom>
+              <a:grpFill/>
+              <a:ln>
+                <a:noFill/>
+              </a:ln>
+            </p:spPr>
+            <p:style>
+              <a:lnRef idx="2">
+                <a:schemeClr val="accent1">
+                  <a:shade val="50000"/>
+                </a:schemeClr>
+              </a:lnRef>
+              <a:fillRef idx="1">
+                <a:schemeClr val="accent1"/>
+              </a:fillRef>
+              <a:effectRef idx="0">
+                <a:schemeClr val="accent1"/>
+              </a:effectRef>
+              <a:fontRef idx="minor">
+                <a:schemeClr val="lt1"/>
+              </a:fontRef>
+            </p:style>
+            <p:txBody>
+              <a:bodyPr rtlCol="0" anchor="ctr"/>
+              <a:lstStyle/>
+              <a:p>
+                <a:pPr algn="ctr"/>
+                <a:endParaRPr lang="de-DE"/>
+              </a:p>
+            </p:txBody>
+          </p:sp>
+          <p:sp>
+            <p:nvSpPr>
+              <p:cNvPr id="27" name="Rechteck: abgerundete Ecken 26"/>
+              <p:cNvSpPr/>
+              <p:nvPr/>
+            </p:nvSpPr>
+            <p:spPr>
+              <a:xfrm>
+                <a:off x="2921000" y="1733550"/>
+                <a:ext cx="533400" cy="698500"/>
+              </a:xfrm>
+              <a:prstGeom prst="roundRect">
+                <a:avLst>
+                  <a:gd name="adj" fmla="val 7143"/>
+                </a:avLst>
+              </a:prstGeom>
+              <a:grpFill/>
+              <a:ln>
+                <a:noFill/>
+              </a:ln>
+            </p:spPr>
+            <p:style>
+              <a:lnRef idx="2">
+                <a:schemeClr val="accent1">
+                  <a:shade val="50000"/>
+                </a:schemeClr>
+              </a:lnRef>
+              <a:fillRef idx="1">
+                <a:schemeClr val="accent1"/>
+              </a:fillRef>
+              <a:effectRef idx="0">
+                <a:schemeClr val="accent1"/>
+              </a:effectRef>
+              <a:fontRef idx="minor">
+                <a:schemeClr val="lt1"/>
+              </a:fontRef>
+            </p:style>
+            <p:txBody>
+              <a:bodyPr rtlCol="0" anchor="ctr"/>
+              <a:lstStyle/>
+              <a:p>
+                <a:pPr algn="ctr"/>
+                <a:endParaRPr lang="de-DE"/>
+              </a:p>
+            </p:txBody>
+          </p:sp>
+          <p:sp>
+            <p:nvSpPr>
+              <p:cNvPr id="28" name="Rechteck: abgerundete Ecken 27"/>
+              <p:cNvSpPr/>
+              <p:nvPr/>
+            </p:nvSpPr>
+            <p:spPr>
+              <a:xfrm>
+                <a:off x="8413750" y="1733550"/>
+                <a:ext cx="533400" cy="698500"/>
+              </a:xfrm>
+              <a:prstGeom prst="roundRect">
+                <a:avLst>
+                  <a:gd name="adj" fmla="val 7143"/>
+                </a:avLst>
+              </a:prstGeom>
+              <a:grpFill/>
+              <a:ln>
+                <a:noFill/>
+              </a:ln>
+            </p:spPr>
+            <p:style>
+              <a:lnRef idx="2">
+                <a:schemeClr val="accent1">
+                  <a:shade val="50000"/>
+                </a:schemeClr>
+              </a:lnRef>
+              <a:fillRef idx="1">
+                <a:schemeClr val="accent1"/>
+              </a:fillRef>
+              <a:effectRef idx="0">
+                <a:schemeClr val="accent1"/>
+              </a:effectRef>
+              <a:fontRef idx="minor">
+                <a:schemeClr val="lt1"/>
+              </a:fontRef>
+            </p:style>
+            <p:txBody>
+              <a:bodyPr rtlCol="0" anchor="ctr"/>
+              <a:lstStyle/>
+              <a:p>
+                <a:pPr algn="ctr"/>
+                <a:endParaRPr lang="de-DE"/>
+              </a:p>
+            </p:txBody>
+          </p:sp>
+          <p:sp>
+            <p:nvSpPr>
+              <p:cNvPr id="29" name="Rechteck: abgerundete Ecken 28"/>
+              <p:cNvSpPr/>
+              <p:nvPr/>
+            </p:nvSpPr>
+            <p:spPr>
+              <a:xfrm>
+                <a:off x="7315200" y="1733550"/>
+                <a:ext cx="533400" cy="698500"/>
+              </a:xfrm>
+              <a:prstGeom prst="roundRect">
+                <a:avLst>
+                  <a:gd name="adj" fmla="val 7143"/>
+                </a:avLst>
+              </a:prstGeom>
+              <a:grpFill/>
+              <a:ln>
+                <a:noFill/>
+              </a:ln>
+            </p:spPr>
+            <p:style>
+              <a:lnRef idx="2">
+                <a:schemeClr val="accent1">
+                  <a:shade val="50000"/>
+                </a:schemeClr>
+              </a:lnRef>
+              <a:fillRef idx="1">
+                <a:schemeClr val="accent1"/>
+              </a:fillRef>
+              <a:effectRef idx="0">
+                <a:schemeClr val="accent1"/>
+              </a:effectRef>
+              <a:fontRef idx="minor">
+                <a:schemeClr val="lt1"/>
+              </a:fontRef>
+            </p:style>
+            <p:txBody>
+              <a:bodyPr rtlCol="0" anchor="ctr"/>
+              <a:lstStyle/>
+              <a:p>
+                <a:pPr algn="ctr"/>
+                <a:endParaRPr lang="de-DE"/>
+              </a:p>
+            </p:txBody>
+          </p:sp>
+          <p:sp>
+            <p:nvSpPr>
+              <p:cNvPr id="30" name="Rechteck: abgerundete Ecken 29"/>
+              <p:cNvSpPr/>
+              <p:nvPr/>
+            </p:nvSpPr>
+            <p:spPr>
+              <a:xfrm>
+                <a:off x="6216650" y="1733550"/>
+                <a:ext cx="533400" cy="698500"/>
+              </a:xfrm>
+              <a:prstGeom prst="roundRect">
+                <a:avLst>
+                  <a:gd name="adj" fmla="val 7143"/>
+                </a:avLst>
+              </a:prstGeom>
+              <a:grpFill/>
+              <a:ln>
+                <a:noFill/>
+              </a:ln>
+            </p:spPr>
+            <p:style>
+              <a:lnRef idx="2">
+                <a:schemeClr val="accent1">
+                  <a:shade val="50000"/>
+                </a:schemeClr>
+              </a:lnRef>
+              <a:fillRef idx="1">
+                <a:schemeClr val="accent1"/>
+              </a:fillRef>
+              <a:effectRef idx="0">
+                <a:schemeClr val="accent1"/>
+              </a:effectRef>
+              <a:fontRef idx="minor">
+                <a:schemeClr val="lt1"/>
+              </a:fontRef>
+            </p:style>
+            <p:txBody>
+              <a:bodyPr rtlCol="0" anchor="ctr"/>
+              <a:lstStyle/>
+              <a:p>
+                <a:pPr algn="ctr"/>
+                <a:endParaRPr lang="de-DE"/>
+              </a:p>
+            </p:txBody>
+          </p:sp>
+          <p:sp>
+            <p:nvSpPr>
+              <p:cNvPr id="31" name="Rechteck: abgerundete Ecken 30"/>
+              <p:cNvSpPr/>
+              <p:nvPr/>
+            </p:nvSpPr>
+            <p:spPr>
+              <a:xfrm>
+                <a:off x="5118100" y="1733550"/>
+                <a:ext cx="533400" cy="698500"/>
+              </a:xfrm>
+              <a:prstGeom prst="roundRect">
+                <a:avLst>
+                  <a:gd name="adj" fmla="val 7143"/>
+                </a:avLst>
+              </a:prstGeom>
+              <a:grpFill/>
+              <a:ln>
+                <a:noFill/>
+              </a:ln>
+            </p:spPr>
+            <p:style>
+              <a:lnRef idx="2">
+                <a:schemeClr val="accent1">
+                  <a:shade val="50000"/>
+                </a:schemeClr>
+              </a:lnRef>
+              <a:fillRef idx="1">
+                <a:schemeClr val="accent1"/>
+              </a:fillRef>
+              <a:effectRef idx="0">
+                <a:schemeClr val="accent1"/>
+              </a:effectRef>
+              <a:fontRef idx="minor">
+                <a:schemeClr val="lt1"/>
+              </a:fontRef>
+            </p:style>
+            <p:txBody>
+              <a:bodyPr rtlCol="0" anchor="ctr"/>
+              <a:lstStyle/>
+              <a:p>
+                <a:pPr algn="ctr"/>
+                <a:endParaRPr lang="de-DE"/>
+              </a:p>
+            </p:txBody>
+          </p:sp>
+          <p:sp>
+            <p:nvSpPr>
+              <p:cNvPr id="32" name="Rechteck: abgerundete Ecken 31"/>
+              <p:cNvSpPr/>
+              <p:nvPr/>
+            </p:nvSpPr>
+            <p:spPr>
+              <a:xfrm>
+                <a:off x="4019550" y="1733550"/>
+                <a:ext cx="533400" cy="698500"/>
+              </a:xfrm>
+              <a:prstGeom prst="roundRect">
+                <a:avLst>
+                  <a:gd name="adj" fmla="val 7143"/>
+                </a:avLst>
+              </a:prstGeom>
+              <a:grpFill/>
+              <a:ln>
+                <a:noFill/>
+              </a:ln>
+            </p:spPr>
+            <p:style>
+              <a:lnRef idx="2">
+                <a:schemeClr val="accent1">
+                  <a:shade val="50000"/>
+                </a:schemeClr>
+              </a:lnRef>
+              <a:fillRef idx="1">
+                <a:schemeClr val="accent1"/>
+              </a:fillRef>
+              <a:effectRef idx="0">
+                <a:schemeClr val="accent1"/>
+              </a:effectRef>
+              <a:fontRef idx="minor">
+                <a:schemeClr val="lt1"/>
+              </a:fontRef>
+            </p:style>
+            <p:txBody>
+              <a:bodyPr rtlCol="0" anchor="ctr"/>
+              <a:lstStyle/>
+              <a:p>
+                <a:pPr algn="ctr"/>
+                <a:endParaRPr lang="de-DE"/>
+              </a:p>
+            </p:txBody>
+          </p:sp>
+        </p:grpSp>
+        <p:grpSp>
+          <p:nvGrpSpPr>
+            <p:cNvPr id="34" name="Gruppieren 33"/>
+            <p:cNvGrpSpPr/>
+            <p:nvPr/>
+          </p:nvGrpSpPr>
+          <p:grpSpPr>
+            <a:xfrm>
+              <a:off x="731440" y="8248650"/>
+              <a:ext cx="9321800" cy="698500"/>
+              <a:chOff x="723900" y="1733550"/>
+              <a:chExt cx="9321800" cy="698500"/>
+            </a:xfrm>
+            <a:grpFill/>
+          </p:grpSpPr>
+          <p:sp>
+            <p:nvSpPr>
+              <p:cNvPr id="36" name="Rechteck: abgerundete Ecken 35"/>
+              <p:cNvSpPr/>
+              <p:nvPr/>
+            </p:nvSpPr>
+            <p:spPr>
+              <a:xfrm>
+                <a:off x="723900" y="1733550"/>
+                <a:ext cx="533400" cy="698500"/>
+              </a:xfrm>
+              <a:prstGeom prst="roundRect">
+                <a:avLst>
+                  <a:gd name="adj" fmla="val 7143"/>
+                </a:avLst>
+              </a:prstGeom>
+              <a:grpFill/>
+              <a:ln>
+                <a:noFill/>
+              </a:ln>
+            </p:spPr>
+            <p:style>
+              <a:lnRef idx="2">
+                <a:schemeClr val="accent1">
+                  <a:shade val="50000"/>
+                </a:schemeClr>
+              </a:lnRef>
+              <a:fillRef idx="1">
+                <a:schemeClr val="accent1"/>
+              </a:fillRef>
+              <a:effectRef idx="0">
+                <a:schemeClr val="accent1"/>
+              </a:effectRef>
+              <a:fontRef idx="minor">
+                <a:schemeClr val="lt1"/>
+              </a:fontRef>
+            </p:style>
+            <p:txBody>
+              <a:bodyPr rtlCol="0" anchor="ctr"/>
+              <a:lstStyle/>
+              <a:p>
+                <a:pPr algn="ctr"/>
+                <a:endParaRPr lang="de-DE"/>
+              </a:p>
+            </p:txBody>
+          </p:sp>
+          <p:sp>
+            <p:nvSpPr>
+              <p:cNvPr id="37" name="Rechteck: abgerundete Ecken 36"/>
+              <p:cNvSpPr/>
+              <p:nvPr/>
+            </p:nvSpPr>
+            <p:spPr>
+              <a:xfrm>
+                <a:off x="9512300" y="1733550"/>
+                <a:ext cx="533400" cy="698500"/>
+              </a:xfrm>
+              <a:prstGeom prst="roundRect">
+                <a:avLst>
+                  <a:gd name="adj" fmla="val 7143"/>
+                </a:avLst>
+              </a:prstGeom>
+              <a:grpFill/>
+              <a:ln>
+                <a:noFill/>
+              </a:ln>
+            </p:spPr>
+            <p:style>
+              <a:lnRef idx="2">
+                <a:schemeClr val="accent1">
+                  <a:shade val="50000"/>
+                </a:schemeClr>
+              </a:lnRef>
+              <a:fillRef idx="1">
+                <a:schemeClr val="accent1"/>
+              </a:fillRef>
+              <a:effectRef idx="0">
+                <a:schemeClr val="accent1"/>
+              </a:effectRef>
+              <a:fontRef idx="minor">
+                <a:schemeClr val="lt1"/>
+              </a:fontRef>
+            </p:style>
+            <p:txBody>
+              <a:bodyPr rtlCol="0" anchor="ctr"/>
+              <a:lstStyle/>
+              <a:p>
+                <a:pPr algn="ctr"/>
+                <a:endParaRPr lang="de-DE"/>
+              </a:p>
+            </p:txBody>
+          </p:sp>
+          <p:sp>
+            <p:nvSpPr>
+              <p:cNvPr id="38" name="Rechteck: abgerundete Ecken 37"/>
+              <p:cNvSpPr/>
+              <p:nvPr/>
+            </p:nvSpPr>
+            <p:spPr>
+              <a:xfrm>
+                <a:off x="1822450" y="1733550"/>
+                <a:ext cx="533400" cy="698500"/>
+              </a:xfrm>
+              <a:prstGeom prst="roundRect">
+                <a:avLst>
+                  <a:gd name="adj" fmla="val 7143"/>
+                </a:avLst>
+              </a:prstGeom>
+              <a:grpFill/>
+              <a:ln>
+                <a:noFill/>
+              </a:ln>
+            </p:spPr>
+            <p:style>
+              <a:lnRef idx="2">
+                <a:schemeClr val="accent1">
+                  <a:shade val="50000"/>
+                </a:schemeClr>
+              </a:lnRef>
+              <a:fillRef idx="1">
+                <a:schemeClr val="accent1"/>
+              </a:fillRef>
+              <a:effectRef idx="0">
+                <a:schemeClr val="accent1"/>
+              </a:effectRef>
+              <a:fontRef idx="minor">
+                <a:schemeClr val="lt1"/>
+              </a:fontRef>
+            </p:style>
+            <p:txBody>
+              <a:bodyPr rtlCol="0" anchor="ctr"/>
+              <a:lstStyle/>
+              <a:p>
+                <a:pPr algn="ctr"/>
+                <a:endParaRPr lang="de-DE"/>
+              </a:p>
+            </p:txBody>
+          </p:sp>
+          <p:sp>
+            <p:nvSpPr>
+              <p:cNvPr id="39" name="Rechteck: abgerundete Ecken 38"/>
+              <p:cNvSpPr/>
+              <p:nvPr/>
+            </p:nvSpPr>
+            <p:spPr>
+              <a:xfrm>
+                <a:off x="2921000" y="1733550"/>
+                <a:ext cx="533400" cy="698500"/>
+              </a:xfrm>
+              <a:prstGeom prst="roundRect">
+                <a:avLst>
+                  <a:gd name="adj" fmla="val 7143"/>
+                </a:avLst>
+              </a:prstGeom>
+              <a:grpFill/>
+              <a:ln>
+                <a:noFill/>
+              </a:ln>
+            </p:spPr>
+            <p:style>
+              <a:lnRef idx="2">
+                <a:schemeClr val="accent1">
+                  <a:shade val="50000"/>
+                </a:schemeClr>
+              </a:lnRef>
+              <a:fillRef idx="1">
+                <a:schemeClr val="accent1"/>
+              </a:fillRef>
+              <a:effectRef idx="0">
+                <a:schemeClr val="accent1"/>
+              </a:effectRef>
+              <a:fontRef idx="minor">
+                <a:schemeClr val="lt1"/>
+              </a:fontRef>
+            </p:style>
+            <p:txBody>
+              <a:bodyPr rtlCol="0" anchor="ctr"/>
+              <a:lstStyle/>
+              <a:p>
+                <a:pPr algn="ctr"/>
+                <a:endParaRPr lang="de-DE"/>
+              </a:p>
+            </p:txBody>
+          </p:sp>
+          <p:sp>
+            <p:nvSpPr>
+              <p:cNvPr id="40" name="Rechteck: abgerundete Ecken 39"/>
+              <p:cNvSpPr/>
+              <p:nvPr/>
+            </p:nvSpPr>
+            <p:spPr>
+              <a:xfrm>
+                <a:off x="8413750" y="1733550"/>
+                <a:ext cx="533400" cy="698500"/>
+              </a:xfrm>
+              <a:prstGeom prst="roundRect">
+                <a:avLst>
+                  <a:gd name="adj" fmla="val 7143"/>
+                </a:avLst>
+              </a:prstGeom>
+              <a:grpFill/>
+              <a:ln>
+                <a:noFill/>
+              </a:ln>
+            </p:spPr>
+            <p:style>
+              <a:lnRef idx="2">
+                <a:schemeClr val="accent1">
+                  <a:shade val="50000"/>
+                </a:schemeClr>
+              </a:lnRef>
+              <a:fillRef idx="1">
+                <a:schemeClr val="accent1"/>
+              </a:fillRef>
+              <a:effectRef idx="0">
+                <a:schemeClr val="accent1"/>
+              </a:effectRef>
+              <a:fontRef idx="minor">
+                <a:schemeClr val="lt1"/>
+              </a:fontRef>
+            </p:style>
+            <p:txBody>
+              <a:bodyPr rtlCol="0" anchor="ctr"/>
+              <a:lstStyle/>
+              <a:p>
+                <a:pPr algn="ctr"/>
+                <a:endParaRPr lang="de-DE"/>
+              </a:p>
+            </p:txBody>
+          </p:sp>
+          <p:sp>
+            <p:nvSpPr>
+              <p:cNvPr id="41" name="Rechteck: abgerundete Ecken 40"/>
+              <p:cNvSpPr/>
+              <p:nvPr/>
+            </p:nvSpPr>
+            <p:spPr>
+              <a:xfrm>
+                <a:off x="7315200" y="1733550"/>
+                <a:ext cx="533400" cy="698500"/>
+              </a:xfrm>
+              <a:prstGeom prst="roundRect">
+                <a:avLst>
+                  <a:gd name="adj" fmla="val 7143"/>
+                </a:avLst>
+              </a:prstGeom>
+              <a:grpFill/>
+              <a:ln>
+                <a:noFill/>
+              </a:ln>
+            </p:spPr>
+            <p:style>
+              <a:lnRef idx="2">
+                <a:schemeClr val="accent1">
+                  <a:shade val="50000"/>
+                </a:schemeClr>
+              </a:lnRef>
+              <a:fillRef idx="1">
+                <a:schemeClr val="accent1"/>
+              </a:fillRef>
+              <a:effectRef idx="0">
+                <a:schemeClr val="accent1"/>
+              </a:effectRef>
+              <a:fontRef idx="minor">
+                <a:schemeClr val="lt1"/>
+              </a:fontRef>
+            </p:style>
+            <p:txBody>
+              <a:bodyPr rtlCol="0" anchor="ctr"/>
+              <a:lstStyle/>
+              <a:p>
+                <a:pPr algn="ctr"/>
+                <a:endParaRPr lang="de-DE"/>
+              </a:p>
+            </p:txBody>
+          </p:sp>
+          <p:sp>
+            <p:nvSpPr>
+              <p:cNvPr id="42" name="Rechteck: abgerundete Ecken 41"/>
+              <p:cNvSpPr/>
+              <p:nvPr/>
+            </p:nvSpPr>
+            <p:spPr>
+              <a:xfrm>
+                <a:off x="6216650" y="1733550"/>
+                <a:ext cx="533400" cy="698500"/>
+              </a:xfrm>
+              <a:prstGeom prst="roundRect">
+                <a:avLst>
+                  <a:gd name="adj" fmla="val 7143"/>
+                </a:avLst>
+              </a:prstGeom>
+              <a:grpFill/>
+              <a:ln>
+                <a:noFill/>
+              </a:ln>
+            </p:spPr>
+            <p:style>
+              <a:lnRef idx="2">
+                <a:schemeClr val="accent1">
+                  <a:shade val="50000"/>
+                </a:schemeClr>
+              </a:lnRef>
+              <a:fillRef idx="1">
+                <a:schemeClr val="accent1"/>
+              </a:fillRef>
+              <a:effectRef idx="0">
+                <a:schemeClr val="accent1"/>
+              </a:effectRef>
+              <a:fontRef idx="minor">
+                <a:schemeClr val="lt1"/>
+              </a:fontRef>
+            </p:style>
+            <p:txBody>
+              <a:bodyPr rtlCol="0" anchor="ctr"/>
+              <a:lstStyle/>
+              <a:p>
+                <a:pPr algn="ctr"/>
+                <a:endParaRPr lang="de-DE"/>
+              </a:p>
+            </p:txBody>
+          </p:sp>
+          <p:sp>
+            <p:nvSpPr>
+              <p:cNvPr id="43" name="Rechteck: abgerundete Ecken 42"/>
+              <p:cNvSpPr/>
+              <p:nvPr/>
+            </p:nvSpPr>
+            <p:spPr>
+              <a:xfrm>
+                <a:off x="5118100" y="1733550"/>
+                <a:ext cx="533400" cy="698500"/>
+              </a:xfrm>
+              <a:prstGeom prst="roundRect">
+                <a:avLst>
+                  <a:gd name="adj" fmla="val 7143"/>
+                </a:avLst>
+              </a:prstGeom>
+              <a:grpFill/>
+              <a:ln>
+                <a:noFill/>
+              </a:ln>
+            </p:spPr>
+            <p:style>
+              <a:lnRef idx="2">
+                <a:schemeClr val="accent1">
+                  <a:shade val="50000"/>
+                </a:schemeClr>
+              </a:lnRef>
+              <a:fillRef idx="1">
+                <a:schemeClr val="accent1"/>
+              </a:fillRef>
+              <a:effectRef idx="0">
+                <a:schemeClr val="accent1"/>
+              </a:effectRef>
+              <a:fontRef idx="minor">
+                <a:schemeClr val="lt1"/>
+              </a:fontRef>
+            </p:style>
+            <p:txBody>
+              <a:bodyPr rtlCol="0" anchor="ctr"/>
+              <a:lstStyle/>
+              <a:p>
+                <a:pPr algn="ctr"/>
+                <a:endParaRPr lang="de-DE"/>
+              </a:p>
+            </p:txBody>
+          </p:sp>
+          <p:sp>
+            <p:nvSpPr>
+              <p:cNvPr id="44" name="Rechteck: abgerundete Ecken 43"/>
+              <p:cNvSpPr/>
+              <p:nvPr/>
+            </p:nvSpPr>
+            <p:spPr>
+              <a:xfrm>
+                <a:off x="4019550" y="1733550"/>
+                <a:ext cx="533400" cy="698500"/>
+              </a:xfrm>
+              <a:prstGeom prst="roundRect">
+                <a:avLst>
+                  <a:gd name="adj" fmla="val 7143"/>
+                </a:avLst>
+              </a:prstGeom>
+              <a:grpFill/>
+              <a:ln>
+                <a:noFill/>
+              </a:ln>
+            </p:spPr>
+            <p:style>
+              <a:lnRef idx="2">
+                <a:schemeClr val="accent1">
+                  <a:shade val="50000"/>
+                </a:schemeClr>
+              </a:lnRef>
+              <a:fillRef idx="1">
+                <a:schemeClr val="accent1"/>
+              </a:fillRef>
+              <a:effectRef idx="0">
+                <a:schemeClr val="accent1"/>
+              </a:effectRef>
+              <a:fontRef idx="minor">
+                <a:schemeClr val="lt1"/>
+              </a:fontRef>
+            </p:style>
+            <p:txBody>
+              <a:bodyPr rtlCol="0" anchor="ctr"/>
+              <a:lstStyle/>
+              <a:p>
+                <a:pPr algn="ctr"/>
+                <a:endParaRPr lang="de-DE"/>
+              </a:p>
+            </p:txBody>
+          </p:sp>
+        </p:grpSp>
+      </p:grpSp>
+      <p:sp>
+        <p:nvSpPr>
+          <p:cNvPr id="33" name="Rechteck: abgerundete Ecken 32"/>
+          <p:cNvSpPr/>
+          <p:nvPr/>
+        </p:nvSpPr>
+        <p:spPr>
+          <a:xfrm>
+            <a:off x="354675" y="2655242"/>
+            <a:ext cx="10090413" cy="5489280"/>
+          </a:xfrm>
+          <a:prstGeom prst="roundRect">
+            <a:avLst>
+              <a:gd name="adj" fmla="val 2416"/>
+            </a:avLst>
+          </a:prstGeom>
+          <a:gradFill flip="none" rotWithShape="1">
+            <a:gsLst>
+              <a:gs pos="0">
+                <a:srgbClr val="C00000"/>
+              </a:gs>
+              <a:gs pos="23000">
+                <a:schemeClr val="accent2"/>
+              </a:gs>
+              <a:gs pos="32952">
+                <a:schemeClr val="accent4"/>
+              </a:gs>
+              <a:gs pos="52532">
+                <a:srgbClr val="00B050"/>
+              </a:gs>
+              <a:gs pos="69000">
+                <a:srgbClr val="00B0F0"/>
+              </a:gs>
+              <a:gs pos="81183">
+                <a:srgbClr val="002060"/>
+              </a:gs>
+              <a:gs pos="100000">
+                <a:srgbClr val="7030A0"/>
+              </a:gs>
+            </a:gsLst>
+            <a:lin ang="2700000" scaled="1"/>
+            <a:tileRect/>
+          </a:gradFill>
+          <a:ln>
+            <a:noFill/>
+          </a:ln>
+        </p:spPr>
+        <p:style>
+          <a:lnRef idx="2">
+            <a:schemeClr val="accent1">
+              <a:shade val="50000"/>
+            </a:schemeClr>
+          </a:lnRef>
+          <a:fillRef idx="1">
+            <a:schemeClr val="accent1"/>
+          </a:fillRef>
+          <a:effectRef idx="0">
+            <a:schemeClr val="accent1"/>
+          </a:effectRef>
+          <a:fontRef idx="minor">
+            <a:schemeClr val="lt1"/>
+          </a:fontRef>
+        </p:style>
+        <p:txBody>
+          <a:bodyPr rtlCol="0" anchor="ctr"/>
+          <a:lstStyle/>
+          <a:p>
+            <a:pPr algn="ctr"/>
+            <a:endParaRPr lang="de-DE" dirty="0"/>
+          </a:p>
+        </p:txBody>
+      </p:sp>
+      <p:sp>
+        <p:nvSpPr>
+          <p:cNvPr id="35" name="Freihandform: Form 34"/>
+          <p:cNvSpPr>
+            <a:spLocks noChangeAspect="1"/>
+          </p:cNvSpPr>
+          <p:nvPr/>
+        </p:nvSpPr>
+        <p:spPr>
+          <a:xfrm rot="2509175">
+            <a:off x="3814273" y="2868410"/>
+            <a:ext cx="2669772" cy="6642261"/>
+          </a:xfrm>
+          <a:custGeom>
+            <a:avLst/>
+            <a:gdLst>
+              <a:gd name="connsiteX0" fmla="*/ 492362 w 2669772"/>
+              <a:gd name="connsiteY0" fmla="*/ 299344 h 6642261"/>
+              <a:gd name="connsiteX1" fmla="*/ 1334886 w 2669772"/>
+              <a:gd name="connsiteY1" fmla="*/ 0 h 6642261"/>
+              <a:gd name="connsiteX2" fmla="*/ 2278793 w 2669772"/>
+              <a:gd name="connsiteY2" fmla="*/ 390979 h 6642261"/>
+              <a:gd name="connsiteX3" fmla="*/ 2278792 w 2669772"/>
+              <a:gd name="connsiteY3" fmla="*/ 2278792 h 6642261"/>
+              <a:gd name="connsiteX4" fmla="*/ 2276015 w 2669772"/>
+              <a:gd name="connsiteY4" fmla="*/ 2281570 h 6642261"/>
+              <a:gd name="connsiteX5" fmla="*/ 2290427 w 2669772"/>
+              <a:gd name="connsiteY5" fmla="*/ 2286044 h 6642261"/>
+              <a:gd name="connsiteX6" fmla="*/ 2470723 w 2669772"/>
+              <a:gd name="connsiteY6" fmla="*/ 2558048 h 6642261"/>
+              <a:gd name="connsiteX7" fmla="*/ 2175520 w 2669772"/>
+              <a:gd name="connsiteY7" fmla="*/ 2853250 h 6642261"/>
+              <a:gd name="connsiteX8" fmla="*/ 2114874 w 2669772"/>
+              <a:gd name="connsiteY8" fmla="*/ 2853250 h 6642261"/>
+              <a:gd name="connsiteX9" fmla="*/ 2114873 w 2669772"/>
+              <a:gd name="connsiteY9" fmla="*/ 5246526 h 6642261"/>
+              <a:gd name="connsiteX10" fmla="*/ 554901 w 2669772"/>
+              <a:gd name="connsiteY10" fmla="*/ 6642261 h 6642261"/>
+              <a:gd name="connsiteX11" fmla="*/ 554901 w 2669772"/>
+              <a:gd name="connsiteY11" fmla="*/ 2853250 h 6642261"/>
+              <a:gd name="connsiteX12" fmla="*/ 494253 w 2669772"/>
+              <a:gd name="connsiteY12" fmla="*/ 2853250 h 6642261"/>
+              <a:gd name="connsiteX13" fmla="*/ 199050 w 2669772"/>
+              <a:gd name="connsiteY13" fmla="*/ 2558048 h 6642261"/>
+              <a:gd name="connsiteX14" fmla="*/ 379348 w 2669772"/>
+              <a:gd name="connsiteY14" fmla="*/ 2286044 h 6642261"/>
+              <a:gd name="connsiteX15" fmla="*/ 393757 w 2669772"/>
+              <a:gd name="connsiteY15" fmla="*/ 2281570 h 6642261"/>
+              <a:gd name="connsiteX16" fmla="*/ 390979 w 2669772"/>
+              <a:gd name="connsiteY16" fmla="*/ 2278792 h 6642261"/>
+              <a:gd name="connsiteX17" fmla="*/ 390980 w 2669772"/>
+              <a:gd name="connsiteY17" fmla="*/ 390979 h 6642261"/>
+              <a:gd name="connsiteX18" fmla="*/ 492362 w 2669772"/>
+              <a:gd name="connsiteY18" fmla="*/ 299344 h 6642261"/>
+            </a:gdLst>
+            <a:ahLst/>
+            <a:cxnLst>
+              <a:cxn ang="0">
+                <a:pos x="connsiteX0" y="connsiteY0"/>
+              </a:cxn>
+              <a:cxn ang="0">
+                <a:pos x="connsiteX1" y="connsiteY1"/>
+              </a:cxn>
+              <a:cxn ang="0">
+                <a:pos x="connsiteX2" y="connsiteY2"/>
+              </a:cxn>
+              <a:cxn ang="0">
+                <a:pos x="connsiteX3" y="connsiteY3"/>
+              </a:cxn>
+              <a:cxn ang="0">
+                <a:pos x="connsiteX4" y="connsiteY4"/>
+              </a:cxn>
+              <a:cxn ang="0">
+                <a:pos x="connsiteX5" y="connsiteY5"/>
+              </a:cxn>
+              <a:cxn ang="0">
+                <a:pos x="connsiteX6" y="connsiteY6"/>
+              </a:cxn>
+              <a:cxn ang="0">
+                <a:pos x="connsiteX7" y="connsiteY7"/>
+              </a:cxn>
+              <a:cxn ang="0">
+                <a:pos x="connsiteX8" y="connsiteY8"/>
+              </a:cxn>
+              <a:cxn ang="0">
+                <a:pos x="connsiteX9" y="connsiteY9"/>
+              </a:cxn>
+              <a:cxn ang="0">
+                <a:pos x="connsiteX10" y="connsiteY10"/>
+              </a:cxn>
+              <a:cxn ang="0">
+                <a:pos x="connsiteX11" y="connsiteY11"/>
+              </a:cxn>
+              <a:cxn ang="0">
+                <a:pos x="connsiteX12" y="connsiteY12"/>
+              </a:cxn>
+              <a:cxn ang="0">
+                <a:pos x="connsiteX13" y="connsiteY13"/>
+              </a:cxn>
+              <a:cxn ang="0">
+                <a:pos x="connsiteX14" y="connsiteY14"/>
+              </a:cxn>
+              <a:cxn ang="0">
+                <a:pos x="connsiteX15" y="connsiteY15"/>
+              </a:cxn>
+              <a:cxn ang="0">
+                <a:pos x="connsiteX16" y="connsiteY16"/>
+              </a:cxn>
+              <a:cxn ang="0">
+                <a:pos x="connsiteX17" y="connsiteY17"/>
+              </a:cxn>
+              <a:cxn ang="0">
+                <a:pos x="connsiteX18" y="connsiteY18"/>
+              </a:cxn>
+            </a:cxnLst>
+            <a:rect l="l" t="t" r="r" b="b"/>
+            <a:pathLst>
+              <a:path w="2669772" h="6642261">
+                <a:moveTo>
+                  <a:pt x="492362" y="299344"/>
+                </a:moveTo>
+                <a:cubicBezTo>
+                  <a:pt x="737039" y="99781"/>
+                  <a:pt x="1035962" y="0"/>
+                  <a:pt x="1334886" y="0"/>
+                </a:cubicBezTo>
+                <a:cubicBezTo>
+                  <a:pt x="1676513" y="0"/>
+                  <a:pt x="2018140" y="130326"/>
+                  <a:pt x="2278793" y="390979"/>
+                </a:cubicBezTo>
+                <a:cubicBezTo>
+                  <a:pt x="2800099" y="912285"/>
+                  <a:pt x="2800099" y="1757487"/>
+                  <a:pt x="2278792" y="2278792"/>
+                </a:cubicBezTo>
+                <a:lnTo>
+                  <a:pt x="2276015" y="2281570"/>
+                </a:lnTo>
+                <a:lnTo>
+                  <a:pt x="2290427" y="2286044"/>
+                </a:lnTo>
+                <a:cubicBezTo>
+                  <a:pt x="2396379" y="2330858"/>
+                  <a:pt x="2470723" y="2435771"/>
+                  <a:pt x="2470723" y="2558048"/>
+                </a:cubicBezTo>
+                <a:cubicBezTo>
+                  <a:pt x="2470723" y="2721083"/>
+                  <a:pt x="2338556" y="2853250"/>
+                  <a:pt x="2175520" y="2853250"/>
+                </a:cubicBezTo>
+                <a:lnTo>
+                  <a:pt x="2114874" y="2853250"/>
+                </a:lnTo>
+                <a:lnTo>
+                  <a:pt x="2114873" y="5246526"/>
+                </a:lnTo>
+                <a:lnTo>
+                  <a:pt x="554901" y="6642261"/>
+                </a:lnTo>
+                <a:lnTo>
+                  <a:pt x="554901" y="2853250"/>
+                </a:lnTo>
+                <a:lnTo>
+                  <a:pt x="494253" y="2853250"/>
+                </a:lnTo>
+                <a:cubicBezTo>
+                  <a:pt x="331217" y="2853250"/>
+                  <a:pt x="199050" y="2721083"/>
+                  <a:pt x="199050" y="2558048"/>
+                </a:cubicBezTo>
+                <a:cubicBezTo>
+                  <a:pt x="199050" y="2435771"/>
+                  <a:pt x="273394" y="2330857"/>
+                  <a:pt x="379348" y="2286044"/>
+                </a:cubicBezTo>
+                <a:lnTo>
+                  <a:pt x="393757" y="2281570"/>
+                </a:lnTo>
+                <a:lnTo>
+                  <a:pt x="390979" y="2278792"/>
+                </a:lnTo>
+                <a:cubicBezTo>
+                  <a:pt x="-130327" y="1757487"/>
+                  <a:pt x="-130326" y="912284"/>
+                  <a:pt x="390980" y="390979"/>
+                </a:cubicBezTo>
+                <a:cubicBezTo>
+                  <a:pt x="423561" y="358398"/>
+                  <a:pt x="457408" y="327852"/>
+                  <a:pt x="492362" y="299344"/>
+                </a:cubicBezTo>
+                <a:close/>
+              </a:path>
+            </a:pathLst>
+          </a:custGeom>
+          <a:solidFill>
+            <a:schemeClr val="bg1"/>
+          </a:solidFill>
+          <a:ln>
+            <a:noFill/>
+          </a:ln>
+        </p:spPr>
+        <p:style>
+          <a:lnRef idx="2">
+            <a:schemeClr val="accent1">
+              <a:shade val="50000"/>
+            </a:schemeClr>
+          </a:lnRef>
+          <a:fillRef idx="1">
+            <a:schemeClr val="accent1"/>
+          </a:fillRef>
+          <a:effectRef idx="0">
+            <a:schemeClr val="accent1"/>
+          </a:effectRef>
+          <a:fontRef idx="minor">
+            <a:schemeClr val="lt1"/>
+          </a:fontRef>
+        </p:style>
+        <p:txBody>
+          <a:bodyPr rtlCol="0" anchor="ctr"/>
+          <a:lstStyle/>
+          <a:p>
+            <a:pPr algn="ctr"/>
+            <a:endParaRPr lang="de-DE"/>
+          </a:p>
+        </p:txBody>
+      </p:sp>
+    </p:spTree>
+    <p:extLst>
+      <p:ext uri="{BB962C8B-B14F-4D97-AF65-F5344CB8AC3E}">
+        <p14:creationId xmlns:p14="http://schemas.microsoft.com/office/powerpoint/2010/main" val="992898762"/>
+      </p:ext>
+    </p:extLst>
+  </p:cSld>
+  <p:clrMapOvr>
+    <a:masterClrMapping/>
+  </p:clrMapOvr>
+</p:sld>
+</file>
+
+<file path=ppt/slides/slide5.xml><?xml version="1.0" encoding="utf-8"?>
 <p:sld xmlns:a="http://schemas.openxmlformats.org/drawingml/2006/main" xmlns:r="http://schemas.openxmlformats.org/officeDocument/2006/relationships" xmlns:p="http://schemas.openxmlformats.org/presentationml/2006/main">
   <p:cSld>
     <p:spTree>
@@ -9243,7 +11531,7 @@
 </p:sld>
 </file>
 
-<file path=ppt/slides/slide4.xml><?xml version="1.0" encoding="utf-8"?>
+<file path=ppt/slides/slide6.xml><?xml version="1.0" encoding="utf-8"?>
 <p:sld xmlns:a="http://schemas.openxmlformats.org/drawingml/2006/main" xmlns:r="http://schemas.openxmlformats.org/officeDocument/2006/relationships" xmlns:p="http://schemas.openxmlformats.org/presentationml/2006/main">
   <p:cSld>
     <p:spTree>
@@ -9367,7 +11655,7 @@
 </p:sld>
 </file>
 
-<file path=ppt/slides/slide5.xml><?xml version="1.0" encoding="utf-8"?>
+<file path=ppt/slides/slide7.xml><?xml version="1.0" encoding="utf-8"?>
 <p:sld xmlns:a="http://schemas.openxmlformats.org/drawingml/2006/main" xmlns:r="http://schemas.openxmlformats.org/officeDocument/2006/relationships" xmlns:p="http://schemas.openxmlformats.org/presentationml/2006/main">
   <p:cSld>
     <p:spTree>
@@ -9682,7 +11970,7 @@
 </p:sld>
 </file>
 
-<file path=ppt/slides/slide6.xml><?xml version="1.0" encoding="utf-8"?>
+<file path=ppt/slides/slide8.xml><?xml version="1.0" encoding="utf-8"?>
 <p:sld xmlns:a="http://schemas.openxmlformats.org/drawingml/2006/main" xmlns:r="http://schemas.openxmlformats.org/officeDocument/2006/relationships" xmlns:p="http://schemas.openxmlformats.org/presentationml/2006/main">
   <p:cSld>
     <p:spTree>
@@ -10183,7 +12471,7 @@
 </p:sld>
 </file>
 
-<file path=ppt/slides/slide7.xml><?xml version="1.0" encoding="utf-8"?>
+<file path=ppt/slides/slide9.xml><?xml version="1.0" encoding="utf-8"?>
 <p:sld xmlns:a="http://schemas.openxmlformats.org/drawingml/2006/main" xmlns:r="http://schemas.openxmlformats.org/officeDocument/2006/relationships" xmlns:p="http://schemas.openxmlformats.org/presentationml/2006/main">
   <p:cSld>
     <p:spTree>
@@ -10474,536 +12762,6 @@
     <p:extLst>
       <p:ext uri="{BB962C8B-B14F-4D97-AF65-F5344CB8AC3E}">
         <p14:creationId xmlns:p14="http://schemas.microsoft.com/office/powerpoint/2010/main" val="3339633799"/>
-      </p:ext>
-    </p:extLst>
-  </p:cSld>
-  <p:clrMapOvr>
-    <a:masterClrMapping/>
-  </p:clrMapOvr>
-</p:sld>
-</file>
-
-<file path=ppt/slides/slide8.xml><?xml version="1.0" encoding="utf-8"?>
-<p:sld xmlns:a="http://schemas.openxmlformats.org/drawingml/2006/main" xmlns:r="http://schemas.openxmlformats.org/officeDocument/2006/relationships" xmlns:p="http://schemas.openxmlformats.org/presentationml/2006/main">
-  <p:cSld>
-    <p:spTree>
-      <p:nvGrpSpPr>
-        <p:cNvPr id="1" name=""/>
-        <p:cNvGrpSpPr/>
-        <p:nvPr/>
-      </p:nvGrpSpPr>
-      <p:grpSpPr>
-        <a:xfrm>
-          <a:off x="0" y="0"/>
-          <a:ext cx="0" cy="0"/>
-          <a:chOff x="0" y="0"/>
-          <a:chExt cx="0" cy="0"/>
-        </a:xfrm>
-      </p:grpSpPr>
-      <p:sp>
-        <p:nvSpPr>
-          <p:cNvPr id="14" name="Freihandform: Form 13"/>
-          <p:cNvSpPr/>
-          <p:nvPr/>
-        </p:nvSpPr>
-        <p:spPr>
-          <a:xfrm>
-            <a:off x="1280752" y="1041400"/>
-            <a:ext cx="6529748" cy="8616950"/>
-          </a:xfrm>
-          <a:custGeom>
-            <a:avLst/>
-            <a:gdLst>
-              <a:gd name="connsiteX0" fmla="*/ 764438 w 6529748"/>
-              <a:gd name="connsiteY0" fmla="*/ 0 h 8616950"/>
-              <a:gd name="connsiteX1" fmla="*/ 4754528 w 6529748"/>
-              <a:gd name="connsiteY1" fmla="*/ 0 h 8616950"/>
-              <a:gd name="connsiteX2" fmla="*/ 6529748 w 6529748"/>
-              <a:gd name="connsiteY2" fmla="*/ 1695524 h 8616950"/>
-              <a:gd name="connsiteX3" fmla="*/ 6529748 w 6529748"/>
-              <a:gd name="connsiteY3" fmla="*/ 7852512 h 8616950"/>
-              <a:gd name="connsiteX4" fmla="*/ 5765310 w 6529748"/>
-              <a:gd name="connsiteY4" fmla="*/ 8616950 h 8616950"/>
-              <a:gd name="connsiteX5" fmla="*/ 764438 w 6529748"/>
-              <a:gd name="connsiteY5" fmla="*/ 8616950 h 8616950"/>
-              <a:gd name="connsiteX6" fmla="*/ 0 w 6529748"/>
-              <a:gd name="connsiteY6" fmla="*/ 7852512 h 8616950"/>
-              <a:gd name="connsiteX7" fmla="*/ 0 w 6529748"/>
-              <a:gd name="connsiteY7" fmla="*/ 764438 h 8616950"/>
-              <a:gd name="connsiteX8" fmla="*/ 764438 w 6529748"/>
-              <a:gd name="connsiteY8" fmla="*/ 0 h 8616950"/>
-            </a:gdLst>
-            <a:ahLst/>
-            <a:cxnLst>
-              <a:cxn ang="0">
-                <a:pos x="connsiteX0" y="connsiteY0"/>
-              </a:cxn>
-              <a:cxn ang="0">
-                <a:pos x="connsiteX1" y="connsiteY1"/>
-              </a:cxn>
-              <a:cxn ang="0">
-                <a:pos x="connsiteX2" y="connsiteY2"/>
-              </a:cxn>
-              <a:cxn ang="0">
-                <a:pos x="connsiteX3" y="connsiteY3"/>
-              </a:cxn>
-              <a:cxn ang="0">
-                <a:pos x="connsiteX4" y="connsiteY4"/>
-              </a:cxn>
-              <a:cxn ang="0">
-                <a:pos x="connsiteX5" y="connsiteY5"/>
-              </a:cxn>
-              <a:cxn ang="0">
-                <a:pos x="connsiteX6" y="connsiteY6"/>
-              </a:cxn>
-              <a:cxn ang="0">
-                <a:pos x="connsiteX7" y="connsiteY7"/>
-              </a:cxn>
-              <a:cxn ang="0">
-                <a:pos x="connsiteX8" y="connsiteY8"/>
-              </a:cxn>
-            </a:cxnLst>
-            <a:rect l="l" t="t" r="r" b="b"/>
-            <a:pathLst>
-              <a:path w="6529748" h="8616950">
-                <a:moveTo>
-                  <a:pt x="764438" y="0"/>
-                </a:moveTo>
-                <a:lnTo>
-                  <a:pt x="4754528" y="0"/>
-                </a:lnTo>
-                <a:lnTo>
-                  <a:pt x="6529748" y="1695524"/>
-                </a:lnTo>
-                <a:lnTo>
-                  <a:pt x="6529748" y="7852512"/>
-                </a:lnTo>
-                <a:cubicBezTo>
-                  <a:pt x="6529748" y="8274699"/>
-                  <a:pt x="6187497" y="8616950"/>
-                  <a:pt x="5765310" y="8616950"/>
-                </a:cubicBezTo>
-                <a:lnTo>
-                  <a:pt x="764438" y="8616950"/>
-                </a:lnTo>
-                <a:cubicBezTo>
-                  <a:pt x="342251" y="8616950"/>
-                  <a:pt x="0" y="8274699"/>
-                  <a:pt x="0" y="7852512"/>
-                </a:cubicBezTo>
-                <a:lnTo>
-                  <a:pt x="0" y="764438"/>
-                </a:lnTo>
-                <a:cubicBezTo>
-                  <a:pt x="0" y="342251"/>
-                  <a:pt x="342251" y="0"/>
-                  <a:pt x="764438" y="0"/>
-                </a:cubicBezTo>
-                <a:close/>
-              </a:path>
-            </a:pathLst>
-          </a:custGeom>
-          <a:solidFill>
-            <a:schemeClr val="bg1"/>
-          </a:solidFill>
-          <a:ln>
-            <a:noFill/>
-          </a:ln>
-        </p:spPr>
-        <p:style>
-          <a:lnRef idx="2">
-            <a:schemeClr val="accent1">
-              <a:shade val="50000"/>
-            </a:schemeClr>
-          </a:lnRef>
-          <a:fillRef idx="1">
-            <a:schemeClr val="accent1"/>
-          </a:fillRef>
-          <a:effectRef idx="0">
-            <a:schemeClr val="accent1"/>
-          </a:effectRef>
-          <a:fontRef idx="minor">
-            <a:schemeClr val="lt1"/>
-          </a:fontRef>
-        </p:style>
-        <p:txBody>
-          <a:bodyPr rtlCol="0" anchor="ctr"/>
-          <a:lstStyle/>
-          <a:p>
-            <a:pPr algn="ctr"/>
-            <a:endParaRPr lang="de-DE"/>
-          </a:p>
-        </p:txBody>
-      </p:sp>
-      <p:sp>
-        <p:nvSpPr>
-          <p:cNvPr id="15" name="Rechtwinkliges Dreieck 14"/>
-          <p:cNvSpPr/>
-          <p:nvPr/>
-        </p:nvSpPr>
-        <p:spPr>
-          <a:xfrm rot="10800000" flipH="1" flipV="1">
-            <a:off x="6035674" y="1041400"/>
-            <a:ext cx="1774825" cy="1695450"/>
-          </a:xfrm>
-          <a:prstGeom prst="rtTriangle">
-            <a:avLst/>
-          </a:prstGeom>
-          <a:solidFill>
-            <a:schemeClr val="bg1">
-              <a:lumMod val="85000"/>
-            </a:schemeClr>
-          </a:solidFill>
-          <a:ln>
-            <a:noFill/>
-          </a:ln>
-        </p:spPr>
-        <p:style>
-          <a:lnRef idx="2">
-            <a:schemeClr val="accent1">
-              <a:shade val="50000"/>
-            </a:schemeClr>
-          </a:lnRef>
-          <a:fillRef idx="1">
-            <a:schemeClr val="accent1"/>
-          </a:fillRef>
-          <a:effectRef idx="0">
-            <a:schemeClr val="accent1"/>
-          </a:effectRef>
-          <a:fontRef idx="minor">
-            <a:schemeClr val="lt1"/>
-          </a:fontRef>
-        </p:style>
-        <p:txBody>
-          <a:bodyPr rtlCol="0" anchor="ctr"/>
-          <a:lstStyle/>
-          <a:p>
-            <a:pPr algn="ctr"/>
-            <a:endParaRPr lang="de-DE"/>
-          </a:p>
-        </p:txBody>
-      </p:sp>
-      <p:sp>
-        <p:nvSpPr>
-          <p:cNvPr id="3" name="Rechteck 2"/>
-          <p:cNvSpPr/>
-          <p:nvPr/>
-        </p:nvSpPr>
-        <p:spPr>
-          <a:xfrm>
-            <a:off x="0" y="0"/>
-            <a:ext cx="10799763" cy="10799763"/>
-          </a:xfrm>
-          <a:prstGeom prst="rect">
-            <a:avLst/>
-          </a:prstGeom>
-          <a:noFill/>
-          <a:ln>
-            <a:noFill/>
-          </a:ln>
-        </p:spPr>
-        <p:style>
-          <a:lnRef idx="2">
-            <a:schemeClr val="accent1">
-              <a:shade val="50000"/>
-            </a:schemeClr>
-          </a:lnRef>
-          <a:fillRef idx="1">
-            <a:schemeClr val="accent1"/>
-          </a:fillRef>
-          <a:effectRef idx="0">
-            <a:schemeClr val="accent1"/>
-          </a:effectRef>
-          <a:fontRef idx="minor">
-            <a:schemeClr val="lt1"/>
-          </a:fontRef>
-        </p:style>
-        <p:txBody>
-          <a:bodyPr rtlCol="0" anchor="ctr"/>
-          <a:lstStyle/>
-          <a:p>
-            <a:pPr algn="ctr"/>
-            <a:endParaRPr lang="de-DE"/>
-          </a:p>
-        </p:txBody>
-      </p:sp>
-      <p:sp>
-        <p:nvSpPr>
-          <p:cNvPr id="16" name="Pfeil: nach oben 15"/>
-          <p:cNvSpPr/>
-          <p:nvPr/>
-        </p:nvSpPr>
-        <p:spPr>
-          <a:xfrm rot="5400000">
-            <a:off x="5399881" y="6247607"/>
-            <a:ext cx="4095750" cy="3981450"/>
-          </a:xfrm>
-          <a:prstGeom prst="upArrow">
-            <a:avLst/>
-          </a:prstGeom>
-          <a:solidFill>
-            <a:srgbClr val="FF0000"/>
-          </a:solidFill>
-          <a:effectLst/>
-        </p:spPr>
-        <p:style>
-          <a:lnRef idx="0">
-            <a:schemeClr val="accent6"/>
-          </a:lnRef>
-          <a:fillRef idx="3">
-            <a:schemeClr val="accent6"/>
-          </a:fillRef>
-          <a:effectRef idx="3">
-            <a:schemeClr val="accent6"/>
-          </a:effectRef>
-          <a:fontRef idx="minor">
-            <a:schemeClr val="lt1"/>
-          </a:fontRef>
-        </p:style>
-        <p:txBody>
-          <a:bodyPr rtlCol="0" anchor="ctr"/>
-          <a:lstStyle/>
-          <a:p>
-            <a:pPr algn="ctr"/>
-            <a:endParaRPr lang="de-DE"/>
-          </a:p>
-        </p:txBody>
-      </p:sp>
-    </p:spTree>
-    <p:extLst>
-      <p:ext uri="{BB962C8B-B14F-4D97-AF65-F5344CB8AC3E}">
-        <p14:creationId xmlns:p14="http://schemas.microsoft.com/office/powerpoint/2010/main" val="4083727051"/>
-      </p:ext>
-    </p:extLst>
-  </p:cSld>
-  <p:clrMapOvr>
-    <a:masterClrMapping/>
-  </p:clrMapOvr>
-</p:sld>
-</file>
-
-<file path=ppt/slides/slide9.xml><?xml version="1.0" encoding="utf-8"?>
-<p:sld xmlns:a="http://schemas.openxmlformats.org/drawingml/2006/main" xmlns:r="http://schemas.openxmlformats.org/officeDocument/2006/relationships" xmlns:p="http://schemas.openxmlformats.org/presentationml/2006/main">
-  <p:cSld>
-    <p:spTree>
-      <p:nvGrpSpPr>
-        <p:cNvPr id="1" name=""/>
-        <p:cNvGrpSpPr/>
-        <p:nvPr/>
-      </p:nvGrpSpPr>
-      <p:grpSpPr>
-        <a:xfrm>
-          <a:off x="0" y="0"/>
-          <a:ext cx="0" cy="0"/>
-          <a:chOff x="0" y="0"/>
-          <a:chExt cx="0" cy="0"/>
-        </a:xfrm>
-      </p:grpSpPr>
-      <p:sp>
-        <p:nvSpPr>
-          <p:cNvPr id="3" name="Rechteck 2"/>
-          <p:cNvSpPr/>
-          <p:nvPr/>
-        </p:nvSpPr>
-        <p:spPr>
-          <a:xfrm>
-            <a:off x="0" y="0"/>
-            <a:ext cx="10799763" cy="10799763"/>
-          </a:xfrm>
-          <a:prstGeom prst="rect">
-            <a:avLst/>
-          </a:prstGeom>
-          <a:noFill/>
-          <a:ln>
-            <a:noFill/>
-          </a:ln>
-        </p:spPr>
-        <p:style>
-          <a:lnRef idx="2">
-            <a:schemeClr val="accent1">
-              <a:shade val="50000"/>
-            </a:schemeClr>
-          </a:lnRef>
-          <a:fillRef idx="1">
-            <a:schemeClr val="accent1"/>
-          </a:fillRef>
-          <a:effectRef idx="0">
-            <a:schemeClr val="accent1"/>
-          </a:effectRef>
-          <a:fontRef idx="minor">
-            <a:schemeClr val="lt1"/>
-          </a:fontRef>
-        </p:style>
-        <p:txBody>
-          <a:bodyPr rtlCol="0" anchor="ctr"/>
-          <a:lstStyle/>
-          <a:p>
-            <a:pPr algn="ctr"/>
-            <a:endParaRPr lang="de-DE"/>
-          </a:p>
-        </p:txBody>
-      </p:sp>
-      <p:sp>
-        <p:nvSpPr>
-          <p:cNvPr id="2" name="Ellipse 1"/>
-          <p:cNvSpPr/>
-          <p:nvPr/>
-        </p:nvSpPr>
-        <p:spPr>
-          <a:xfrm>
-            <a:off x="899881" y="899881"/>
-            <a:ext cx="9000000" cy="9000000"/>
-          </a:xfrm>
-          <a:prstGeom prst="ellipse">
-            <a:avLst/>
-          </a:prstGeom>
-          <a:solidFill>
-            <a:srgbClr val="0070C0"/>
-          </a:solidFill>
-          <a:ln>
-            <a:noFill/>
-          </a:ln>
-        </p:spPr>
-        <p:style>
-          <a:lnRef idx="2">
-            <a:schemeClr val="accent1">
-              <a:shade val="50000"/>
-            </a:schemeClr>
-          </a:lnRef>
-          <a:fillRef idx="1">
-            <a:schemeClr val="accent1"/>
-          </a:fillRef>
-          <a:effectRef idx="0">
-            <a:schemeClr val="accent1"/>
-          </a:effectRef>
-          <a:fontRef idx="minor">
-            <a:schemeClr val="lt1"/>
-          </a:fontRef>
-        </p:style>
-        <p:txBody>
-          <a:bodyPr rtlCol="0" anchor="ctr"/>
-          <a:lstStyle/>
-          <a:p>
-            <a:pPr algn="ctr"/>
-            <a:endParaRPr lang="de-DE" sz="13800" b="1" dirty="0"/>
-          </a:p>
-        </p:txBody>
-      </p:sp>
-      <p:grpSp>
-        <p:nvGrpSpPr>
-          <p:cNvPr id="6" name="Gruppieren 5"/>
-          <p:cNvGrpSpPr>
-            <a:grpSpLocks noChangeAspect="1"/>
-          </p:cNvGrpSpPr>
-          <p:nvPr/>
-        </p:nvGrpSpPr>
-        <p:grpSpPr>
-          <a:xfrm>
-            <a:off x="4656307" y="1708569"/>
-            <a:ext cx="1487148" cy="7382625"/>
-            <a:chOff x="4884623" y="2852568"/>
-            <a:chExt cx="1030516" cy="5115774"/>
-          </a:xfrm>
-        </p:grpSpPr>
-        <p:sp>
-          <p:nvSpPr>
-            <p:cNvPr id="4" name="Rechteck: abgerundete Ecken 3"/>
-            <p:cNvSpPr/>
-            <p:nvPr/>
-          </p:nvSpPr>
-          <p:spPr>
-            <a:xfrm>
-              <a:off x="4884623" y="2852568"/>
-              <a:ext cx="1030515" cy="1074057"/>
-            </a:xfrm>
-            <a:prstGeom prst="roundRect">
-              <a:avLst>
-                <a:gd name="adj" fmla="val 49061"/>
-              </a:avLst>
-            </a:prstGeom>
-            <a:solidFill>
-              <a:schemeClr val="bg1"/>
-            </a:solidFill>
-            <a:ln>
-              <a:noFill/>
-            </a:ln>
-          </p:spPr>
-          <p:style>
-            <a:lnRef idx="2">
-              <a:schemeClr val="accent1">
-                <a:shade val="50000"/>
-              </a:schemeClr>
-            </a:lnRef>
-            <a:fillRef idx="1">
-              <a:schemeClr val="accent1"/>
-            </a:fillRef>
-            <a:effectRef idx="0">
-              <a:schemeClr val="accent1"/>
-            </a:effectRef>
-            <a:fontRef idx="minor">
-              <a:schemeClr val="lt1"/>
-            </a:fontRef>
-          </p:style>
-          <p:txBody>
-            <a:bodyPr rtlCol="0" anchor="ctr"/>
-            <a:lstStyle/>
-            <a:p>
-              <a:pPr algn="ctr"/>
-              <a:endParaRPr lang="de-DE"/>
-            </a:p>
-          </p:txBody>
-        </p:sp>
-        <p:sp>
-          <p:nvSpPr>
-            <p:cNvPr id="5" name="Rechteck: abgerundete Ecken 4"/>
-            <p:cNvSpPr/>
-            <p:nvPr/>
-          </p:nvSpPr>
-          <p:spPr>
-            <a:xfrm>
-              <a:off x="4884624" y="4339771"/>
-              <a:ext cx="1030515" cy="3628571"/>
-            </a:xfrm>
-            <a:prstGeom prst="roundRect">
-              <a:avLst/>
-            </a:prstGeom>
-            <a:solidFill>
-              <a:schemeClr val="bg1"/>
-            </a:solidFill>
-            <a:ln>
-              <a:noFill/>
-            </a:ln>
-          </p:spPr>
-          <p:style>
-            <a:lnRef idx="2">
-              <a:schemeClr val="accent1">
-                <a:shade val="50000"/>
-              </a:schemeClr>
-            </a:lnRef>
-            <a:fillRef idx="1">
-              <a:schemeClr val="accent1"/>
-            </a:fillRef>
-            <a:effectRef idx="0">
-              <a:schemeClr val="accent1"/>
-            </a:effectRef>
-            <a:fontRef idx="minor">
-              <a:schemeClr val="lt1"/>
-            </a:fontRef>
-          </p:style>
-          <p:txBody>
-            <a:bodyPr rtlCol="0" anchor="ctr"/>
-            <a:lstStyle/>
-            <a:p>
-              <a:pPr algn="ctr"/>
-              <a:endParaRPr lang="de-DE"/>
-            </a:p>
-          </p:txBody>
-        </p:sp>
-      </p:grpSp>
-    </p:spTree>
-    <p:extLst>
-      <p:ext uri="{BB962C8B-B14F-4D97-AF65-F5344CB8AC3E}">
-        <p14:creationId xmlns:p14="http://schemas.microsoft.com/office/powerpoint/2010/main" val="3397236484"/>
       </p:ext>
     </p:extLst>
   </p:cSld>

</xml_diff>

<commit_message>
better icons and no input bug any more
+ if you type a number the correct video will be opened
</commit_message>
<xml_diff>
--- a/Symbols.pptx
+++ b/Symbols.pptx
@@ -27,13 +27,14 @@
     <p:sldId id="286" r:id="rId21"/>
     <p:sldId id="273" r:id="rId22"/>
     <p:sldId id="274" r:id="rId23"/>
-    <p:sldId id="276" r:id="rId24"/>
-    <p:sldId id="300" r:id="rId25"/>
-    <p:sldId id="301" r:id="rId26"/>
-    <p:sldId id="282" r:id="rId27"/>
-    <p:sldId id="302" r:id="rId28"/>
-    <p:sldId id="284" r:id="rId29"/>
-    <p:sldId id="285" r:id="rId30"/>
+    <p:sldId id="304" r:id="rId24"/>
+    <p:sldId id="303" r:id="rId25"/>
+    <p:sldId id="276" r:id="rId26"/>
+    <p:sldId id="301" r:id="rId27"/>
+    <p:sldId id="282" r:id="rId28"/>
+    <p:sldId id="302" r:id="rId29"/>
+    <p:sldId id="284" r:id="rId30"/>
+    <p:sldId id="285" r:id="rId31"/>
   </p:sldIdLst>
   <p:sldSz cx="10799763" cy="10799763"/>
   <p:notesSz cx="6858000" cy="9144000"/>
@@ -163,8 +164,9 @@
             <p14:sldId id="286"/>
             <p14:sldId id="273"/>
             <p14:sldId id="274"/>
+            <p14:sldId id="304"/>
+            <p14:sldId id="303"/>
             <p14:sldId id="276"/>
-            <p14:sldId id="300"/>
             <p14:sldId id="301"/>
             <p14:sldId id="282"/>
             <p14:sldId id="302"/>
@@ -2491,9 +2493,14 @@
 <p:sldMaster xmlns:a="http://schemas.openxmlformats.org/drawingml/2006/main" xmlns:r="http://schemas.openxmlformats.org/officeDocument/2006/relationships" xmlns:p="http://schemas.openxmlformats.org/presentationml/2006/main">
   <p:cSld>
     <p:bg>
-      <p:bgRef idx="1001">
-        <a:schemeClr val="bg1"/>
-      </p:bgRef>
+      <p:bgPr>
+        <a:solidFill>
+          <a:schemeClr val="bg1">
+            <a:lumMod val="95000"/>
+          </a:schemeClr>
+        </a:solidFill>
+        <a:effectLst/>
+      </p:bgPr>
     </p:bg>
     <p:spTree>
       <p:nvGrpSpPr>
@@ -9059,6 +9066,11 @@
             <a:solidFill>
               <a:schemeClr val="bg1"/>
             </a:solidFill>
+            <a:ln>
+              <a:solidFill>
+                <a:srgbClr val="0070C0"/>
+              </a:solidFill>
+            </a:ln>
           </p:spPr>
           <p:style>
             <a:lnRef idx="2">
@@ -9462,6 +9474,344 @@
 </file>
 
 <file path=ppt/slides/slide23.xml><?xml version="1.0" encoding="utf-8"?>
+<p:sld xmlns:a="http://schemas.openxmlformats.org/drawingml/2006/main" xmlns:r="http://schemas.openxmlformats.org/officeDocument/2006/relationships" xmlns:p="http://schemas.openxmlformats.org/presentationml/2006/main">
+  <p:cSld>
+    <p:spTree>
+      <p:nvGrpSpPr>
+        <p:cNvPr id="1" name=""/>
+        <p:cNvGrpSpPr/>
+        <p:nvPr/>
+      </p:nvGrpSpPr>
+      <p:grpSpPr>
+        <a:xfrm>
+          <a:off x="0" y="0"/>
+          <a:ext cx="0" cy="0"/>
+          <a:chOff x="0" y="0"/>
+          <a:chExt cx="0" cy="0"/>
+        </a:xfrm>
+      </p:grpSpPr>
+      <p:sp>
+        <p:nvSpPr>
+          <p:cNvPr id="8" name="Rechteck: abgerundete Ecken 7"/>
+          <p:cNvSpPr/>
+          <p:nvPr/>
+        </p:nvSpPr>
+        <p:spPr>
+          <a:xfrm>
+            <a:off x="-1905794" y="0"/>
+            <a:ext cx="14611350" cy="10799763"/>
+          </a:xfrm>
+          <a:prstGeom prst="roundRect">
+            <a:avLst>
+              <a:gd name="adj" fmla="val 0"/>
+            </a:avLst>
+          </a:prstGeom>
+          <a:noFill/>
+          <a:ln>
+            <a:noFill/>
+          </a:ln>
+        </p:spPr>
+        <p:style>
+          <a:lnRef idx="2">
+            <a:schemeClr val="accent1">
+              <a:shade val="50000"/>
+            </a:schemeClr>
+          </a:lnRef>
+          <a:fillRef idx="1">
+            <a:schemeClr val="accent1"/>
+          </a:fillRef>
+          <a:effectRef idx="0">
+            <a:schemeClr val="accent1"/>
+          </a:effectRef>
+          <a:fontRef idx="minor">
+            <a:schemeClr val="lt1"/>
+          </a:fontRef>
+        </p:style>
+        <p:txBody>
+          <a:bodyPr rtlCol="0" anchor="ctr"/>
+          <a:lstStyle/>
+          <a:p>
+            <a:pPr algn="ctr"/>
+            <a:endParaRPr lang="de-DE"/>
+          </a:p>
+        </p:txBody>
+      </p:sp>
+      <p:sp>
+        <p:nvSpPr>
+          <p:cNvPr id="2" name="Rad 1"/>
+          <p:cNvSpPr/>
+          <p:nvPr/>
+        </p:nvSpPr>
+        <p:spPr>
+          <a:xfrm>
+            <a:off x="749300" y="101600"/>
+            <a:ext cx="7416000" cy="7416800"/>
+          </a:xfrm>
+          <a:prstGeom prst="donut">
+            <a:avLst>
+              <a:gd name="adj" fmla="val 14531"/>
+            </a:avLst>
+          </a:prstGeom>
+        </p:spPr>
+        <p:style>
+          <a:lnRef idx="2">
+            <a:schemeClr val="accent1">
+              <a:shade val="50000"/>
+            </a:schemeClr>
+          </a:lnRef>
+          <a:fillRef idx="1">
+            <a:schemeClr val="accent1"/>
+          </a:fillRef>
+          <a:effectRef idx="0">
+            <a:schemeClr val="accent1"/>
+          </a:effectRef>
+          <a:fontRef idx="minor">
+            <a:schemeClr val="lt1"/>
+          </a:fontRef>
+        </p:style>
+        <p:txBody>
+          <a:bodyPr rtlCol="0" anchor="ctr"/>
+          <a:lstStyle/>
+          <a:p>
+            <a:pPr algn="ctr"/>
+            <a:endParaRPr lang="de-DE">
+              <a:solidFill>
+                <a:schemeClr val="tx1"/>
+              </a:solidFill>
+            </a:endParaRPr>
+          </a:p>
+        </p:txBody>
+      </p:sp>
+      <p:sp>
+        <p:nvSpPr>
+          <p:cNvPr id="3" name="Abgerundetes Rechteck 2"/>
+          <p:cNvSpPr/>
+          <p:nvPr/>
+        </p:nvSpPr>
+        <p:spPr>
+          <a:xfrm rot="2815804">
+            <a:off x="5517991" y="6800007"/>
+            <a:ext cx="5257426" cy="1865922"/>
+          </a:xfrm>
+          <a:prstGeom prst="roundRect">
+            <a:avLst>
+              <a:gd name="adj" fmla="val 50000"/>
+            </a:avLst>
+          </a:prstGeom>
+          <a:ln>
+            <a:noFill/>
+          </a:ln>
+        </p:spPr>
+        <p:style>
+          <a:lnRef idx="2">
+            <a:schemeClr val="accent1">
+              <a:shade val="50000"/>
+            </a:schemeClr>
+          </a:lnRef>
+          <a:fillRef idx="1">
+            <a:schemeClr val="accent1"/>
+          </a:fillRef>
+          <a:effectRef idx="0">
+            <a:schemeClr val="accent1"/>
+          </a:effectRef>
+          <a:fontRef idx="minor">
+            <a:schemeClr val="lt1"/>
+          </a:fontRef>
+        </p:style>
+        <p:txBody>
+          <a:bodyPr rtlCol="0" anchor="ctr"/>
+          <a:lstStyle/>
+          <a:p>
+            <a:pPr algn="ctr"/>
+            <a:endParaRPr lang="de-DE"/>
+          </a:p>
+        </p:txBody>
+      </p:sp>
+    </p:spTree>
+    <p:extLst>
+      <p:ext uri="{BB962C8B-B14F-4D97-AF65-F5344CB8AC3E}">
+        <p14:creationId xmlns:p14="http://schemas.microsoft.com/office/powerpoint/2010/main" val="358917186"/>
+      </p:ext>
+    </p:extLst>
+  </p:cSld>
+  <p:clrMapOvr>
+    <a:masterClrMapping/>
+  </p:clrMapOvr>
+</p:sld>
+</file>
+
+<file path=ppt/slides/slide24.xml><?xml version="1.0" encoding="utf-8"?>
+<p:sld xmlns:a="http://schemas.openxmlformats.org/drawingml/2006/main" xmlns:r="http://schemas.openxmlformats.org/officeDocument/2006/relationships" xmlns:p="http://schemas.openxmlformats.org/presentationml/2006/main">
+  <p:cSld>
+    <p:spTree>
+      <p:nvGrpSpPr>
+        <p:cNvPr id="1" name=""/>
+        <p:cNvGrpSpPr/>
+        <p:nvPr/>
+      </p:nvGrpSpPr>
+      <p:grpSpPr>
+        <a:xfrm>
+          <a:off x="0" y="0"/>
+          <a:ext cx="0" cy="0"/>
+          <a:chOff x="0" y="0"/>
+          <a:chExt cx="0" cy="0"/>
+        </a:xfrm>
+      </p:grpSpPr>
+      <p:sp>
+        <p:nvSpPr>
+          <p:cNvPr id="8" name="Rechteck: abgerundete Ecken 7"/>
+          <p:cNvSpPr/>
+          <p:nvPr/>
+        </p:nvSpPr>
+        <p:spPr>
+          <a:xfrm>
+            <a:off x="0" y="0"/>
+            <a:ext cx="10799763" cy="10799763"/>
+          </a:xfrm>
+          <a:prstGeom prst="roundRect">
+            <a:avLst>
+              <a:gd name="adj" fmla="val 0"/>
+            </a:avLst>
+          </a:prstGeom>
+          <a:noFill/>
+          <a:ln>
+            <a:noFill/>
+          </a:ln>
+        </p:spPr>
+        <p:style>
+          <a:lnRef idx="2">
+            <a:schemeClr val="accent1">
+              <a:shade val="50000"/>
+            </a:schemeClr>
+          </a:lnRef>
+          <a:fillRef idx="1">
+            <a:schemeClr val="accent1"/>
+          </a:fillRef>
+          <a:effectRef idx="0">
+            <a:schemeClr val="accent1"/>
+          </a:effectRef>
+          <a:fontRef idx="minor">
+            <a:schemeClr val="lt1"/>
+          </a:fontRef>
+        </p:style>
+        <p:txBody>
+          <a:bodyPr rtlCol="0" anchor="ctr"/>
+          <a:lstStyle/>
+          <a:p>
+            <a:pPr algn="ctr"/>
+            <a:endParaRPr lang="de-DE"/>
+          </a:p>
+        </p:txBody>
+      </p:sp>
+      <p:grpSp>
+        <p:nvGrpSpPr>
+          <p:cNvPr id="30" name="Gruppieren 29"/>
+          <p:cNvGrpSpPr>
+            <a:grpSpLocks noChangeAspect="1"/>
+          </p:cNvGrpSpPr>
+          <p:nvPr/>
+        </p:nvGrpSpPr>
+        <p:grpSpPr>
+          <a:xfrm>
+            <a:off x="811259" y="3158926"/>
+            <a:ext cx="9177244" cy="4481910"/>
+            <a:chOff x="2616200" y="4040981"/>
+            <a:chExt cx="5461000" cy="2667000"/>
+          </a:xfrm>
+        </p:grpSpPr>
+        <p:cxnSp>
+          <p:nvCxnSpPr>
+            <p:cNvPr id="11" name="Gekrümmte Verbindung 10"/>
+            <p:cNvCxnSpPr/>
+            <p:nvPr/>
+          </p:nvCxnSpPr>
+          <p:spPr>
+            <a:xfrm>
+              <a:off x="2616200" y="4040981"/>
+              <a:ext cx="5461000" cy="2667000"/>
+            </a:xfrm>
+            <a:prstGeom prst="curvedConnector3">
+              <a:avLst>
+                <a:gd name="adj1" fmla="val 50000"/>
+              </a:avLst>
+            </a:prstGeom>
+            <a:ln w="889000" cap="rnd">
+              <a:solidFill>
+                <a:srgbClr val="7030A0"/>
+              </a:solidFill>
+              <a:round/>
+              <a:tailEnd type="stealth"/>
+            </a:ln>
+          </p:spPr>
+          <p:style>
+            <a:lnRef idx="1">
+              <a:schemeClr val="accent1"/>
+            </a:lnRef>
+            <a:fillRef idx="0">
+              <a:schemeClr val="accent1"/>
+            </a:fillRef>
+            <a:effectRef idx="0">
+              <a:schemeClr val="accent1"/>
+            </a:effectRef>
+            <a:fontRef idx="minor">
+              <a:schemeClr val="tx1"/>
+            </a:fontRef>
+          </p:style>
+        </p:cxnSp>
+        <p:cxnSp>
+          <p:nvCxnSpPr>
+            <p:cNvPr id="28" name="Gekrümmte Verbindung 27"/>
+            <p:cNvCxnSpPr/>
+            <p:nvPr/>
+          </p:nvCxnSpPr>
+          <p:spPr>
+            <a:xfrm flipV="1">
+              <a:off x="2624931" y="4040981"/>
+              <a:ext cx="5443538" cy="2667000"/>
+            </a:xfrm>
+            <a:prstGeom prst="curvedConnector3">
+              <a:avLst>
+                <a:gd name="adj1" fmla="val 50000"/>
+              </a:avLst>
+            </a:prstGeom>
+            <a:ln w="889000" cap="rnd">
+              <a:solidFill>
+                <a:srgbClr val="7030A0"/>
+              </a:solidFill>
+              <a:round/>
+              <a:tailEnd type="stealth"/>
+            </a:ln>
+          </p:spPr>
+          <p:style>
+            <a:lnRef idx="1">
+              <a:schemeClr val="accent1"/>
+            </a:lnRef>
+            <a:fillRef idx="0">
+              <a:schemeClr val="accent1"/>
+            </a:fillRef>
+            <a:effectRef idx="0">
+              <a:schemeClr val="accent1"/>
+            </a:effectRef>
+            <a:fontRef idx="minor">
+              <a:schemeClr val="tx1"/>
+            </a:fontRef>
+          </p:style>
+        </p:cxnSp>
+      </p:grpSp>
+    </p:spTree>
+    <p:extLst>
+      <p:ext uri="{BB962C8B-B14F-4D97-AF65-F5344CB8AC3E}">
+        <p14:creationId xmlns:p14="http://schemas.microsoft.com/office/powerpoint/2010/main" val="2444819534"/>
+      </p:ext>
+    </p:extLst>
+  </p:cSld>
+  <p:clrMapOvr>
+    <a:masterClrMapping/>
+  </p:clrMapOvr>
+</p:sld>
+</file>
+
+<file path=ppt/slides/slide25.xml><?xml version="1.0" encoding="utf-8"?>
 <p:sld xmlns:a="http://schemas.openxmlformats.org/drawingml/2006/main" xmlns:r="http://schemas.openxmlformats.org/officeDocument/2006/relationships" xmlns:p="http://schemas.openxmlformats.org/presentationml/2006/main">
   <p:cSld>
     <p:spTree>
@@ -10017,366 +10367,7 @@
 </p:sld>
 </file>
 
-<file path=ppt/slides/slide24.xml><?xml version="1.0" encoding="utf-8"?>
-<p:sld xmlns:a="http://schemas.openxmlformats.org/drawingml/2006/main" xmlns:r="http://schemas.openxmlformats.org/officeDocument/2006/relationships" xmlns:p="http://schemas.openxmlformats.org/presentationml/2006/main">
-  <p:cSld>
-    <p:spTree>
-      <p:nvGrpSpPr>
-        <p:cNvPr id="1" name=""/>
-        <p:cNvGrpSpPr/>
-        <p:nvPr/>
-      </p:nvGrpSpPr>
-      <p:grpSpPr>
-        <a:xfrm>
-          <a:off x="0" y="0"/>
-          <a:ext cx="0" cy="0"/>
-          <a:chOff x="0" y="0"/>
-          <a:chExt cx="0" cy="0"/>
-        </a:xfrm>
-      </p:grpSpPr>
-      <p:sp>
-        <p:nvSpPr>
-          <p:cNvPr id="8" name="Rechteck: abgerundete Ecken 7"/>
-          <p:cNvSpPr/>
-          <p:nvPr/>
-        </p:nvSpPr>
-        <p:spPr>
-          <a:xfrm>
-            <a:off x="0" y="0"/>
-            <a:ext cx="10799763" cy="10799763"/>
-          </a:xfrm>
-          <a:prstGeom prst="roundRect">
-            <a:avLst>
-              <a:gd name="adj" fmla="val 0"/>
-            </a:avLst>
-          </a:prstGeom>
-          <a:noFill/>
-          <a:ln>
-            <a:noFill/>
-          </a:ln>
-        </p:spPr>
-        <p:style>
-          <a:lnRef idx="2">
-            <a:schemeClr val="accent1">
-              <a:shade val="50000"/>
-            </a:schemeClr>
-          </a:lnRef>
-          <a:fillRef idx="1">
-            <a:schemeClr val="accent1"/>
-          </a:fillRef>
-          <a:effectRef idx="0">
-            <a:schemeClr val="accent1"/>
-          </a:effectRef>
-          <a:fontRef idx="minor">
-            <a:schemeClr val="lt1"/>
-          </a:fontRef>
-        </p:style>
-        <p:txBody>
-          <a:bodyPr rtlCol="0" anchor="ctr"/>
-          <a:lstStyle/>
-          <a:p>
-            <a:pPr algn="ctr"/>
-            <a:endParaRPr lang="de-DE"/>
-          </a:p>
-        </p:txBody>
-      </p:sp>
-      <p:sp>
-        <p:nvSpPr>
-          <p:cNvPr id="7" name="Freihandform 6"/>
-          <p:cNvSpPr/>
-          <p:nvPr/>
-        </p:nvSpPr>
-        <p:spPr>
-          <a:xfrm>
-            <a:off x="539883" y="539883"/>
-            <a:ext cx="9719999" cy="9719999"/>
-          </a:xfrm>
-          <a:custGeom>
-            <a:avLst/>
-            <a:gdLst>
-              <a:gd name="connsiteX0" fmla="*/ 7847999 w 9719999"/>
-              <a:gd name="connsiteY0" fmla="*/ 6353999 h 9719999"/>
-              <a:gd name="connsiteX1" fmla="*/ 6353999 w 9719999"/>
-              <a:gd name="connsiteY1" fmla="*/ 7847999 h 9719999"/>
-              <a:gd name="connsiteX2" fmla="*/ 7847999 w 9719999"/>
-              <a:gd name="connsiteY2" fmla="*/ 9341999 h 9719999"/>
-              <a:gd name="connsiteX3" fmla="*/ 9341999 w 9719999"/>
-              <a:gd name="connsiteY3" fmla="*/ 7847999 h 9719999"/>
-              <a:gd name="connsiteX4" fmla="*/ 7847999 w 9719999"/>
-              <a:gd name="connsiteY4" fmla="*/ 6353999 h 9719999"/>
-              <a:gd name="connsiteX5" fmla="*/ 4859999 w 9719999"/>
-              <a:gd name="connsiteY5" fmla="*/ 3365999 h 9719999"/>
-              <a:gd name="connsiteX6" fmla="*/ 3365999 w 9719999"/>
-              <a:gd name="connsiteY6" fmla="*/ 4859999 h 9719999"/>
-              <a:gd name="connsiteX7" fmla="*/ 4859999 w 9719999"/>
-              <a:gd name="connsiteY7" fmla="*/ 6353999 h 9719999"/>
-              <a:gd name="connsiteX8" fmla="*/ 6353999 w 9719999"/>
-              <a:gd name="connsiteY8" fmla="*/ 4859999 h 9719999"/>
-              <a:gd name="connsiteX9" fmla="*/ 4859999 w 9719999"/>
-              <a:gd name="connsiteY9" fmla="*/ 3365999 h 9719999"/>
-              <a:gd name="connsiteX10" fmla="*/ 1871999 w 9719999"/>
-              <a:gd name="connsiteY10" fmla="*/ 377999 h 9719999"/>
-              <a:gd name="connsiteX11" fmla="*/ 377999 w 9719999"/>
-              <a:gd name="connsiteY11" fmla="*/ 1871999 h 9719999"/>
-              <a:gd name="connsiteX12" fmla="*/ 1871999 w 9719999"/>
-              <a:gd name="connsiteY12" fmla="*/ 3365999 h 9719999"/>
-              <a:gd name="connsiteX13" fmla="*/ 3365999 w 9719999"/>
-              <a:gd name="connsiteY13" fmla="*/ 1871999 h 9719999"/>
-              <a:gd name="connsiteX14" fmla="*/ 1871999 w 9719999"/>
-              <a:gd name="connsiteY14" fmla="*/ 377999 h 9719999"/>
-              <a:gd name="connsiteX15" fmla="*/ 540528 w 9719999"/>
-              <a:gd name="connsiteY15" fmla="*/ 0 h 9719999"/>
-              <a:gd name="connsiteX16" fmla="*/ 9179470 w 9719999"/>
-              <a:gd name="connsiteY16" fmla="*/ 0 h 9719999"/>
-              <a:gd name="connsiteX17" fmla="*/ 9719999 w 9719999"/>
-              <a:gd name="connsiteY17" fmla="*/ 540528 h 9719999"/>
-              <a:gd name="connsiteX18" fmla="*/ 9719999 w 9719999"/>
-              <a:gd name="connsiteY18" fmla="*/ 9179470 h 9719999"/>
-              <a:gd name="connsiteX19" fmla="*/ 9179470 w 9719999"/>
-              <a:gd name="connsiteY19" fmla="*/ 9719999 h 9719999"/>
-              <a:gd name="connsiteX20" fmla="*/ 540528 w 9719999"/>
-              <a:gd name="connsiteY20" fmla="*/ 9719999 h 9719999"/>
-              <a:gd name="connsiteX21" fmla="*/ 0 w 9719999"/>
-              <a:gd name="connsiteY21" fmla="*/ 9179470 h 9719999"/>
-              <a:gd name="connsiteX22" fmla="*/ 0 w 9719999"/>
-              <a:gd name="connsiteY22" fmla="*/ 540528 h 9719999"/>
-              <a:gd name="connsiteX23" fmla="*/ 540528 w 9719999"/>
-              <a:gd name="connsiteY23" fmla="*/ 0 h 9719999"/>
-            </a:gdLst>
-            <a:ahLst/>
-            <a:cxnLst>
-              <a:cxn ang="0">
-                <a:pos x="connsiteX0" y="connsiteY0"/>
-              </a:cxn>
-              <a:cxn ang="0">
-                <a:pos x="connsiteX1" y="connsiteY1"/>
-              </a:cxn>
-              <a:cxn ang="0">
-                <a:pos x="connsiteX2" y="connsiteY2"/>
-              </a:cxn>
-              <a:cxn ang="0">
-                <a:pos x="connsiteX3" y="connsiteY3"/>
-              </a:cxn>
-              <a:cxn ang="0">
-                <a:pos x="connsiteX4" y="connsiteY4"/>
-              </a:cxn>
-              <a:cxn ang="0">
-                <a:pos x="connsiteX5" y="connsiteY5"/>
-              </a:cxn>
-              <a:cxn ang="0">
-                <a:pos x="connsiteX6" y="connsiteY6"/>
-              </a:cxn>
-              <a:cxn ang="0">
-                <a:pos x="connsiteX7" y="connsiteY7"/>
-              </a:cxn>
-              <a:cxn ang="0">
-                <a:pos x="connsiteX8" y="connsiteY8"/>
-              </a:cxn>
-              <a:cxn ang="0">
-                <a:pos x="connsiteX9" y="connsiteY9"/>
-              </a:cxn>
-              <a:cxn ang="0">
-                <a:pos x="connsiteX10" y="connsiteY10"/>
-              </a:cxn>
-              <a:cxn ang="0">
-                <a:pos x="connsiteX11" y="connsiteY11"/>
-              </a:cxn>
-              <a:cxn ang="0">
-                <a:pos x="connsiteX12" y="connsiteY12"/>
-              </a:cxn>
-              <a:cxn ang="0">
-                <a:pos x="connsiteX13" y="connsiteY13"/>
-              </a:cxn>
-              <a:cxn ang="0">
-                <a:pos x="connsiteX14" y="connsiteY14"/>
-              </a:cxn>
-              <a:cxn ang="0">
-                <a:pos x="connsiteX15" y="connsiteY15"/>
-              </a:cxn>
-              <a:cxn ang="0">
-                <a:pos x="connsiteX16" y="connsiteY16"/>
-              </a:cxn>
-              <a:cxn ang="0">
-                <a:pos x="connsiteX17" y="connsiteY17"/>
-              </a:cxn>
-              <a:cxn ang="0">
-                <a:pos x="connsiteX18" y="connsiteY18"/>
-              </a:cxn>
-              <a:cxn ang="0">
-                <a:pos x="connsiteX19" y="connsiteY19"/>
-              </a:cxn>
-              <a:cxn ang="0">
-                <a:pos x="connsiteX20" y="connsiteY20"/>
-              </a:cxn>
-              <a:cxn ang="0">
-                <a:pos x="connsiteX21" y="connsiteY21"/>
-              </a:cxn>
-              <a:cxn ang="0">
-                <a:pos x="connsiteX22" y="connsiteY22"/>
-              </a:cxn>
-              <a:cxn ang="0">
-                <a:pos x="connsiteX23" y="connsiteY23"/>
-              </a:cxn>
-            </a:cxnLst>
-            <a:rect l="l" t="t" r="r" b="b"/>
-            <a:pathLst>
-              <a:path w="9719999" h="9719999">
-                <a:moveTo>
-                  <a:pt x="7847999" y="6353999"/>
-                </a:moveTo>
-                <a:cubicBezTo>
-                  <a:pt x="7022886" y="6353999"/>
-                  <a:pt x="6353999" y="7022886"/>
-                  <a:pt x="6353999" y="7847999"/>
-                </a:cubicBezTo>
-                <a:cubicBezTo>
-                  <a:pt x="6353999" y="8673112"/>
-                  <a:pt x="7022886" y="9341999"/>
-                  <a:pt x="7847999" y="9341999"/>
-                </a:cubicBezTo>
-                <a:cubicBezTo>
-                  <a:pt x="8673112" y="9341999"/>
-                  <a:pt x="9341999" y="8673112"/>
-                  <a:pt x="9341999" y="7847999"/>
-                </a:cubicBezTo>
-                <a:cubicBezTo>
-                  <a:pt x="9341999" y="7022886"/>
-                  <a:pt x="8673112" y="6353999"/>
-                  <a:pt x="7847999" y="6353999"/>
-                </a:cubicBezTo>
-                <a:close/>
-                <a:moveTo>
-                  <a:pt x="4859999" y="3365999"/>
-                </a:moveTo>
-                <a:cubicBezTo>
-                  <a:pt x="4034886" y="3365999"/>
-                  <a:pt x="3365999" y="4034886"/>
-                  <a:pt x="3365999" y="4859999"/>
-                </a:cubicBezTo>
-                <a:cubicBezTo>
-                  <a:pt x="3365999" y="5685112"/>
-                  <a:pt x="4034886" y="6353999"/>
-                  <a:pt x="4859999" y="6353999"/>
-                </a:cubicBezTo>
-                <a:cubicBezTo>
-                  <a:pt x="5685112" y="6353999"/>
-                  <a:pt x="6353999" y="5685112"/>
-                  <a:pt x="6353999" y="4859999"/>
-                </a:cubicBezTo>
-                <a:cubicBezTo>
-                  <a:pt x="6353999" y="4034886"/>
-                  <a:pt x="5685112" y="3365999"/>
-                  <a:pt x="4859999" y="3365999"/>
-                </a:cubicBezTo>
-                <a:close/>
-                <a:moveTo>
-                  <a:pt x="1871999" y="377999"/>
-                </a:moveTo>
-                <a:cubicBezTo>
-                  <a:pt x="1046886" y="377999"/>
-                  <a:pt x="377999" y="1046886"/>
-                  <a:pt x="377999" y="1871999"/>
-                </a:cubicBezTo>
-                <a:cubicBezTo>
-                  <a:pt x="377999" y="2697112"/>
-                  <a:pt x="1046886" y="3365999"/>
-                  <a:pt x="1871999" y="3365999"/>
-                </a:cubicBezTo>
-                <a:cubicBezTo>
-                  <a:pt x="2697112" y="3365999"/>
-                  <a:pt x="3365999" y="2697112"/>
-                  <a:pt x="3365999" y="1871999"/>
-                </a:cubicBezTo>
-                <a:cubicBezTo>
-                  <a:pt x="3365999" y="1046886"/>
-                  <a:pt x="2697112" y="377999"/>
-                  <a:pt x="1871999" y="377999"/>
-                </a:cubicBezTo>
-                <a:close/>
-                <a:moveTo>
-                  <a:pt x="540528" y="0"/>
-                </a:moveTo>
-                <a:lnTo>
-                  <a:pt x="9179470" y="0"/>
-                </a:lnTo>
-                <a:cubicBezTo>
-                  <a:pt x="9477996" y="0"/>
-                  <a:pt x="9719999" y="242002"/>
-                  <a:pt x="9719999" y="540528"/>
-                </a:cubicBezTo>
-                <a:lnTo>
-                  <a:pt x="9719999" y="9179470"/>
-                </a:lnTo>
-                <a:cubicBezTo>
-                  <a:pt x="9719999" y="9477996"/>
-                  <a:pt x="9477996" y="9719999"/>
-                  <a:pt x="9179470" y="9719999"/>
-                </a:cubicBezTo>
-                <a:lnTo>
-                  <a:pt x="540528" y="9719999"/>
-                </a:lnTo>
-                <a:cubicBezTo>
-                  <a:pt x="242002" y="9719999"/>
-                  <a:pt x="0" y="9477996"/>
-                  <a:pt x="0" y="9179470"/>
-                </a:cubicBezTo>
-                <a:lnTo>
-                  <a:pt x="0" y="540528"/>
-                </a:lnTo>
-                <a:cubicBezTo>
-                  <a:pt x="0" y="242002"/>
-                  <a:pt x="242002" y="0"/>
-                  <a:pt x="540528" y="0"/>
-                </a:cubicBezTo>
-                <a:close/>
-              </a:path>
-            </a:pathLst>
-          </a:custGeom>
-          <a:ln>
-            <a:noFill/>
-          </a:ln>
-        </p:spPr>
-        <p:style>
-          <a:lnRef idx="2">
-            <a:schemeClr val="accent4">
-              <a:shade val="50000"/>
-            </a:schemeClr>
-          </a:lnRef>
-          <a:fillRef idx="1">
-            <a:schemeClr val="accent4"/>
-          </a:fillRef>
-          <a:effectRef idx="0">
-            <a:schemeClr val="accent4"/>
-          </a:effectRef>
-          <a:fontRef idx="minor">
-            <a:schemeClr val="lt1"/>
-          </a:fontRef>
-        </p:style>
-        <p:txBody>
-          <a:bodyPr wrap="square" rtlCol="0" anchor="ctr">
-            <a:noAutofit/>
-          </a:bodyPr>
-          <a:lstStyle/>
-          <a:p>
-            <a:pPr algn="ctr"/>
-            <a:endParaRPr lang="de-DE"/>
-          </a:p>
-        </p:txBody>
-      </p:sp>
-    </p:spTree>
-    <p:extLst>
-      <p:ext uri="{BB962C8B-B14F-4D97-AF65-F5344CB8AC3E}">
-        <p14:creationId xmlns:p14="http://schemas.microsoft.com/office/powerpoint/2010/main" val="2112105975"/>
-      </p:ext>
-    </p:extLst>
-  </p:cSld>
-  <p:clrMapOvr>
-    <a:masterClrMapping/>
-  </p:clrMapOvr>
-</p:sld>
-</file>
-
-<file path=ppt/slides/slide25.xml><?xml version="1.0" encoding="utf-8"?>
+<file path=ppt/slides/slide26.xml><?xml version="1.0" encoding="utf-8"?>
 <p:sld xmlns:a="http://schemas.openxmlformats.org/drawingml/2006/main" xmlns:r="http://schemas.openxmlformats.org/officeDocument/2006/relationships" xmlns:p="http://schemas.openxmlformats.org/presentationml/2006/main">
   <p:cSld>
     <p:spTree>
@@ -10547,7 +10538,7 @@
 </p:sld>
 </file>
 
-<file path=ppt/slides/slide26.xml><?xml version="1.0" encoding="utf-8"?>
+<file path=ppt/slides/slide27.xml><?xml version="1.0" encoding="utf-8"?>
 <p:sld xmlns:a="http://schemas.openxmlformats.org/drawingml/2006/main" xmlns:r="http://schemas.openxmlformats.org/officeDocument/2006/relationships" xmlns:p="http://schemas.openxmlformats.org/presentationml/2006/main">
   <p:cSld>
     <p:spTree>
@@ -10673,7 +10664,7 @@
 </p:sld>
 </file>
 
-<file path=ppt/slides/slide27.xml><?xml version="1.0" encoding="utf-8"?>
+<file path=ppt/slides/slide28.xml><?xml version="1.0" encoding="utf-8"?>
 <p:sld xmlns:a="http://schemas.openxmlformats.org/drawingml/2006/main" xmlns:r="http://schemas.openxmlformats.org/officeDocument/2006/relationships" xmlns:p="http://schemas.openxmlformats.org/presentationml/2006/main">
   <p:cSld>
     <p:spTree>
@@ -10797,7 +10788,7 @@
 </p:sld>
 </file>
 
-<file path=ppt/slides/slide28.xml><?xml version="1.0" encoding="utf-8"?>
+<file path=ppt/slides/slide29.xml><?xml version="1.0" encoding="utf-8"?>
 <p:sld xmlns:a="http://schemas.openxmlformats.org/drawingml/2006/main" xmlns:r="http://schemas.openxmlformats.org/officeDocument/2006/relationships" xmlns:p="http://schemas.openxmlformats.org/presentationml/2006/main">
   <p:cSld>
     <p:spTree>
@@ -10956,786 +10947,6 @@
     <p:extLst>
       <p:ext uri="{BB962C8B-B14F-4D97-AF65-F5344CB8AC3E}">
         <p14:creationId xmlns:p14="http://schemas.microsoft.com/office/powerpoint/2010/main" val="2132650698"/>
-      </p:ext>
-    </p:extLst>
-  </p:cSld>
-  <p:clrMapOvr>
-    <a:masterClrMapping/>
-  </p:clrMapOvr>
-</p:sld>
-</file>
-
-<file path=ppt/slides/slide29.xml><?xml version="1.0" encoding="utf-8"?>
-<p:sld xmlns:a="http://schemas.openxmlformats.org/drawingml/2006/main" xmlns:r="http://schemas.openxmlformats.org/officeDocument/2006/relationships" xmlns:p="http://schemas.openxmlformats.org/presentationml/2006/main">
-  <p:cSld>
-    <p:spTree>
-      <p:nvGrpSpPr>
-        <p:cNvPr id="1" name=""/>
-        <p:cNvGrpSpPr/>
-        <p:nvPr/>
-      </p:nvGrpSpPr>
-      <p:grpSpPr>
-        <a:xfrm>
-          <a:off x="0" y="0"/>
-          <a:ext cx="0" cy="0"/>
-          <a:chOff x="0" y="0"/>
-          <a:chExt cx="0" cy="0"/>
-        </a:xfrm>
-      </p:grpSpPr>
-      <p:sp>
-        <p:nvSpPr>
-          <p:cNvPr id="2" name="Rechteck 1"/>
-          <p:cNvSpPr/>
-          <p:nvPr/>
-        </p:nvSpPr>
-        <p:spPr>
-          <a:xfrm>
-            <a:off x="899880" y="2699880"/>
-            <a:ext cx="9000001" cy="5400001"/>
-          </a:xfrm>
-          <a:prstGeom prst="rect">
-            <a:avLst/>
-          </a:prstGeom>
-          <a:solidFill>
-            <a:srgbClr val="00247D"/>
-          </a:solidFill>
-          <a:ln>
-            <a:noFill/>
-          </a:ln>
-        </p:spPr>
-        <p:style>
-          <a:lnRef idx="2">
-            <a:schemeClr val="accent1">
-              <a:shade val="50000"/>
-            </a:schemeClr>
-          </a:lnRef>
-          <a:fillRef idx="1">
-            <a:schemeClr val="accent1"/>
-          </a:fillRef>
-          <a:effectRef idx="0">
-            <a:schemeClr val="accent1"/>
-          </a:effectRef>
-          <a:fontRef idx="minor">
-            <a:schemeClr val="lt1"/>
-          </a:fontRef>
-        </p:style>
-        <p:txBody>
-          <a:bodyPr rtlCol="0" anchor="ctr"/>
-          <a:lstStyle/>
-          <a:p>
-            <a:pPr algn="ctr"/>
-            <a:endParaRPr lang="de-DE"/>
-          </a:p>
-        </p:txBody>
-      </p:sp>
-      <p:sp>
-        <p:nvSpPr>
-          <p:cNvPr id="8" name="Diagonaler Streifen 7"/>
-          <p:cNvSpPr/>
-          <p:nvPr/>
-        </p:nvSpPr>
-        <p:spPr>
-          <a:xfrm>
-            <a:off x="899881" y="2699881"/>
-            <a:ext cx="9000000" cy="5400000"/>
-          </a:xfrm>
-          <a:prstGeom prst="diagStripe">
-            <a:avLst>
-              <a:gd name="adj" fmla="val 88241"/>
-            </a:avLst>
-          </a:prstGeom>
-          <a:solidFill>
-            <a:schemeClr val="bg1"/>
-          </a:solidFill>
-          <a:ln>
-            <a:noFill/>
-          </a:ln>
-        </p:spPr>
-        <p:style>
-          <a:lnRef idx="2">
-            <a:schemeClr val="accent1">
-              <a:shade val="50000"/>
-            </a:schemeClr>
-          </a:lnRef>
-          <a:fillRef idx="1">
-            <a:schemeClr val="accent1"/>
-          </a:fillRef>
-          <a:effectRef idx="0">
-            <a:schemeClr val="accent1"/>
-          </a:effectRef>
-          <a:fontRef idx="minor">
-            <a:schemeClr val="lt1"/>
-          </a:fontRef>
-        </p:style>
-        <p:txBody>
-          <a:bodyPr rtlCol="0" anchor="ctr"/>
-          <a:lstStyle/>
-          <a:p>
-            <a:pPr algn="ctr"/>
-            <a:endParaRPr lang="de-DE"/>
-          </a:p>
-        </p:txBody>
-      </p:sp>
-      <p:sp>
-        <p:nvSpPr>
-          <p:cNvPr id="9" name="Diagonaler Streifen 8"/>
-          <p:cNvSpPr/>
-          <p:nvPr/>
-        </p:nvSpPr>
-        <p:spPr>
-          <a:xfrm rot="10800000">
-            <a:off x="899882" y="2699881"/>
-            <a:ext cx="9000000" cy="5400000"/>
-          </a:xfrm>
-          <a:prstGeom prst="diagStripe">
-            <a:avLst>
-              <a:gd name="adj" fmla="val 88241"/>
-            </a:avLst>
-          </a:prstGeom>
-          <a:solidFill>
-            <a:schemeClr val="bg1"/>
-          </a:solidFill>
-          <a:ln>
-            <a:noFill/>
-          </a:ln>
-        </p:spPr>
-        <p:style>
-          <a:lnRef idx="2">
-            <a:schemeClr val="accent1">
-              <a:shade val="50000"/>
-            </a:schemeClr>
-          </a:lnRef>
-          <a:fillRef idx="1">
-            <a:schemeClr val="accent1"/>
-          </a:fillRef>
-          <a:effectRef idx="0">
-            <a:schemeClr val="accent1"/>
-          </a:effectRef>
-          <a:fontRef idx="minor">
-            <a:schemeClr val="lt1"/>
-          </a:fontRef>
-        </p:style>
-        <p:txBody>
-          <a:bodyPr rtlCol="0" anchor="ctr"/>
-          <a:lstStyle/>
-          <a:p>
-            <a:pPr algn="ctr"/>
-            <a:endParaRPr lang="de-DE"/>
-          </a:p>
-        </p:txBody>
-      </p:sp>
-      <p:sp>
-        <p:nvSpPr>
-          <p:cNvPr id="10" name="Diagonaler Streifen 9"/>
-          <p:cNvSpPr/>
-          <p:nvPr/>
-        </p:nvSpPr>
-        <p:spPr>
-          <a:xfrm flipH="1">
-            <a:off x="899880" y="2699882"/>
-            <a:ext cx="9000000" cy="5400000"/>
-          </a:xfrm>
-          <a:prstGeom prst="diagStripe">
-            <a:avLst>
-              <a:gd name="adj" fmla="val 88241"/>
-            </a:avLst>
-          </a:prstGeom>
-          <a:solidFill>
-            <a:schemeClr val="bg1"/>
-          </a:solidFill>
-          <a:ln>
-            <a:noFill/>
-          </a:ln>
-        </p:spPr>
-        <p:style>
-          <a:lnRef idx="2">
-            <a:schemeClr val="accent1">
-              <a:shade val="50000"/>
-            </a:schemeClr>
-          </a:lnRef>
-          <a:fillRef idx="1">
-            <a:schemeClr val="accent1"/>
-          </a:fillRef>
-          <a:effectRef idx="0">
-            <a:schemeClr val="accent1"/>
-          </a:effectRef>
-          <a:fontRef idx="minor">
-            <a:schemeClr val="lt1"/>
-          </a:fontRef>
-        </p:style>
-        <p:txBody>
-          <a:bodyPr rtlCol="0" anchor="ctr"/>
-          <a:lstStyle/>
-          <a:p>
-            <a:pPr algn="ctr"/>
-            <a:endParaRPr lang="de-DE"/>
-          </a:p>
-        </p:txBody>
-      </p:sp>
-      <p:sp>
-        <p:nvSpPr>
-          <p:cNvPr id="11" name="Diagonaler Streifen 10"/>
-          <p:cNvSpPr/>
-          <p:nvPr/>
-        </p:nvSpPr>
-        <p:spPr>
-          <a:xfrm rot="10800000" flipH="1">
-            <a:off x="899881" y="2699882"/>
-            <a:ext cx="9000000" cy="5400000"/>
-          </a:xfrm>
-          <a:prstGeom prst="diagStripe">
-            <a:avLst>
-              <a:gd name="adj" fmla="val 88241"/>
-            </a:avLst>
-          </a:prstGeom>
-          <a:solidFill>
-            <a:schemeClr val="bg1"/>
-          </a:solidFill>
-          <a:ln>
-            <a:noFill/>
-          </a:ln>
-        </p:spPr>
-        <p:style>
-          <a:lnRef idx="2">
-            <a:schemeClr val="accent1">
-              <a:shade val="50000"/>
-            </a:schemeClr>
-          </a:lnRef>
-          <a:fillRef idx="1">
-            <a:schemeClr val="accent1"/>
-          </a:fillRef>
-          <a:effectRef idx="0">
-            <a:schemeClr val="accent1"/>
-          </a:effectRef>
-          <a:fontRef idx="minor">
-            <a:schemeClr val="lt1"/>
-          </a:fontRef>
-        </p:style>
-        <p:txBody>
-          <a:bodyPr rtlCol="0" anchor="ctr"/>
-          <a:lstStyle/>
-          <a:p>
-            <a:pPr algn="ctr"/>
-            <a:endParaRPr lang="de-DE"/>
-          </a:p>
-        </p:txBody>
-      </p:sp>
-      <p:sp>
-        <p:nvSpPr>
-          <p:cNvPr id="18" name="Diagonaler Streifen 17"/>
-          <p:cNvSpPr/>
-          <p:nvPr/>
-        </p:nvSpPr>
-        <p:spPr>
-          <a:xfrm rot="10800000" flipH="1">
-            <a:off x="899880" y="2699879"/>
-            <a:ext cx="9000000" cy="5400000"/>
-          </a:xfrm>
-          <a:prstGeom prst="diagStripe">
-            <a:avLst>
-              <a:gd name="adj" fmla="val 91909"/>
-            </a:avLst>
-          </a:prstGeom>
-          <a:gradFill>
-            <a:gsLst>
-              <a:gs pos="49000">
-                <a:schemeClr val="accent1">
-                  <a:lumMod val="5000"/>
-                  <a:lumOff val="95000"/>
-                </a:schemeClr>
-              </a:gs>
-              <a:gs pos="51000">
-                <a:srgbClr val="CF142B"/>
-              </a:gs>
-            </a:gsLst>
-            <a:lin ang="5400000" scaled="1"/>
-          </a:gradFill>
-          <a:ln>
-            <a:noFill/>
-          </a:ln>
-        </p:spPr>
-        <p:style>
-          <a:lnRef idx="2">
-            <a:schemeClr val="accent1">
-              <a:shade val="50000"/>
-            </a:schemeClr>
-          </a:lnRef>
-          <a:fillRef idx="1">
-            <a:schemeClr val="accent1"/>
-          </a:fillRef>
-          <a:effectRef idx="0">
-            <a:schemeClr val="accent1"/>
-          </a:effectRef>
-          <a:fontRef idx="minor">
-            <a:schemeClr val="lt1"/>
-          </a:fontRef>
-        </p:style>
-        <p:txBody>
-          <a:bodyPr rtlCol="0" anchor="ctr"/>
-          <a:lstStyle/>
-          <a:p>
-            <a:pPr algn="ctr"/>
-            <a:endParaRPr lang="de-DE"/>
-          </a:p>
-        </p:txBody>
-      </p:sp>
-      <p:sp>
-        <p:nvSpPr>
-          <p:cNvPr id="19" name="Diagonaler Streifen 18"/>
-          <p:cNvSpPr/>
-          <p:nvPr/>
-        </p:nvSpPr>
-        <p:spPr>
-          <a:xfrm>
-            <a:off x="899880" y="2699880"/>
-            <a:ext cx="9000000" cy="5400000"/>
-          </a:xfrm>
-          <a:prstGeom prst="diagStripe">
-            <a:avLst>
-              <a:gd name="adj" fmla="val 91909"/>
-            </a:avLst>
-          </a:prstGeom>
-          <a:gradFill>
-            <a:gsLst>
-              <a:gs pos="49000">
-                <a:schemeClr val="accent1">
-                  <a:lumMod val="5000"/>
-                  <a:lumOff val="95000"/>
-                </a:schemeClr>
-              </a:gs>
-              <a:gs pos="46000">
-                <a:srgbClr val="CF142B"/>
-              </a:gs>
-            </a:gsLst>
-            <a:lin ang="5400000" scaled="1"/>
-          </a:gradFill>
-          <a:ln>
-            <a:noFill/>
-          </a:ln>
-        </p:spPr>
-        <p:style>
-          <a:lnRef idx="2">
-            <a:schemeClr val="accent1">
-              <a:shade val="50000"/>
-            </a:schemeClr>
-          </a:lnRef>
-          <a:fillRef idx="1">
-            <a:schemeClr val="accent1"/>
-          </a:fillRef>
-          <a:effectRef idx="0">
-            <a:schemeClr val="accent1"/>
-          </a:effectRef>
-          <a:fontRef idx="minor">
-            <a:schemeClr val="lt1"/>
-          </a:fontRef>
-        </p:style>
-        <p:txBody>
-          <a:bodyPr rtlCol="0" anchor="ctr"/>
-          <a:lstStyle/>
-          <a:p>
-            <a:pPr algn="ctr"/>
-            <a:endParaRPr lang="de-DE"/>
-          </a:p>
-        </p:txBody>
-      </p:sp>
-      <p:sp>
-        <p:nvSpPr>
-          <p:cNvPr id="20" name="Diagonaler Streifen 19"/>
-          <p:cNvSpPr/>
-          <p:nvPr/>
-        </p:nvSpPr>
-        <p:spPr>
-          <a:xfrm flipH="1">
-            <a:off x="899877" y="2699875"/>
-            <a:ext cx="9000000" cy="5400000"/>
-          </a:xfrm>
-          <a:prstGeom prst="diagStripe">
-            <a:avLst>
-              <a:gd name="adj" fmla="val 91909"/>
-            </a:avLst>
-          </a:prstGeom>
-          <a:gradFill>
-            <a:gsLst>
-              <a:gs pos="49000">
-                <a:schemeClr val="accent1">
-                  <a:lumMod val="5000"/>
-                  <a:lumOff val="95000"/>
-                </a:schemeClr>
-              </a:gs>
-              <a:gs pos="51000">
-                <a:srgbClr val="CF142B"/>
-              </a:gs>
-            </a:gsLst>
-            <a:lin ang="5400000" scaled="1"/>
-          </a:gradFill>
-          <a:ln>
-            <a:noFill/>
-          </a:ln>
-        </p:spPr>
-        <p:style>
-          <a:lnRef idx="2">
-            <a:schemeClr val="accent1">
-              <a:shade val="50000"/>
-            </a:schemeClr>
-          </a:lnRef>
-          <a:fillRef idx="1">
-            <a:schemeClr val="accent1"/>
-          </a:fillRef>
-          <a:effectRef idx="0">
-            <a:schemeClr val="accent1"/>
-          </a:effectRef>
-          <a:fontRef idx="minor">
-            <a:schemeClr val="lt1"/>
-          </a:fontRef>
-        </p:style>
-        <p:txBody>
-          <a:bodyPr rtlCol="0" anchor="ctr"/>
-          <a:lstStyle/>
-          <a:p>
-            <a:pPr algn="ctr"/>
-            <a:endParaRPr lang="de-DE"/>
-          </a:p>
-        </p:txBody>
-      </p:sp>
-      <p:sp>
-        <p:nvSpPr>
-          <p:cNvPr id="21" name="Diagonaler Streifen 20"/>
-          <p:cNvSpPr/>
-          <p:nvPr/>
-        </p:nvSpPr>
-        <p:spPr>
-          <a:xfrm rot="10800000">
-            <a:off x="899877" y="2699876"/>
-            <a:ext cx="9000000" cy="5400000"/>
-          </a:xfrm>
-          <a:prstGeom prst="diagStripe">
-            <a:avLst>
-              <a:gd name="adj" fmla="val 91909"/>
-            </a:avLst>
-          </a:prstGeom>
-          <a:gradFill>
-            <a:gsLst>
-              <a:gs pos="49000">
-                <a:schemeClr val="accent1">
-                  <a:lumMod val="5000"/>
-                  <a:lumOff val="95000"/>
-                </a:schemeClr>
-              </a:gs>
-              <a:gs pos="46000">
-                <a:srgbClr val="CF142B"/>
-              </a:gs>
-            </a:gsLst>
-            <a:lin ang="5400000" scaled="1"/>
-          </a:gradFill>
-          <a:ln>
-            <a:noFill/>
-          </a:ln>
-        </p:spPr>
-        <p:style>
-          <a:lnRef idx="2">
-            <a:schemeClr val="accent1">
-              <a:shade val="50000"/>
-            </a:schemeClr>
-          </a:lnRef>
-          <a:fillRef idx="1">
-            <a:schemeClr val="accent1"/>
-          </a:fillRef>
-          <a:effectRef idx="0">
-            <a:schemeClr val="accent1"/>
-          </a:effectRef>
-          <a:fontRef idx="minor">
-            <a:schemeClr val="lt1"/>
-          </a:fontRef>
-        </p:style>
-        <p:txBody>
-          <a:bodyPr rtlCol="0" anchor="ctr"/>
-          <a:lstStyle/>
-          <a:p>
-            <a:pPr algn="ctr"/>
-            <a:endParaRPr lang="de-DE"/>
-          </a:p>
-        </p:txBody>
-      </p:sp>
-      <p:sp>
-        <p:nvSpPr>
-          <p:cNvPr id="13" name="Rechteck 12"/>
-          <p:cNvSpPr/>
-          <p:nvPr/>
-        </p:nvSpPr>
-        <p:spPr>
-          <a:xfrm>
-            <a:off x="899880" y="5927883"/>
-            <a:ext cx="9000000" cy="276995"/>
-          </a:xfrm>
-          <a:prstGeom prst="rect">
-            <a:avLst/>
-          </a:prstGeom>
-          <a:solidFill>
-            <a:schemeClr val="bg1"/>
-          </a:solidFill>
-          <a:ln>
-            <a:noFill/>
-          </a:ln>
-        </p:spPr>
-        <p:style>
-          <a:lnRef idx="2">
-            <a:schemeClr val="accent1">
-              <a:shade val="50000"/>
-            </a:schemeClr>
-          </a:lnRef>
-          <a:fillRef idx="1">
-            <a:schemeClr val="accent1"/>
-          </a:fillRef>
-          <a:effectRef idx="0">
-            <a:schemeClr val="accent1"/>
-          </a:effectRef>
-          <a:fontRef idx="minor">
-            <a:schemeClr val="lt1"/>
-          </a:fontRef>
-        </p:style>
-        <p:txBody>
-          <a:bodyPr rtlCol="0" anchor="ctr"/>
-          <a:lstStyle/>
-          <a:p>
-            <a:pPr algn="ctr"/>
-            <a:endParaRPr lang="de-DE"/>
-          </a:p>
-        </p:txBody>
-      </p:sp>
-      <p:sp>
-        <p:nvSpPr>
-          <p:cNvPr id="14" name="Rechteck 13"/>
-          <p:cNvSpPr/>
-          <p:nvPr/>
-        </p:nvSpPr>
-        <p:spPr>
-          <a:xfrm>
-            <a:off x="899877" y="4594640"/>
-            <a:ext cx="9000000" cy="276995"/>
-          </a:xfrm>
-          <a:prstGeom prst="rect">
-            <a:avLst/>
-          </a:prstGeom>
-          <a:solidFill>
-            <a:schemeClr val="bg1"/>
-          </a:solidFill>
-          <a:ln>
-            <a:noFill/>
-          </a:ln>
-        </p:spPr>
-        <p:style>
-          <a:lnRef idx="2">
-            <a:schemeClr val="accent1">
-              <a:shade val="50000"/>
-            </a:schemeClr>
-          </a:lnRef>
-          <a:fillRef idx="1">
-            <a:schemeClr val="accent1"/>
-          </a:fillRef>
-          <a:effectRef idx="0">
-            <a:schemeClr val="accent1"/>
-          </a:effectRef>
-          <a:fontRef idx="minor">
-            <a:schemeClr val="lt1"/>
-          </a:fontRef>
-        </p:style>
-        <p:txBody>
-          <a:bodyPr rtlCol="0" anchor="ctr"/>
-          <a:lstStyle/>
-          <a:p>
-            <a:pPr algn="ctr"/>
-            <a:endParaRPr lang="de-DE"/>
-          </a:p>
-        </p:txBody>
-      </p:sp>
-      <p:sp>
-        <p:nvSpPr>
-          <p:cNvPr id="7" name="Rechteck 6"/>
-          <p:cNvSpPr/>
-          <p:nvPr/>
-        </p:nvSpPr>
-        <p:spPr>
-          <a:xfrm rot="5400000">
-            <a:off x="2699881" y="4871641"/>
-            <a:ext cx="5400000" cy="1056481"/>
-          </a:xfrm>
-          <a:prstGeom prst="rect">
-            <a:avLst/>
-          </a:prstGeom>
-          <a:solidFill>
-            <a:srgbClr val="CF142B"/>
-          </a:solidFill>
-          <a:ln>
-            <a:noFill/>
-          </a:ln>
-        </p:spPr>
-        <p:style>
-          <a:lnRef idx="2">
-            <a:schemeClr val="accent1">
-              <a:shade val="50000"/>
-            </a:schemeClr>
-          </a:lnRef>
-          <a:fillRef idx="1">
-            <a:schemeClr val="accent1"/>
-          </a:fillRef>
-          <a:effectRef idx="0">
-            <a:schemeClr val="accent1"/>
-          </a:effectRef>
-          <a:fontRef idx="minor">
-            <a:schemeClr val="lt1"/>
-          </a:fontRef>
-        </p:style>
-        <p:txBody>
-          <a:bodyPr rtlCol="0" anchor="ctr"/>
-          <a:lstStyle/>
-          <a:p>
-            <a:pPr algn="ctr"/>
-            <a:endParaRPr lang="de-DE"/>
-          </a:p>
-        </p:txBody>
-      </p:sp>
-      <p:sp>
-        <p:nvSpPr>
-          <p:cNvPr id="22" name="Rechteck 21"/>
-          <p:cNvSpPr/>
-          <p:nvPr/>
-        </p:nvSpPr>
-        <p:spPr>
-          <a:xfrm rot="5400000">
-            <a:off x="3366722" y="5261275"/>
-            <a:ext cx="5400000" cy="277200"/>
-          </a:xfrm>
-          <a:prstGeom prst="rect">
-            <a:avLst/>
-          </a:prstGeom>
-          <a:solidFill>
-            <a:schemeClr val="bg1"/>
-          </a:solidFill>
-          <a:ln>
-            <a:noFill/>
-          </a:ln>
-        </p:spPr>
-        <p:style>
-          <a:lnRef idx="2">
-            <a:schemeClr val="accent1">
-              <a:shade val="50000"/>
-            </a:schemeClr>
-          </a:lnRef>
-          <a:fillRef idx="1">
-            <a:schemeClr val="accent1"/>
-          </a:fillRef>
-          <a:effectRef idx="0">
-            <a:schemeClr val="accent1"/>
-          </a:effectRef>
-          <a:fontRef idx="minor">
-            <a:schemeClr val="lt1"/>
-          </a:fontRef>
-        </p:style>
-        <p:txBody>
-          <a:bodyPr rtlCol="0" anchor="ctr"/>
-          <a:lstStyle/>
-          <a:p>
-            <a:pPr algn="ctr"/>
-            <a:endParaRPr lang="de-DE"/>
-          </a:p>
-        </p:txBody>
-      </p:sp>
-      <p:sp>
-        <p:nvSpPr>
-          <p:cNvPr id="23" name="Rechteck 22"/>
-          <p:cNvSpPr/>
-          <p:nvPr/>
-        </p:nvSpPr>
-        <p:spPr>
-          <a:xfrm rot="5400000">
-            <a:off x="2128561" y="5261269"/>
-            <a:ext cx="5400000" cy="277200"/>
-          </a:xfrm>
-          <a:prstGeom prst="rect">
-            <a:avLst/>
-          </a:prstGeom>
-          <a:solidFill>
-            <a:schemeClr val="bg1"/>
-          </a:solidFill>
-          <a:ln>
-            <a:noFill/>
-          </a:ln>
-        </p:spPr>
-        <p:style>
-          <a:lnRef idx="2">
-            <a:schemeClr val="accent1">
-              <a:shade val="50000"/>
-            </a:schemeClr>
-          </a:lnRef>
-          <a:fillRef idx="1">
-            <a:schemeClr val="accent1"/>
-          </a:fillRef>
-          <a:effectRef idx="0">
-            <a:schemeClr val="accent1"/>
-          </a:effectRef>
-          <a:fontRef idx="minor">
-            <a:schemeClr val="lt1"/>
-          </a:fontRef>
-        </p:style>
-        <p:txBody>
-          <a:bodyPr rtlCol="0" anchor="ctr"/>
-          <a:lstStyle/>
-          <a:p>
-            <a:pPr algn="ctr"/>
-            <a:endParaRPr lang="de-DE"/>
-          </a:p>
-        </p:txBody>
-      </p:sp>
-      <p:sp>
-        <p:nvSpPr>
-          <p:cNvPr id="5" name="Rechteck 4"/>
-          <p:cNvSpPr/>
-          <p:nvPr/>
-        </p:nvSpPr>
-        <p:spPr>
-          <a:xfrm>
-            <a:off x="899881" y="4871641"/>
-            <a:ext cx="9000000" cy="1056481"/>
-          </a:xfrm>
-          <a:prstGeom prst="rect">
-            <a:avLst/>
-          </a:prstGeom>
-          <a:solidFill>
-            <a:srgbClr val="CF142B"/>
-          </a:solidFill>
-          <a:ln>
-            <a:noFill/>
-          </a:ln>
-        </p:spPr>
-        <p:style>
-          <a:lnRef idx="2">
-            <a:schemeClr val="accent1">
-              <a:shade val="50000"/>
-            </a:schemeClr>
-          </a:lnRef>
-          <a:fillRef idx="1">
-            <a:schemeClr val="accent1"/>
-          </a:fillRef>
-          <a:effectRef idx="0">
-            <a:schemeClr val="accent1"/>
-          </a:effectRef>
-          <a:fontRef idx="minor">
-            <a:schemeClr val="lt1"/>
-          </a:fontRef>
-        </p:style>
-        <p:txBody>
-          <a:bodyPr rtlCol="0" anchor="ctr"/>
-          <a:lstStyle/>
-          <a:p>
-            <a:pPr algn="ctr"/>
-            <a:endParaRPr lang="de-DE"/>
-          </a:p>
-        </p:txBody>
-      </p:sp>
-    </p:spTree>
-    <p:extLst>
-      <p:ext uri="{BB962C8B-B14F-4D97-AF65-F5344CB8AC3E}">
-        <p14:creationId xmlns:p14="http://schemas.microsoft.com/office/powerpoint/2010/main" val="2514809845"/>
       </p:ext>
     </p:extLst>
   </p:cSld>
@@ -12202,6 +11413,786 @@
       </p:par>
     </p:tnLst>
   </p:timing>
+</p:sld>
+</file>
+
+<file path=ppt/slides/slide30.xml><?xml version="1.0" encoding="utf-8"?>
+<p:sld xmlns:a="http://schemas.openxmlformats.org/drawingml/2006/main" xmlns:r="http://schemas.openxmlformats.org/officeDocument/2006/relationships" xmlns:p="http://schemas.openxmlformats.org/presentationml/2006/main">
+  <p:cSld>
+    <p:spTree>
+      <p:nvGrpSpPr>
+        <p:cNvPr id="1" name=""/>
+        <p:cNvGrpSpPr/>
+        <p:nvPr/>
+      </p:nvGrpSpPr>
+      <p:grpSpPr>
+        <a:xfrm>
+          <a:off x="0" y="0"/>
+          <a:ext cx="0" cy="0"/>
+          <a:chOff x="0" y="0"/>
+          <a:chExt cx="0" cy="0"/>
+        </a:xfrm>
+      </p:grpSpPr>
+      <p:sp>
+        <p:nvSpPr>
+          <p:cNvPr id="2" name="Rechteck 1"/>
+          <p:cNvSpPr/>
+          <p:nvPr/>
+        </p:nvSpPr>
+        <p:spPr>
+          <a:xfrm>
+            <a:off x="899880" y="2699880"/>
+            <a:ext cx="9000001" cy="5400001"/>
+          </a:xfrm>
+          <a:prstGeom prst="rect">
+            <a:avLst/>
+          </a:prstGeom>
+          <a:solidFill>
+            <a:srgbClr val="00247D"/>
+          </a:solidFill>
+          <a:ln>
+            <a:noFill/>
+          </a:ln>
+        </p:spPr>
+        <p:style>
+          <a:lnRef idx="2">
+            <a:schemeClr val="accent1">
+              <a:shade val="50000"/>
+            </a:schemeClr>
+          </a:lnRef>
+          <a:fillRef idx="1">
+            <a:schemeClr val="accent1"/>
+          </a:fillRef>
+          <a:effectRef idx="0">
+            <a:schemeClr val="accent1"/>
+          </a:effectRef>
+          <a:fontRef idx="minor">
+            <a:schemeClr val="lt1"/>
+          </a:fontRef>
+        </p:style>
+        <p:txBody>
+          <a:bodyPr rtlCol="0" anchor="ctr"/>
+          <a:lstStyle/>
+          <a:p>
+            <a:pPr algn="ctr"/>
+            <a:endParaRPr lang="de-DE"/>
+          </a:p>
+        </p:txBody>
+      </p:sp>
+      <p:sp>
+        <p:nvSpPr>
+          <p:cNvPr id="8" name="Diagonaler Streifen 7"/>
+          <p:cNvSpPr/>
+          <p:nvPr/>
+        </p:nvSpPr>
+        <p:spPr>
+          <a:xfrm>
+            <a:off x="899881" y="2699881"/>
+            <a:ext cx="9000000" cy="5400000"/>
+          </a:xfrm>
+          <a:prstGeom prst="diagStripe">
+            <a:avLst>
+              <a:gd name="adj" fmla="val 88241"/>
+            </a:avLst>
+          </a:prstGeom>
+          <a:solidFill>
+            <a:schemeClr val="bg1"/>
+          </a:solidFill>
+          <a:ln>
+            <a:noFill/>
+          </a:ln>
+        </p:spPr>
+        <p:style>
+          <a:lnRef idx="2">
+            <a:schemeClr val="accent1">
+              <a:shade val="50000"/>
+            </a:schemeClr>
+          </a:lnRef>
+          <a:fillRef idx="1">
+            <a:schemeClr val="accent1"/>
+          </a:fillRef>
+          <a:effectRef idx="0">
+            <a:schemeClr val="accent1"/>
+          </a:effectRef>
+          <a:fontRef idx="minor">
+            <a:schemeClr val="lt1"/>
+          </a:fontRef>
+        </p:style>
+        <p:txBody>
+          <a:bodyPr rtlCol="0" anchor="ctr"/>
+          <a:lstStyle/>
+          <a:p>
+            <a:pPr algn="ctr"/>
+            <a:endParaRPr lang="de-DE"/>
+          </a:p>
+        </p:txBody>
+      </p:sp>
+      <p:sp>
+        <p:nvSpPr>
+          <p:cNvPr id="9" name="Diagonaler Streifen 8"/>
+          <p:cNvSpPr/>
+          <p:nvPr/>
+        </p:nvSpPr>
+        <p:spPr>
+          <a:xfrm rot="10800000">
+            <a:off x="899882" y="2699881"/>
+            <a:ext cx="9000000" cy="5400000"/>
+          </a:xfrm>
+          <a:prstGeom prst="diagStripe">
+            <a:avLst>
+              <a:gd name="adj" fmla="val 88241"/>
+            </a:avLst>
+          </a:prstGeom>
+          <a:solidFill>
+            <a:schemeClr val="bg1"/>
+          </a:solidFill>
+          <a:ln>
+            <a:noFill/>
+          </a:ln>
+        </p:spPr>
+        <p:style>
+          <a:lnRef idx="2">
+            <a:schemeClr val="accent1">
+              <a:shade val="50000"/>
+            </a:schemeClr>
+          </a:lnRef>
+          <a:fillRef idx="1">
+            <a:schemeClr val="accent1"/>
+          </a:fillRef>
+          <a:effectRef idx="0">
+            <a:schemeClr val="accent1"/>
+          </a:effectRef>
+          <a:fontRef idx="minor">
+            <a:schemeClr val="lt1"/>
+          </a:fontRef>
+        </p:style>
+        <p:txBody>
+          <a:bodyPr rtlCol="0" anchor="ctr"/>
+          <a:lstStyle/>
+          <a:p>
+            <a:pPr algn="ctr"/>
+            <a:endParaRPr lang="de-DE"/>
+          </a:p>
+        </p:txBody>
+      </p:sp>
+      <p:sp>
+        <p:nvSpPr>
+          <p:cNvPr id="10" name="Diagonaler Streifen 9"/>
+          <p:cNvSpPr/>
+          <p:nvPr/>
+        </p:nvSpPr>
+        <p:spPr>
+          <a:xfrm flipH="1">
+            <a:off x="899880" y="2699882"/>
+            <a:ext cx="9000000" cy="5400000"/>
+          </a:xfrm>
+          <a:prstGeom prst="diagStripe">
+            <a:avLst>
+              <a:gd name="adj" fmla="val 88241"/>
+            </a:avLst>
+          </a:prstGeom>
+          <a:solidFill>
+            <a:schemeClr val="bg1"/>
+          </a:solidFill>
+          <a:ln>
+            <a:noFill/>
+          </a:ln>
+        </p:spPr>
+        <p:style>
+          <a:lnRef idx="2">
+            <a:schemeClr val="accent1">
+              <a:shade val="50000"/>
+            </a:schemeClr>
+          </a:lnRef>
+          <a:fillRef idx="1">
+            <a:schemeClr val="accent1"/>
+          </a:fillRef>
+          <a:effectRef idx="0">
+            <a:schemeClr val="accent1"/>
+          </a:effectRef>
+          <a:fontRef idx="minor">
+            <a:schemeClr val="lt1"/>
+          </a:fontRef>
+        </p:style>
+        <p:txBody>
+          <a:bodyPr rtlCol="0" anchor="ctr"/>
+          <a:lstStyle/>
+          <a:p>
+            <a:pPr algn="ctr"/>
+            <a:endParaRPr lang="de-DE"/>
+          </a:p>
+        </p:txBody>
+      </p:sp>
+      <p:sp>
+        <p:nvSpPr>
+          <p:cNvPr id="11" name="Diagonaler Streifen 10"/>
+          <p:cNvSpPr/>
+          <p:nvPr/>
+        </p:nvSpPr>
+        <p:spPr>
+          <a:xfrm rot="10800000" flipH="1">
+            <a:off x="899881" y="2699882"/>
+            <a:ext cx="9000000" cy="5400000"/>
+          </a:xfrm>
+          <a:prstGeom prst="diagStripe">
+            <a:avLst>
+              <a:gd name="adj" fmla="val 88241"/>
+            </a:avLst>
+          </a:prstGeom>
+          <a:solidFill>
+            <a:schemeClr val="bg1"/>
+          </a:solidFill>
+          <a:ln>
+            <a:noFill/>
+          </a:ln>
+        </p:spPr>
+        <p:style>
+          <a:lnRef idx="2">
+            <a:schemeClr val="accent1">
+              <a:shade val="50000"/>
+            </a:schemeClr>
+          </a:lnRef>
+          <a:fillRef idx="1">
+            <a:schemeClr val="accent1"/>
+          </a:fillRef>
+          <a:effectRef idx="0">
+            <a:schemeClr val="accent1"/>
+          </a:effectRef>
+          <a:fontRef idx="minor">
+            <a:schemeClr val="lt1"/>
+          </a:fontRef>
+        </p:style>
+        <p:txBody>
+          <a:bodyPr rtlCol="0" anchor="ctr"/>
+          <a:lstStyle/>
+          <a:p>
+            <a:pPr algn="ctr"/>
+            <a:endParaRPr lang="de-DE"/>
+          </a:p>
+        </p:txBody>
+      </p:sp>
+      <p:sp>
+        <p:nvSpPr>
+          <p:cNvPr id="18" name="Diagonaler Streifen 17"/>
+          <p:cNvSpPr/>
+          <p:nvPr/>
+        </p:nvSpPr>
+        <p:spPr>
+          <a:xfrm rot="10800000" flipH="1">
+            <a:off x="899880" y="2699879"/>
+            <a:ext cx="9000000" cy="5400000"/>
+          </a:xfrm>
+          <a:prstGeom prst="diagStripe">
+            <a:avLst>
+              <a:gd name="adj" fmla="val 91909"/>
+            </a:avLst>
+          </a:prstGeom>
+          <a:gradFill>
+            <a:gsLst>
+              <a:gs pos="49000">
+                <a:schemeClr val="accent1">
+                  <a:lumMod val="5000"/>
+                  <a:lumOff val="95000"/>
+                </a:schemeClr>
+              </a:gs>
+              <a:gs pos="51000">
+                <a:srgbClr val="CF142B"/>
+              </a:gs>
+            </a:gsLst>
+            <a:lin ang="5400000" scaled="1"/>
+          </a:gradFill>
+          <a:ln>
+            <a:noFill/>
+          </a:ln>
+        </p:spPr>
+        <p:style>
+          <a:lnRef idx="2">
+            <a:schemeClr val="accent1">
+              <a:shade val="50000"/>
+            </a:schemeClr>
+          </a:lnRef>
+          <a:fillRef idx="1">
+            <a:schemeClr val="accent1"/>
+          </a:fillRef>
+          <a:effectRef idx="0">
+            <a:schemeClr val="accent1"/>
+          </a:effectRef>
+          <a:fontRef idx="minor">
+            <a:schemeClr val="lt1"/>
+          </a:fontRef>
+        </p:style>
+        <p:txBody>
+          <a:bodyPr rtlCol="0" anchor="ctr"/>
+          <a:lstStyle/>
+          <a:p>
+            <a:pPr algn="ctr"/>
+            <a:endParaRPr lang="de-DE"/>
+          </a:p>
+        </p:txBody>
+      </p:sp>
+      <p:sp>
+        <p:nvSpPr>
+          <p:cNvPr id="19" name="Diagonaler Streifen 18"/>
+          <p:cNvSpPr/>
+          <p:nvPr/>
+        </p:nvSpPr>
+        <p:spPr>
+          <a:xfrm>
+            <a:off x="899880" y="2699880"/>
+            <a:ext cx="9000000" cy="5400000"/>
+          </a:xfrm>
+          <a:prstGeom prst="diagStripe">
+            <a:avLst>
+              <a:gd name="adj" fmla="val 91909"/>
+            </a:avLst>
+          </a:prstGeom>
+          <a:gradFill>
+            <a:gsLst>
+              <a:gs pos="49000">
+                <a:schemeClr val="accent1">
+                  <a:lumMod val="5000"/>
+                  <a:lumOff val="95000"/>
+                </a:schemeClr>
+              </a:gs>
+              <a:gs pos="46000">
+                <a:srgbClr val="CF142B"/>
+              </a:gs>
+            </a:gsLst>
+            <a:lin ang="5400000" scaled="1"/>
+          </a:gradFill>
+          <a:ln>
+            <a:noFill/>
+          </a:ln>
+        </p:spPr>
+        <p:style>
+          <a:lnRef idx="2">
+            <a:schemeClr val="accent1">
+              <a:shade val="50000"/>
+            </a:schemeClr>
+          </a:lnRef>
+          <a:fillRef idx="1">
+            <a:schemeClr val="accent1"/>
+          </a:fillRef>
+          <a:effectRef idx="0">
+            <a:schemeClr val="accent1"/>
+          </a:effectRef>
+          <a:fontRef idx="minor">
+            <a:schemeClr val="lt1"/>
+          </a:fontRef>
+        </p:style>
+        <p:txBody>
+          <a:bodyPr rtlCol="0" anchor="ctr"/>
+          <a:lstStyle/>
+          <a:p>
+            <a:pPr algn="ctr"/>
+            <a:endParaRPr lang="de-DE"/>
+          </a:p>
+        </p:txBody>
+      </p:sp>
+      <p:sp>
+        <p:nvSpPr>
+          <p:cNvPr id="20" name="Diagonaler Streifen 19"/>
+          <p:cNvSpPr/>
+          <p:nvPr/>
+        </p:nvSpPr>
+        <p:spPr>
+          <a:xfrm flipH="1">
+            <a:off x="899877" y="2699875"/>
+            <a:ext cx="9000000" cy="5400000"/>
+          </a:xfrm>
+          <a:prstGeom prst="diagStripe">
+            <a:avLst>
+              <a:gd name="adj" fmla="val 91909"/>
+            </a:avLst>
+          </a:prstGeom>
+          <a:gradFill>
+            <a:gsLst>
+              <a:gs pos="49000">
+                <a:schemeClr val="accent1">
+                  <a:lumMod val="5000"/>
+                  <a:lumOff val="95000"/>
+                </a:schemeClr>
+              </a:gs>
+              <a:gs pos="51000">
+                <a:srgbClr val="CF142B"/>
+              </a:gs>
+            </a:gsLst>
+            <a:lin ang="5400000" scaled="1"/>
+          </a:gradFill>
+          <a:ln>
+            <a:noFill/>
+          </a:ln>
+        </p:spPr>
+        <p:style>
+          <a:lnRef idx="2">
+            <a:schemeClr val="accent1">
+              <a:shade val="50000"/>
+            </a:schemeClr>
+          </a:lnRef>
+          <a:fillRef idx="1">
+            <a:schemeClr val="accent1"/>
+          </a:fillRef>
+          <a:effectRef idx="0">
+            <a:schemeClr val="accent1"/>
+          </a:effectRef>
+          <a:fontRef idx="minor">
+            <a:schemeClr val="lt1"/>
+          </a:fontRef>
+        </p:style>
+        <p:txBody>
+          <a:bodyPr rtlCol="0" anchor="ctr"/>
+          <a:lstStyle/>
+          <a:p>
+            <a:pPr algn="ctr"/>
+            <a:endParaRPr lang="de-DE"/>
+          </a:p>
+        </p:txBody>
+      </p:sp>
+      <p:sp>
+        <p:nvSpPr>
+          <p:cNvPr id="21" name="Diagonaler Streifen 20"/>
+          <p:cNvSpPr/>
+          <p:nvPr/>
+        </p:nvSpPr>
+        <p:spPr>
+          <a:xfrm rot="10800000">
+            <a:off x="899877" y="2699876"/>
+            <a:ext cx="9000000" cy="5400000"/>
+          </a:xfrm>
+          <a:prstGeom prst="diagStripe">
+            <a:avLst>
+              <a:gd name="adj" fmla="val 91909"/>
+            </a:avLst>
+          </a:prstGeom>
+          <a:gradFill>
+            <a:gsLst>
+              <a:gs pos="49000">
+                <a:schemeClr val="accent1">
+                  <a:lumMod val="5000"/>
+                  <a:lumOff val="95000"/>
+                </a:schemeClr>
+              </a:gs>
+              <a:gs pos="46000">
+                <a:srgbClr val="CF142B"/>
+              </a:gs>
+            </a:gsLst>
+            <a:lin ang="5400000" scaled="1"/>
+          </a:gradFill>
+          <a:ln>
+            <a:noFill/>
+          </a:ln>
+        </p:spPr>
+        <p:style>
+          <a:lnRef idx="2">
+            <a:schemeClr val="accent1">
+              <a:shade val="50000"/>
+            </a:schemeClr>
+          </a:lnRef>
+          <a:fillRef idx="1">
+            <a:schemeClr val="accent1"/>
+          </a:fillRef>
+          <a:effectRef idx="0">
+            <a:schemeClr val="accent1"/>
+          </a:effectRef>
+          <a:fontRef idx="minor">
+            <a:schemeClr val="lt1"/>
+          </a:fontRef>
+        </p:style>
+        <p:txBody>
+          <a:bodyPr rtlCol="0" anchor="ctr"/>
+          <a:lstStyle/>
+          <a:p>
+            <a:pPr algn="ctr"/>
+            <a:endParaRPr lang="de-DE"/>
+          </a:p>
+        </p:txBody>
+      </p:sp>
+      <p:sp>
+        <p:nvSpPr>
+          <p:cNvPr id="13" name="Rechteck 12"/>
+          <p:cNvSpPr/>
+          <p:nvPr/>
+        </p:nvSpPr>
+        <p:spPr>
+          <a:xfrm>
+            <a:off x="899880" y="5927883"/>
+            <a:ext cx="9000000" cy="276995"/>
+          </a:xfrm>
+          <a:prstGeom prst="rect">
+            <a:avLst/>
+          </a:prstGeom>
+          <a:solidFill>
+            <a:schemeClr val="bg1"/>
+          </a:solidFill>
+          <a:ln>
+            <a:noFill/>
+          </a:ln>
+        </p:spPr>
+        <p:style>
+          <a:lnRef idx="2">
+            <a:schemeClr val="accent1">
+              <a:shade val="50000"/>
+            </a:schemeClr>
+          </a:lnRef>
+          <a:fillRef idx="1">
+            <a:schemeClr val="accent1"/>
+          </a:fillRef>
+          <a:effectRef idx="0">
+            <a:schemeClr val="accent1"/>
+          </a:effectRef>
+          <a:fontRef idx="minor">
+            <a:schemeClr val="lt1"/>
+          </a:fontRef>
+        </p:style>
+        <p:txBody>
+          <a:bodyPr rtlCol="0" anchor="ctr"/>
+          <a:lstStyle/>
+          <a:p>
+            <a:pPr algn="ctr"/>
+            <a:endParaRPr lang="de-DE"/>
+          </a:p>
+        </p:txBody>
+      </p:sp>
+      <p:sp>
+        <p:nvSpPr>
+          <p:cNvPr id="14" name="Rechteck 13"/>
+          <p:cNvSpPr/>
+          <p:nvPr/>
+        </p:nvSpPr>
+        <p:spPr>
+          <a:xfrm>
+            <a:off x="899877" y="4594640"/>
+            <a:ext cx="9000000" cy="276995"/>
+          </a:xfrm>
+          <a:prstGeom prst="rect">
+            <a:avLst/>
+          </a:prstGeom>
+          <a:solidFill>
+            <a:schemeClr val="bg1"/>
+          </a:solidFill>
+          <a:ln>
+            <a:noFill/>
+          </a:ln>
+        </p:spPr>
+        <p:style>
+          <a:lnRef idx="2">
+            <a:schemeClr val="accent1">
+              <a:shade val="50000"/>
+            </a:schemeClr>
+          </a:lnRef>
+          <a:fillRef idx="1">
+            <a:schemeClr val="accent1"/>
+          </a:fillRef>
+          <a:effectRef idx="0">
+            <a:schemeClr val="accent1"/>
+          </a:effectRef>
+          <a:fontRef idx="minor">
+            <a:schemeClr val="lt1"/>
+          </a:fontRef>
+        </p:style>
+        <p:txBody>
+          <a:bodyPr rtlCol="0" anchor="ctr"/>
+          <a:lstStyle/>
+          <a:p>
+            <a:pPr algn="ctr"/>
+            <a:endParaRPr lang="de-DE"/>
+          </a:p>
+        </p:txBody>
+      </p:sp>
+      <p:sp>
+        <p:nvSpPr>
+          <p:cNvPr id="7" name="Rechteck 6"/>
+          <p:cNvSpPr/>
+          <p:nvPr/>
+        </p:nvSpPr>
+        <p:spPr>
+          <a:xfrm rot="5400000">
+            <a:off x="2699881" y="4871641"/>
+            <a:ext cx="5400000" cy="1056481"/>
+          </a:xfrm>
+          <a:prstGeom prst="rect">
+            <a:avLst/>
+          </a:prstGeom>
+          <a:solidFill>
+            <a:srgbClr val="CF142B"/>
+          </a:solidFill>
+          <a:ln>
+            <a:noFill/>
+          </a:ln>
+        </p:spPr>
+        <p:style>
+          <a:lnRef idx="2">
+            <a:schemeClr val="accent1">
+              <a:shade val="50000"/>
+            </a:schemeClr>
+          </a:lnRef>
+          <a:fillRef idx="1">
+            <a:schemeClr val="accent1"/>
+          </a:fillRef>
+          <a:effectRef idx="0">
+            <a:schemeClr val="accent1"/>
+          </a:effectRef>
+          <a:fontRef idx="minor">
+            <a:schemeClr val="lt1"/>
+          </a:fontRef>
+        </p:style>
+        <p:txBody>
+          <a:bodyPr rtlCol="0" anchor="ctr"/>
+          <a:lstStyle/>
+          <a:p>
+            <a:pPr algn="ctr"/>
+            <a:endParaRPr lang="de-DE"/>
+          </a:p>
+        </p:txBody>
+      </p:sp>
+      <p:sp>
+        <p:nvSpPr>
+          <p:cNvPr id="22" name="Rechteck 21"/>
+          <p:cNvSpPr/>
+          <p:nvPr/>
+        </p:nvSpPr>
+        <p:spPr>
+          <a:xfrm rot="5400000">
+            <a:off x="3366722" y="5261275"/>
+            <a:ext cx="5400000" cy="277200"/>
+          </a:xfrm>
+          <a:prstGeom prst="rect">
+            <a:avLst/>
+          </a:prstGeom>
+          <a:solidFill>
+            <a:schemeClr val="bg1"/>
+          </a:solidFill>
+          <a:ln>
+            <a:noFill/>
+          </a:ln>
+        </p:spPr>
+        <p:style>
+          <a:lnRef idx="2">
+            <a:schemeClr val="accent1">
+              <a:shade val="50000"/>
+            </a:schemeClr>
+          </a:lnRef>
+          <a:fillRef idx="1">
+            <a:schemeClr val="accent1"/>
+          </a:fillRef>
+          <a:effectRef idx="0">
+            <a:schemeClr val="accent1"/>
+          </a:effectRef>
+          <a:fontRef idx="minor">
+            <a:schemeClr val="lt1"/>
+          </a:fontRef>
+        </p:style>
+        <p:txBody>
+          <a:bodyPr rtlCol="0" anchor="ctr"/>
+          <a:lstStyle/>
+          <a:p>
+            <a:pPr algn="ctr"/>
+            <a:endParaRPr lang="de-DE"/>
+          </a:p>
+        </p:txBody>
+      </p:sp>
+      <p:sp>
+        <p:nvSpPr>
+          <p:cNvPr id="23" name="Rechteck 22"/>
+          <p:cNvSpPr/>
+          <p:nvPr/>
+        </p:nvSpPr>
+        <p:spPr>
+          <a:xfrm rot="5400000">
+            <a:off x="2128561" y="5261269"/>
+            <a:ext cx="5400000" cy="277200"/>
+          </a:xfrm>
+          <a:prstGeom prst="rect">
+            <a:avLst/>
+          </a:prstGeom>
+          <a:solidFill>
+            <a:schemeClr val="bg1"/>
+          </a:solidFill>
+          <a:ln>
+            <a:noFill/>
+          </a:ln>
+        </p:spPr>
+        <p:style>
+          <a:lnRef idx="2">
+            <a:schemeClr val="accent1">
+              <a:shade val="50000"/>
+            </a:schemeClr>
+          </a:lnRef>
+          <a:fillRef idx="1">
+            <a:schemeClr val="accent1"/>
+          </a:fillRef>
+          <a:effectRef idx="0">
+            <a:schemeClr val="accent1"/>
+          </a:effectRef>
+          <a:fontRef idx="minor">
+            <a:schemeClr val="lt1"/>
+          </a:fontRef>
+        </p:style>
+        <p:txBody>
+          <a:bodyPr rtlCol="0" anchor="ctr"/>
+          <a:lstStyle/>
+          <a:p>
+            <a:pPr algn="ctr"/>
+            <a:endParaRPr lang="de-DE"/>
+          </a:p>
+        </p:txBody>
+      </p:sp>
+      <p:sp>
+        <p:nvSpPr>
+          <p:cNvPr id="5" name="Rechteck 4"/>
+          <p:cNvSpPr/>
+          <p:nvPr/>
+        </p:nvSpPr>
+        <p:spPr>
+          <a:xfrm>
+            <a:off x="899881" y="4871641"/>
+            <a:ext cx="9000000" cy="1056481"/>
+          </a:xfrm>
+          <a:prstGeom prst="rect">
+            <a:avLst/>
+          </a:prstGeom>
+          <a:solidFill>
+            <a:srgbClr val="CF142B"/>
+          </a:solidFill>
+          <a:ln>
+            <a:noFill/>
+          </a:ln>
+        </p:spPr>
+        <p:style>
+          <a:lnRef idx="2">
+            <a:schemeClr val="accent1">
+              <a:shade val="50000"/>
+            </a:schemeClr>
+          </a:lnRef>
+          <a:fillRef idx="1">
+            <a:schemeClr val="accent1"/>
+          </a:fillRef>
+          <a:effectRef idx="0">
+            <a:schemeClr val="accent1"/>
+          </a:effectRef>
+          <a:fontRef idx="minor">
+            <a:schemeClr val="lt1"/>
+          </a:fontRef>
+        </p:style>
+        <p:txBody>
+          <a:bodyPr rtlCol="0" anchor="ctr"/>
+          <a:lstStyle/>
+          <a:p>
+            <a:pPr algn="ctr"/>
+            <a:endParaRPr lang="de-DE"/>
+          </a:p>
+        </p:txBody>
+      </p:sp>
+    </p:spTree>
+    <p:extLst>
+      <p:ext uri="{BB962C8B-B14F-4D97-AF65-F5344CB8AC3E}">
+        <p14:creationId xmlns:p14="http://schemas.microsoft.com/office/powerpoint/2010/main" val="2514809845"/>
+      </p:ext>
+    </p:extLst>
+  </p:cSld>
+  <p:clrMapOvr>
+    <a:masterClrMapping/>
+  </p:clrMapOvr>
 </p:sld>
 </file>
 

</xml_diff>